<commit_message>
add chapter 7 - 9 slides
</commit_message>
<xml_diff>
--- a/slides/Chapter9.pptx
+++ b/slides/Chapter9.pptx
@@ -219,7 +219,7 @@
           <a:p>
             <a:fld id="{D2A48B96-639E-45A3-A0BA-2464DFDB1FAA}" type="datetimeFigureOut">
               <a:rPr lang="zh-CN" altLang="en-US" smtClean="0"/>
-              <a:t>2023/1/8</a:t>
+              <a:t>2023/1/29</a:t>
             </a:fld>
             <a:endParaRPr lang="zh-CN" altLang="en-US"/>
           </a:p>
@@ -1333,7 +1333,7 @@
           <a:p>
             <a:fld id="{D997B5FA-0921-464F-AAE1-844C04324D75}" type="datetimeFigureOut">
               <a:rPr lang="zh-CN" altLang="en-US" smtClean="0"/>
-              <a:t>2023/1/8</a:t>
+              <a:t>2023/1/29</a:t>
             </a:fld>
             <a:endParaRPr lang="zh-CN" altLang="en-US"/>
           </a:p>
@@ -1496,7 +1496,7 @@
           <a:p>
             <a:fld id="{D997B5FA-0921-464F-AAE1-844C04324D75}" type="datetimeFigureOut">
               <a:rPr lang="zh-CN" altLang="en-US" smtClean="0"/>
-              <a:t>2023/1/8</a:t>
+              <a:t>2023/1/29</a:t>
             </a:fld>
             <a:endParaRPr lang="zh-CN" altLang="en-US"/>
           </a:p>
@@ -1669,7 +1669,7 @@
           <a:p>
             <a:fld id="{D997B5FA-0921-464F-AAE1-844C04324D75}" type="datetimeFigureOut">
               <a:rPr lang="zh-CN" altLang="en-US" smtClean="0"/>
-              <a:t>2023/1/8</a:t>
+              <a:t>2023/1/29</a:t>
             </a:fld>
             <a:endParaRPr lang="zh-CN" altLang="en-US"/>
           </a:p>
@@ -2343,7 +2343,7 @@
           <a:p>
             <a:fld id="{760FBDFE-C587-4B4C-A407-44438C67B59E}" type="datetimeFigureOut">
               <a:rPr lang="zh-CN" altLang="en-US" smtClean="0"/>
-              <a:t>2023/1/8</a:t>
+              <a:t>2023/1/29</a:t>
             </a:fld>
             <a:endParaRPr lang="zh-CN" altLang="en-US"/>
           </a:p>
@@ -3211,7 +3211,7 @@
           <a:p>
             <a:fld id="{760FBDFE-C587-4B4C-A407-44438C67B59E}" type="datetimeFigureOut">
               <a:rPr lang="zh-CN" altLang="en-US" smtClean="0"/>
-              <a:t>2023/1/8</a:t>
+              <a:t>2023/1/29</a:t>
             </a:fld>
             <a:endParaRPr lang="zh-CN" altLang="en-US"/>
           </a:p>
@@ -4019,7 +4019,7 @@
           <a:p>
             <a:fld id="{760FBDFE-C587-4B4C-A407-44438C67B59E}" type="datetimeFigureOut">
               <a:rPr lang="zh-CN" altLang="en-US" smtClean="0"/>
-              <a:t>2023/1/8</a:t>
+              <a:t>2023/1/29</a:t>
             </a:fld>
             <a:endParaRPr lang="zh-CN" altLang="en-US"/>
           </a:p>
@@ -4756,7 +4756,7 @@
           <a:p>
             <a:fld id="{760FBDFE-C587-4B4C-A407-44438C67B59E}" type="datetimeFigureOut">
               <a:rPr lang="zh-CN" altLang="en-US" smtClean="0"/>
-              <a:t>2023/1/8</a:t>
+              <a:t>2023/1/29</a:t>
             </a:fld>
             <a:endParaRPr lang="zh-CN" altLang="en-US"/>
           </a:p>
@@ -5737,7 +5737,7 @@
           <a:p>
             <a:fld id="{760FBDFE-C587-4B4C-A407-44438C67B59E}" type="datetimeFigureOut">
               <a:rPr lang="zh-CN" altLang="en-US" smtClean="0"/>
-              <a:t>2023/1/8</a:t>
+              <a:t>2023/1/29</a:t>
             </a:fld>
             <a:endParaRPr lang="zh-CN" altLang="en-US"/>
           </a:p>
@@ -6360,7 +6360,7 @@
           <a:p>
             <a:fld id="{760FBDFE-C587-4B4C-A407-44438C67B59E}" type="datetimeFigureOut">
               <a:rPr lang="zh-CN" altLang="en-US" smtClean="0"/>
-              <a:t>2023/1/8</a:t>
+              <a:t>2023/1/29</a:t>
             </a:fld>
             <a:endParaRPr lang="zh-CN" altLang="en-US"/>
           </a:p>
@@ -6467,7 +6467,7 @@
           <a:p>
             <a:fld id="{760FBDFE-C587-4B4C-A407-44438C67B59E}" type="datetimeFigureOut">
               <a:rPr lang="zh-CN" altLang="en-US" smtClean="0"/>
-              <a:t>2023/1/8</a:t>
+              <a:t>2023/1/29</a:t>
             </a:fld>
             <a:endParaRPr lang="zh-CN" altLang="en-US"/>
           </a:p>
@@ -7093,7 +7093,7 @@
           <a:p>
             <a:fld id="{9EFD9D74-47D9-4702-A33C-335B63B48DBF}" type="datetimeFigureOut">
               <a:rPr lang="zh-CN" altLang="en-US" smtClean="0"/>
-              <a:t>2023/1/8</a:t>
+              <a:t>2023/1/29</a:t>
             </a:fld>
             <a:endParaRPr lang="zh-CN" altLang="en-US" dirty="0"/>
           </a:p>
@@ -7288,7 +7288,7 @@
           <a:p>
             <a:fld id="{D997B5FA-0921-464F-AAE1-844C04324D75}" type="datetimeFigureOut">
               <a:rPr lang="zh-CN" altLang="en-US" smtClean="0"/>
-              <a:t>2023/1/8</a:t>
+              <a:t>2023/1/29</a:t>
             </a:fld>
             <a:endParaRPr lang="zh-CN" altLang="en-US"/>
           </a:p>
@@ -7970,7 +7970,7 @@
           <a:p>
             <a:fld id="{760FBDFE-C587-4B4C-A407-44438C67B59E}" type="datetimeFigureOut">
               <a:rPr lang="zh-CN" altLang="en-US" smtClean="0"/>
-              <a:t>2023/1/8</a:t>
+              <a:t>2023/1/29</a:t>
             </a:fld>
             <a:endParaRPr lang="zh-CN" altLang="en-US"/>
           </a:p>
@@ -8506,7 +8506,7 @@
           <a:p>
             <a:fld id="{760FBDFE-C587-4B4C-A407-44438C67B59E}" type="datetimeFigureOut">
               <a:rPr lang="zh-CN" altLang="en-US" smtClean="0"/>
-              <a:t>2023/1/8</a:t>
+              <a:t>2023/1/29</a:t>
             </a:fld>
             <a:endParaRPr lang="zh-CN" altLang="en-US"/>
           </a:p>
@@ -9273,7 +9273,7 @@
           <a:p>
             <a:fld id="{760FBDFE-C587-4B4C-A407-44438C67B59E}" type="datetimeFigureOut">
               <a:rPr lang="zh-CN" altLang="en-US" smtClean="0"/>
-              <a:t>2023/1/8</a:t>
+              <a:t>2023/1/29</a:t>
             </a:fld>
             <a:endParaRPr lang="zh-CN" altLang="en-US"/>
           </a:p>
@@ -9739,7 +9739,7 @@
           <a:p>
             <a:fld id="{760FBDFE-C587-4B4C-A407-44438C67B59E}" type="datetimeFigureOut">
               <a:rPr lang="zh-CN" altLang="en-US" smtClean="0"/>
-              <a:t>2023/1/8</a:t>
+              <a:t>2023/1/29</a:t>
             </a:fld>
             <a:endParaRPr lang="zh-CN" altLang="en-US"/>
           </a:p>
@@ -10429,7 +10429,7 @@
           <a:p>
             <a:fld id="{760FBDFE-C587-4B4C-A407-44438C67B59E}" type="datetimeFigureOut">
               <a:rPr lang="zh-CN" altLang="en-US" smtClean="0"/>
-              <a:t>2023/1/8</a:t>
+              <a:t>2023/1/29</a:t>
             </a:fld>
             <a:endParaRPr lang="zh-CN" altLang="en-US"/>
           </a:p>
@@ -10903,7 +10903,7 @@
           <a:p>
             <a:fld id="{760FBDFE-C587-4B4C-A407-44438C67B59E}" type="datetimeFigureOut">
               <a:rPr lang="zh-CN" altLang="en-US" smtClean="0"/>
-              <a:t>2023/1/8</a:t>
+              <a:t>2023/1/29</a:t>
             </a:fld>
             <a:endParaRPr lang="zh-CN" altLang="en-US" dirty="0"/>
           </a:p>
@@ -11629,7 +11629,7 @@
           <a:p>
             <a:fld id="{760FBDFE-C587-4B4C-A407-44438C67B59E}" type="datetimeFigureOut">
               <a:rPr lang="zh-CN" altLang="en-US" smtClean="0"/>
-              <a:t>2023/1/8</a:t>
+              <a:t>2023/1/29</a:t>
             </a:fld>
             <a:endParaRPr lang="zh-CN" altLang="en-US"/>
           </a:p>
@@ -12269,7 +12269,7 @@
           <a:p>
             <a:fld id="{760FBDFE-C587-4B4C-A407-44438C67B59E}" type="datetimeFigureOut">
               <a:rPr lang="zh-CN" altLang="en-US" smtClean="0"/>
-              <a:t>2023/1/8</a:t>
+              <a:t>2023/1/29</a:t>
             </a:fld>
             <a:endParaRPr lang="zh-CN" altLang="en-US"/>
           </a:p>
@@ -12696,7 +12696,7 @@
           <a:p>
             <a:fld id="{760FBDFE-C587-4B4C-A407-44438C67B59E}" type="datetimeFigureOut">
               <a:rPr lang="zh-CN" altLang="en-US" smtClean="0"/>
-              <a:t>2023/1/8</a:t>
+              <a:t>2023/1/29</a:t>
             </a:fld>
             <a:endParaRPr lang="zh-CN" altLang="en-US"/>
           </a:p>
@@ -13896,7 +13896,7 @@
           <a:p>
             <a:fld id="{760FBDFE-C587-4B4C-A407-44438C67B59E}" type="datetimeFigureOut">
               <a:rPr lang="zh-CN" altLang="en-US" smtClean="0"/>
-              <a:t>2023/1/8</a:t>
+              <a:t>2023/1/29</a:t>
             </a:fld>
             <a:endParaRPr lang="zh-CN" altLang="en-US"/>
           </a:p>
@@ -14215,7 +14215,7 @@
           <a:p>
             <a:fld id="{D997B5FA-0921-464F-AAE1-844C04324D75}" type="datetimeFigureOut">
               <a:rPr lang="zh-CN" altLang="en-US" smtClean="0"/>
-              <a:t>2023/1/8</a:t>
+              <a:t>2023/1/29</a:t>
             </a:fld>
             <a:endParaRPr lang="zh-CN" altLang="en-US"/>
           </a:p>
@@ -14439,7 +14439,7 @@
           <a:p>
             <a:fld id="{D997B5FA-0921-464F-AAE1-844C04324D75}" type="datetimeFigureOut">
               <a:rPr lang="zh-CN" altLang="en-US" smtClean="0"/>
-              <a:t>2023/1/8</a:t>
+              <a:t>2023/1/29</a:t>
             </a:fld>
             <a:endParaRPr lang="zh-CN" altLang="en-US"/>
           </a:p>
@@ -14798,7 +14798,7 @@
           <a:p>
             <a:fld id="{D997B5FA-0921-464F-AAE1-844C04324D75}" type="datetimeFigureOut">
               <a:rPr lang="zh-CN" altLang="en-US" smtClean="0"/>
-              <a:t>2023/1/8</a:t>
+              <a:t>2023/1/29</a:t>
             </a:fld>
             <a:endParaRPr lang="zh-CN" altLang="en-US"/>
           </a:p>
@@ -14910,7 +14910,7 @@
           <a:p>
             <a:fld id="{D997B5FA-0921-464F-AAE1-844C04324D75}" type="datetimeFigureOut">
               <a:rPr lang="zh-CN" altLang="en-US" smtClean="0"/>
-              <a:t>2023/1/8</a:t>
+              <a:t>2023/1/29</a:t>
             </a:fld>
             <a:endParaRPr lang="zh-CN" altLang="en-US"/>
           </a:p>
@@ -15000,7 +15000,7 @@
           <a:p>
             <a:fld id="{D997B5FA-0921-464F-AAE1-844C04324D75}" type="datetimeFigureOut">
               <a:rPr lang="zh-CN" altLang="en-US" smtClean="0"/>
-              <a:t>2023/1/8</a:t>
+              <a:t>2023/1/29</a:t>
             </a:fld>
             <a:endParaRPr lang="zh-CN" altLang="en-US"/>
           </a:p>
@@ -15270,7 +15270,7 @@
           <a:p>
             <a:fld id="{D997B5FA-0921-464F-AAE1-844C04324D75}" type="datetimeFigureOut">
               <a:rPr lang="zh-CN" altLang="en-US" smtClean="0"/>
-              <a:t>2023/1/8</a:t>
+              <a:t>2023/1/29</a:t>
             </a:fld>
             <a:endParaRPr lang="zh-CN" altLang="en-US"/>
           </a:p>
@@ -15517,7 +15517,7 @@
           <a:p>
             <a:fld id="{D997B5FA-0921-464F-AAE1-844C04324D75}" type="datetimeFigureOut">
               <a:rPr lang="zh-CN" altLang="en-US" smtClean="0"/>
-              <a:t>2023/1/8</a:t>
+              <a:t>2023/1/29</a:t>
             </a:fld>
             <a:endParaRPr lang="zh-CN" altLang="en-US"/>
           </a:p>
@@ -15723,7 +15723,7 @@
           <a:p>
             <a:fld id="{D997B5FA-0921-464F-AAE1-844C04324D75}" type="datetimeFigureOut">
               <a:rPr lang="zh-CN" altLang="en-US" smtClean="0"/>
-              <a:t>2023/1/8</a:t>
+              <a:t>2023/1/29</a:t>
             </a:fld>
             <a:endParaRPr lang="zh-CN" altLang="en-US"/>
           </a:p>
@@ -16270,7 +16270,7 @@
           <a:p>
             <a:fld id="{760FBDFE-C587-4B4C-A407-44438C67B59E}" type="datetimeFigureOut">
               <a:rPr lang="zh-CN" altLang="en-US" smtClean="0"/>
-              <a:t>2023/1/8</a:t>
+              <a:t>2023/1/29</a:t>
             </a:fld>
             <a:endParaRPr lang="zh-CN" altLang="en-US"/>
           </a:p>
@@ -16919,7 +16919,7 @@
         <p:spPr>
           <a:xfrm>
             <a:off x="579600" y="1187333"/>
-            <a:ext cx="8198963" cy="5078313"/>
+            <a:ext cx="8243889" cy="5355312"/>
           </a:xfrm>
           <a:prstGeom prst="rect">
             <a:avLst/>
@@ -16946,9 +16946,9 @@
                 <a:ea typeface="等线" panose="02010600030101010101" pitchFamily="2" charset="-122"/>
                 <a:cs typeface="Courier New" panose="02070309020205020404" pitchFamily="49" charset="0"/>
               </a:rPr>
-              <a:t>#include &lt;stdio.h&gt;</a:t>
-            </a:r>
-            <a:endParaRPr lang="zh-CN" altLang="zh-CN" sz="2000" kern="100">
+              <a:t>#include &lt;iostream&gt;</a:t>
+            </a:r>
+            <a:endParaRPr lang="zh-CN" altLang="zh-CN" sz="1800" kern="100">
               <a:effectLst/>
               <a:latin typeface="等线" panose="02010600030101010101" pitchFamily="2" charset="-122"/>
               <a:ea typeface="等线" panose="02010600030101010101" pitchFamily="2" charset="-122"/>
@@ -16960,19 +16960,19 @@
             <a:r>
               <a:rPr lang="en-US" altLang="zh-CN" sz="1800" kern="0">
                 <a:solidFill>
-                  <a:srgbClr val="804000"/>
-                </a:solidFill>
-                <a:effectLst/>
-                <a:highlight>
-                  <a:srgbClr val="FFFFFF"/>
-                </a:highlight>
-                <a:latin typeface="Consolas" panose="020B0609020204030204" pitchFamily="49" charset="0"/>
-                <a:ea typeface="等线" panose="02010600030101010101" pitchFamily="2" charset="-122"/>
-                <a:cs typeface="Courier New" panose="02070309020205020404" pitchFamily="49" charset="0"/>
-              </a:rPr>
-              <a:t>#include &lt;stdlib.h&gt;</a:t>
-            </a:r>
-            <a:endParaRPr lang="zh-CN" altLang="zh-CN" sz="2000" kern="100">
+                  <a:srgbClr val="000000"/>
+                </a:solidFill>
+                <a:effectLst/>
+                <a:highlight>
+                  <a:srgbClr val="FFFFFF"/>
+                </a:highlight>
+                <a:latin typeface="Consolas" panose="020B0609020204030204" pitchFamily="49" charset="0"/>
+                <a:ea typeface="等线" panose="02010600030101010101" pitchFamily="2" charset="-122"/>
+                <a:cs typeface="Courier New" panose="02070309020205020404" pitchFamily="49" charset="0"/>
+              </a:rPr>
+              <a:t> </a:t>
+            </a:r>
+            <a:endParaRPr lang="zh-CN" altLang="zh-CN" sz="1800" kern="100">
               <a:effectLst/>
               <a:latin typeface="等线" panose="02010600030101010101" pitchFamily="2" charset="-122"/>
               <a:ea typeface="等线" panose="02010600030101010101" pitchFamily="2" charset="-122"/>
@@ -16982,6 +16982,21 @@
           <a:p>
             <a:pPr algn="l"/>
             <a:r>
+              <a:rPr lang="en-US" altLang="zh-CN" sz="1800" b="1" kern="0">
+                <a:solidFill>
+                  <a:srgbClr val="0000FF"/>
+                </a:solidFill>
+                <a:effectLst/>
+                <a:highlight>
+                  <a:srgbClr val="FFFFFF"/>
+                </a:highlight>
+                <a:latin typeface="Consolas" panose="020B0609020204030204" pitchFamily="49" charset="0"/>
+                <a:ea typeface="等线" panose="02010600030101010101" pitchFamily="2" charset="-122"/>
+                <a:cs typeface="Courier New" panose="02070309020205020404" pitchFamily="49" charset="0"/>
+              </a:rPr>
+              <a:t>using</a:t>
+            </a:r>
+            <a:r>
               <a:rPr lang="en-US" altLang="zh-CN" sz="1800" kern="0">
                 <a:solidFill>
                   <a:srgbClr val="000000"/>
@@ -16994,9 +17009,54 @@
                 <a:ea typeface="等线" panose="02010600030101010101" pitchFamily="2" charset="-122"/>
                 <a:cs typeface="Courier New" panose="02070309020205020404" pitchFamily="49" charset="0"/>
               </a:rPr>
-              <a:t> </a:t>
-            </a:r>
-            <a:endParaRPr lang="zh-CN" altLang="zh-CN" sz="2000" kern="100">
+              <a:t> </a:t>
+            </a:r>
+            <a:r>
+              <a:rPr lang="en-US" altLang="zh-CN" sz="1800" b="1" kern="0">
+                <a:solidFill>
+                  <a:srgbClr val="0000FF"/>
+                </a:solidFill>
+                <a:effectLst/>
+                <a:highlight>
+                  <a:srgbClr val="FFFFFF"/>
+                </a:highlight>
+                <a:latin typeface="Consolas" panose="020B0609020204030204" pitchFamily="49" charset="0"/>
+                <a:ea typeface="等线" panose="02010600030101010101" pitchFamily="2" charset="-122"/>
+                <a:cs typeface="Courier New" panose="02070309020205020404" pitchFamily="49" charset="0"/>
+              </a:rPr>
+              <a:t>namespace</a:t>
+            </a:r>
+            <a:r>
+              <a:rPr lang="en-US" altLang="zh-CN" sz="1800" kern="0">
+                <a:solidFill>
+                  <a:srgbClr val="000000"/>
+                </a:solidFill>
+                <a:effectLst/>
+                <a:highlight>
+                  <a:srgbClr val="FFFFFF"/>
+                </a:highlight>
+                <a:latin typeface="Consolas" panose="020B0609020204030204" pitchFamily="49" charset="0"/>
+                <a:ea typeface="等线" panose="02010600030101010101" pitchFamily="2" charset="-122"/>
+                <a:cs typeface="Courier New" panose="02070309020205020404" pitchFamily="49" charset="0"/>
+              </a:rPr>
+              <a:t> std</a:t>
+            </a:r>
+            <a:r>
+              <a:rPr lang="en-US" altLang="zh-CN" sz="1800" b="1" kern="0">
+                <a:solidFill>
+                  <a:srgbClr val="000080"/>
+                </a:solidFill>
+                <a:effectLst/>
+                <a:highlight>
+                  <a:srgbClr val="FFFFFF"/>
+                </a:highlight>
+                <a:latin typeface="Consolas" panose="020B0609020204030204" pitchFamily="49" charset="0"/>
+                <a:ea typeface="等线" panose="02010600030101010101" pitchFamily="2" charset="-122"/>
+                <a:cs typeface="Courier New" panose="02070309020205020404" pitchFamily="49" charset="0"/>
+              </a:rPr>
+              <a:t>;</a:t>
+            </a:r>
+            <a:endParaRPr lang="zh-CN" altLang="zh-CN" sz="1800" kern="100">
               <a:effectLst/>
               <a:latin typeface="等线" panose="02010600030101010101" pitchFamily="2" charset="-122"/>
               <a:ea typeface="等线" panose="02010600030101010101" pitchFamily="2" charset="-122"/>
@@ -17006,21 +17066,6 @@
           <a:p>
             <a:pPr algn="l"/>
             <a:r>
-              <a:rPr lang="en-US" altLang="zh-CN" sz="1800" b="1" kern="0">
-                <a:solidFill>
-                  <a:srgbClr val="0000FF"/>
-                </a:solidFill>
-                <a:effectLst/>
-                <a:highlight>
-                  <a:srgbClr val="FFFFFF"/>
-                </a:highlight>
-                <a:latin typeface="Consolas" panose="020B0609020204030204" pitchFamily="49" charset="0"/>
-                <a:ea typeface="等线" panose="02010600030101010101" pitchFamily="2" charset="-122"/>
-                <a:cs typeface="Courier New" panose="02070309020205020404" pitchFamily="49" charset="0"/>
-              </a:rPr>
-              <a:t>typedef</a:t>
-            </a:r>
-            <a:r>
               <a:rPr lang="en-US" altLang="zh-CN" sz="1800" kern="0">
                 <a:solidFill>
                   <a:srgbClr val="000000"/>
@@ -17033,54 +17078,9 @@
                 <a:ea typeface="等线" panose="02010600030101010101" pitchFamily="2" charset="-122"/>
                 <a:cs typeface="Courier New" panose="02070309020205020404" pitchFamily="49" charset="0"/>
               </a:rPr>
-              <a:t> </a:t>
-            </a:r>
-            <a:r>
-              <a:rPr lang="en-US" altLang="zh-CN" sz="1800" kern="0">
-                <a:solidFill>
-                  <a:srgbClr val="8000FF"/>
-                </a:solidFill>
-                <a:effectLst/>
-                <a:highlight>
-                  <a:srgbClr val="FFFFFF"/>
-                </a:highlight>
-                <a:latin typeface="Consolas" panose="020B0609020204030204" pitchFamily="49" charset="0"/>
-                <a:ea typeface="等线" panose="02010600030101010101" pitchFamily="2" charset="-122"/>
-                <a:cs typeface="Courier New" panose="02070309020205020404" pitchFamily="49" charset="0"/>
-              </a:rPr>
-              <a:t>struct</a:t>
-            </a:r>
-            <a:r>
-              <a:rPr lang="en-US" altLang="zh-CN" sz="1800" kern="0">
-                <a:solidFill>
-                  <a:srgbClr val="000000"/>
-                </a:solidFill>
-                <a:effectLst/>
-                <a:highlight>
-                  <a:srgbClr val="FFFFFF"/>
-                </a:highlight>
-                <a:latin typeface="Consolas" panose="020B0609020204030204" pitchFamily="49" charset="0"/>
-                <a:ea typeface="等线" panose="02010600030101010101" pitchFamily="2" charset="-122"/>
-                <a:cs typeface="Courier New" panose="02070309020205020404" pitchFamily="49" charset="0"/>
-              </a:rPr>
-              <a:t> </a:t>
-            </a:r>
-            <a:r>
-              <a:rPr lang="en-US" altLang="zh-CN" sz="1800" b="1" kern="0">
-                <a:solidFill>
-                  <a:srgbClr val="000080"/>
-                </a:solidFill>
-                <a:effectLst/>
-                <a:highlight>
-                  <a:srgbClr val="FFFFFF"/>
-                </a:highlight>
-                <a:latin typeface="Consolas" panose="020B0609020204030204" pitchFamily="49" charset="0"/>
-                <a:ea typeface="等线" panose="02010600030101010101" pitchFamily="2" charset="-122"/>
-                <a:cs typeface="Courier New" panose="02070309020205020404" pitchFamily="49" charset="0"/>
-              </a:rPr>
-              <a:t>{</a:t>
-            </a:r>
-            <a:endParaRPr lang="zh-CN" altLang="zh-CN" sz="2000" kern="100">
+              <a:t> </a:t>
+            </a:r>
+            <a:endParaRPr lang="zh-CN" altLang="zh-CN" sz="1800" kern="100">
               <a:effectLst/>
               <a:latin typeface="等线" panose="02010600030101010101" pitchFamily="2" charset="-122"/>
               <a:ea typeface="等线" panose="02010600030101010101" pitchFamily="2" charset="-122"/>
@@ -17090,6 +17090,21 @@
           <a:p>
             <a:pPr algn="l"/>
             <a:r>
+              <a:rPr lang="en-US" altLang="zh-CN" sz="1800" b="1" kern="0">
+                <a:solidFill>
+                  <a:srgbClr val="0000FF"/>
+                </a:solidFill>
+                <a:effectLst/>
+                <a:highlight>
+                  <a:srgbClr val="FFFFFF"/>
+                </a:highlight>
+                <a:latin typeface="Consolas" panose="020B0609020204030204" pitchFamily="49" charset="0"/>
+                <a:ea typeface="等线" panose="02010600030101010101" pitchFamily="2" charset="-122"/>
+                <a:cs typeface="Courier New" panose="02070309020205020404" pitchFamily="49" charset="0"/>
+              </a:rPr>
+              <a:t>typedef</a:t>
+            </a:r>
+            <a:r>
               <a:rPr lang="en-US" altLang="zh-CN" sz="1800" kern="0">
                 <a:solidFill>
                   <a:srgbClr val="000000"/>
@@ -17102,7 +17117,7 @@
                 <a:ea typeface="等线" panose="02010600030101010101" pitchFamily="2" charset="-122"/>
                 <a:cs typeface="Courier New" panose="02070309020205020404" pitchFamily="49" charset="0"/>
               </a:rPr>
-              <a:t>    </a:t>
+              <a:t> </a:t>
             </a:r>
             <a:r>
               <a:rPr lang="en-US" altLang="zh-CN" sz="1800" kern="0">
@@ -17117,7 +17132,7 @@
                 <a:ea typeface="等线" panose="02010600030101010101" pitchFamily="2" charset="-122"/>
                 <a:cs typeface="Courier New" panose="02070309020205020404" pitchFamily="49" charset="0"/>
               </a:rPr>
-              <a:t>int</a:t>
+              <a:t>struct</a:t>
             </a:r>
             <a:r>
               <a:rPr lang="en-US" altLang="zh-CN" sz="1800" kern="0">
@@ -17132,7 +17147,7 @@
                 <a:ea typeface="等线" panose="02010600030101010101" pitchFamily="2" charset="-122"/>
                 <a:cs typeface="Courier New" panose="02070309020205020404" pitchFamily="49" charset="0"/>
               </a:rPr>
-              <a:t> numerator</a:t>
+              <a:t> </a:t>
             </a:r>
             <a:r>
               <a:rPr lang="en-US" altLang="zh-CN" sz="1800" b="1" kern="0">
@@ -17147,9 +17162,9 @@
                 <a:ea typeface="等线" panose="02010600030101010101" pitchFamily="2" charset="-122"/>
                 <a:cs typeface="Courier New" panose="02070309020205020404" pitchFamily="49" charset="0"/>
               </a:rPr>
-              <a:t>;</a:t>
-            </a:r>
-            <a:endParaRPr lang="zh-CN" altLang="zh-CN" sz="2000" kern="100">
+              <a:t>{</a:t>
+            </a:r>
+            <a:endParaRPr lang="zh-CN" altLang="zh-CN" sz="1800" kern="100">
               <a:effectLst/>
               <a:latin typeface="等线" panose="02010600030101010101" pitchFamily="2" charset="-122"/>
               <a:ea typeface="等线" panose="02010600030101010101" pitchFamily="2" charset="-122"/>
@@ -17201,7 +17216,7 @@
                 <a:ea typeface="等线" panose="02010600030101010101" pitchFamily="2" charset="-122"/>
                 <a:cs typeface="Courier New" panose="02070309020205020404" pitchFamily="49" charset="0"/>
               </a:rPr>
-              <a:t> denominator</a:t>
+              <a:t> numerator</a:t>
             </a:r>
             <a:r>
               <a:rPr lang="en-US" altLang="zh-CN" sz="1800" b="1" kern="0">
@@ -17218,7 +17233,7 @@
               </a:rPr>
               <a:t>;</a:t>
             </a:r>
-            <a:endParaRPr lang="zh-CN" altLang="zh-CN" sz="2000" kern="100">
+            <a:endParaRPr lang="zh-CN" altLang="zh-CN" sz="1800" kern="100">
               <a:effectLst/>
               <a:latin typeface="等线" panose="02010600030101010101" pitchFamily="2" charset="-122"/>
               <a:ea typeface="等线" panose="02010600030101010101" pitchFamily="2" charset="-122"/>
@@ -17228,6 +17243,51 @@
           <a:p>
             <a:pPr algn="l"/>
             <a:r>
+              <a:rPr lang="en-US" altLang="zh-CN" sz="1800" kern="0">
+                <a:solidFill>
+                  <a:srgbClr val="000000"/>
+                </a:solidFill>
+                <a:effectLst/>
+                <a:highlight>
+                  <a:srgbClr val="FFFFFF"/>
+                </a:highlight>
+                <a:latin typeface="Consolas" panose="020B0609020204030204" pitchFamily="49" charset="0"/>
+                <a:ea typeface="等线" panose="02010600030101010101" pitchFamily="2" charset="-122"/>
+                <a:cs typeface="Courier New" panose="02070309020205020404" pitchFamily="49" charset="0"/>
+              </a:rPr>
+              <a:t>    </a:t>
+            </a:r>
+            <a:r>
+              <a:rPr lang="en-US" altLang="zh-CN" sz="1800" kern="0">
+                <a:solidFill>
+                  <a:srgbClr val="8000FF"/>
+                </a:solidFill>
+                <a:effectLst/>
+                <a:highlight>
+                  <a:srgbClr val="FFFFFF"/>
+                </a:highlight>
+                <a:latin typeface="Consolas" panose="020B0609020204030204" pitchFamily="49" charset="0"/>
+                <a:ea typeface="等线" panose="02010600030101010101" pitchFamily="2" charset="-122"/>
+                <a:cs typeface="Courier New" panose="02070309020205020404" pitchFamily="49" charset="0"/>
+              </a:rPr>
+              <a:t>int</a:t>
+            </a:r>
+            <a:r>
+              <a:rPr lang="en-US" altLang="zh-CN" sz="1800" kern="0">
+                <a:solidFill>
+                  <a:srgbClr val="000000"/>
+                </a:solidFill>
+                <a:effectLst/>
+                <a:highlight>
+                  <a:srgbClr val="FFFFFF"/>
+                </a:highlight>
+                <a:latin typeface="Consolas" panose="020B0609020204030204" pitchFamily="49" charset="0"/>
+                <a:ea typeface="等线" panose="02010600030101010101" pitchFamily="2" charset="-122"/>
+                <a:cs typeface="Courier New" panose="02070309020205020404" pitchFamily="49" charset="0"/>
+              </a:rPr>
+              <a:t> denominator</a:t>
+            </a:r>
+            <a:r>
               <a:rPr lang="en-US" altLang="zh-CN" sz="1800" b="1" kern="0">
                 <a:solidFill>
                   <a:srgbClr val="000080"/>
@@ -17240,39 +17300,9 @@
                 <a:ea typeface="等线" panose="02010600030101010101" pitchFamily="2" charset="-122"/>
                 <a:cs typeface="Courier New" panose="02070309020205020404" pitchFamily="49" charset="0"/>
               </a:rPr>
-              <a:t>}</a:t>
-            </a:r>
-            <a:r>
-              <a:rPr lang="en-US" altLang="zh-CN" sz="1800" kern="0">
-                <a:solidFill>
-                  <a:srgbClr val="000000"/>
-                </a:solidFill>
-                <a:effectLst/>
-                <a:highlight>
-                  <a:srgbClr val="FFFFFF"/>
-                </a:highlight>
-                <a:latin typeface="Consolas" panose="020B0609020204030204" pitchFamily="49" charset="0"/>
-                <a:ea typeface="等线" panose="02010600030101010101" pitchFamily="2" charset="-122"/>
-                <a:cs typeface="Courier New" panose="02070309020205020404" pitchFamily="49" charset="0"/>
-              </a:rPr>
-              <a:t> Fraction</a:t>
-            </a:r>
-            <a:r>
-              <a:rPr lang="en-US" altLang="zh-CN" sz="1800" b="1" kern="0">
-                <a:solidFill>
-                  <a:srgbClr val="000080"/>
-                </a:solidFill>
-                <a:effectLst/>
-                <a:highlight>
-                  <a:srgbClr val="FFFFFF"/>
-                </a:highlight>
-                <a:latin typeface="Consolas" panose="020B0609020204030204" pitchFamily="49" charset="0"/>
-                <a:ea typeface="等线" panose="02010600030101010101" pitchFamily="2" charset="-122"/>
-                <a:cs typeface="Courier New" panose="02070309020205020404" pitchFamily="49" charset="0"/>
-              </a:rPr>
               <a:t>;</a:t>
             </a:r>
-            <a:endParaRPr lang="zh-CN" altLang="zh-CN" sz="2000" kern="100">
+            <a:endParaRPr lang="zh-CN" altLang="zh-CN" sz="1800" kern="100">
               <a:effectLst/>
               <a:latin typeface="等线" panose="02010600030101010101" pitchFamily="2" charset="-122"/>
               <a:ea typeface="等线" panose="02010600030101010101" pitchFamily="2" charset="-122"/>
@@ -17282,6 +17312,21 @@
           <a:p>
             <a:pPr algn="l"/>
             <a:r>
+              <a:rPr lang="en-US" altLang="zh-CN" sz="1800" b="1" kern="0">
+                <a:solidFill>
+                  <a:srgbClr val="000080"/>
+                </a:solidFill>
+                <a:effectLst/>
+                <a:highlight>
+                  <a:srgbClr val="FFFFFF"/>
+                </a:highlight>
+                <a:latin typeface="Consolas" panose="020B0609020204030204" pitchFamily="49" charset="0"/>
+                <a:ea typeface="等线" panose="02010600030101010101" pitchFamily="2" charset="-122"/>
+                <a:cs typeface="Courier New" panose="02070309020205020404" pitchFamily="49" charset="0"/>
+              </a:rPr>
+              <a:t>}</a:t>
+            </a:r>
+            <a:r>
               <a:rPr lang="en-US" altLang="zh-CN" sz="1800" kern="0">
                 <a:solidFill>
                   <a:srgbClr val="000000"/>
@@ -17294,9 +17339,24 @@
                 <a:ea typeface="等线" panose="02010600030101010101" pitchFamily="2" charset="-122"/>
                 <a:cs typeface="Courier New" panose="02070309020205020404" pitchFamily="49" charset="0"/>
               </a:rPr>
-              <a:t> </a:t>
-            </a:r>
-            <a:endParaRPr lang="zh-CN" altLang="zh-CN" sz="2000" kern="100">
+              <a:t> Fraction</a:t>
+            </a:r>
+            <a:r>
+              <a:rPr lang="en-US" altLang="zh-CN" sz="1800" b="1" kern="0">
+                <a:solidFill>
+                  <a:srgbClr val="000080"/>
+                </a:solidFill>
+                <a:effectLst/>
+                <a:highlight>
+                  <a:srgbClr val="FFFFFF"/>
+                </a:highlight>
+                <a:latin typeface="Consolas" panose="020B0609020204030204" pitchFamily="49" charset="0"/>
+                <a:ea typeface="等线" panose="02010600030101010101" pitchFamily="2" charset="-122"/>
+                <a:cs typeface="Courier New" panose="02070309020205020404" pitchFamily="49" charset="0"/>
+              </a:rPr>
+              <a:t>;</a:t>
+            </a:r>
+            <a:endParaRPr lang="zh-CN" altLang="zh-CN" sz="1800" kern="100">
               <a:effectLst/>
               <a:latin typeface="等线" panose="02010600030101010101" pitchFamily="2" charset="-122"/>
               <a:ea typeface="等线" panose="02010600030101010101" pitchFamily="2" charset="-122"/>
@@ -17308,21 +17368,6 @@
             <a:r>
               <a:rPr lang="en-US" altLang="zh-CN" sz="1800" kern="0">
                 <a:solidFill>
-                  <a:srgbClr val="8000FF"/>
-                </a:solidFill>
-                <a:effectLst/>
-                <a:highlight>
-                  <a:srgbClr val="FFFFFF"/>
-                </a:highlight>
-                <a:latin typeface="Consolas" panose="020B0609020204030204" pitchFamily="49" charset="0"/>
-                <a:ea typeface="等线" panose="02010600030101010101" pitchFamily="2" charset="-122"/>
-                <a:cs typeface="Courier New" panose="02070309020205020404" pitchFamily="49" charset="0"/>
-              </a:rPr>
-              <a:t>void</a:t>
-            </a:r>
-            <a:r>
-              <a:rPr lang="en-US" altLang="zh-CN" sz="1800" kern="0">
-                <a:solidFill>
                   <a:srgbClr val="000000"/>
                 </a:solidFill>
                 <a:effectLst/>
@@ -17333,114 +17378,9 @@
                 <a:ea typeface="等线" panose="02010600030101010101" pitchFamily="2" charset="-122"/>
                 <a:cs typeface="Courier New" panose="02070309020205020404" pitchFamily="49" charset="0"/>
               </a:rPr>
-              <a:t> reciprocal</a:t>
-            </a:r>
-            <a:r>
-              <a:rPr lang="en-US" altLang="zh-CN" sz="1800" b="1" kern="0">
-                <a:solidFill>
-                  <a:srgbClr val="000080"/>
-                </a:solidFill>
-                <a:effectLst/>
-                <a:highlight>
-                  <a:srgbClr val="FFFFFF"/>
-                </a:highlight>
-                <a:latin typeface="Consolas" panose="020B0609020204030204" pitchFamily="49" charset="0"/>
-                <a:ea typeface="等线" panose="02010600030101010101" pitchFamily="2" charset="-122"/>
-                <a:cs typeface="Courier New" panose="02070309020205020404" pitchFamily="49" charset="0"/>
-              </a:rPr>
-              <a:t>(</a:t>
-            </a:r>
-            <a:r>
-              <a:rPr lang="en-US" altLang="zh-CN" sz="1800" kern="0">
-                <a:solidFill>
-                  <a:srgbClr val="000000"/>
-                </a:solidFill>
-                <a:effectLst/>
-                <a:highlight>
-                  <a:srgbClr val="FFFFFF"/>
-                </a:highlight>
-                <a:latin typeface="Consolas" panose="020B0609020204030204" pitchFamily="49" charset="0"/>
-                <a:ea typeface="等线" panose="02010600030101010101" pitchFamily="2" charset="-122"/>
-                <a:cs typeface="Courier New" panose="02070309020205020404" pitchFamily="49" charset="0"/>
-              </a:rPr>
-              <a:t>Fraction </a:t>
-            </a:r>
-            <a:r>
-              <a:rPr lang="en-US" altLang="zh-CN" sz="1800" b="1" kern="0">
-                <a:solidFill>
-                  <a:srgbClr val="000080"/>
-                </a:solidFill>
-                <a:effectLst/>
-                <a:highlight>
-                  <a:srgbClr val="FFFFFF"/>
-                </a:highlight>
-                <a:latin typeface="Consolas" panose="020B0609020204030204" pitchFamily="49" charset="0"/>
-                <a:ea typeface="等线" panose="02010600030101010101" pitchFamily="2" charset="-122"/>
-                <a:cs typeface="Courier New" panose="02070309020205020404" pitchFamily="49" charset="0"/>
-              </a:rPr>
-              <a:t>*</a:t>
-            </a:r>
-            <a:r>
-              <a:rPr lang="en-US" altLang="zh-CN" sz="1800" kern="0">
-                <a:solidFill>
-                  <a:srgbClr val="000000"/>
-                </a:solidFill>
-                <a:effectLst/>
-                <a:highlight>
-                  <a:srgbClr val="FFFFFF"/>
-                </a:highlight>
-                <a:latin typeface="Consolas" panose="020B0609020204030204" pitchFamily="49" charset="0"/>
-                <a:ea typeface="等线" panose="02010600030101010101" pitchFamily="2" charset="-122"/>
-                <a:cs typeface="Courier New" panose="02070309020205020404" pitchFamily="49" charset="0"/>
-              </a:rPr>
-              <a:t>f</a:t>
-            </a:r>
-            <a:r>
-              <a:rPr lang="en-US" altLang="zh-CN" sz="1800" b="1" kern="0">
-                <a:solidFill>
-                  <a:srgbClr val="000080"/>
-                </a:solidFill>
-                <a:effectLst/>
-                <a:highlight>
-                  <a:srgbClr val="FFFFFF"/>
-                </a:highlight>
-                <a:latin typeface="Consolas" panose="020B0609020204030204" pitchFamily="49" charset="0"/>
-                <a:ea typeface="等线" panose="02010600030101010101" pitchFamily="2" charset="-122"/>
-                <a:cs typeface="Courier New" panose="02070309020205020404" pitchFamily="49" charset="0"/>
-              </a:rPr>
-              <a:t>)</a:t>
-            </a:r>
-            <a:r>
-              <a:rPr lang="en-US" altLang="zh-CN" sz="1800" kern="0">
-                <a:solidFill>
-                  <a:srgbClr val="000000"/>
-                </a:solidFill>
-                <a:effectLst/>
-                <a:highlight>
-                  <a:srgbClr val="FFFFFF"/>
-                </a:highlight>
-                <a:latin typeface="Consolas" panose="020B0609020204030204" pitchFamily="49" charset="0"/>
-                <a:ea typeface="等线" panose="02010600030101010101" pitchFamily="2" charset="-122"/>
-                <a:cs typeface="Courier New" panose="02070309020205020404" pitchFamily="49" charset="0"/>
-              </a:rPr>
-              <a:t> </a:t>
-            </a:r>
-            <a:r>
-              <a:rPr lang="en-US" altLang="zh-CN" sz="1800" b="1" kern="0">
-                <a:solidFill>
-                  <a:srgbClr val="000080"/>
-                </a:solidFill>
-                <a:effectLst/>
-                <a:highlight>
-                  <a:srgbClr val="FFFFFF"/>
-                </a:highlight>
-                <a:latin typeface="Consolas" panose="020B0609020204030204" pitchFamily="49" charset="0"/>
-                <a:ea typeface="等线" panose="02010600030101010101" pitchFamily="2" charset="-122"/>
-                <a:cs typeface="Courier New" panose="02070309020205020404" pitchFamily="49" charset="0"/>
-              </a:rPr>
-              <a:t>{</a:t>
-            </a:r>
-            <a:endParaRPr lang="zh-CN" altLang="zh-CN" sz="2000" kern="100">
+              <a:t> </a:t>
+            </a:r>
+            <a:endParaRPr lang="zh-CN" altLang="zh-CN" sz="1800" kern="100">
               <a:effectLst/>
               <a:latin typeface="等线" panose="02010600030101010101" pitchFamily="2" charset="-122"/>
               <a:ea typeface="等线" panose="02010600030101010101" pitchFamily="2" charset="-122"/>
@@ -17452,6 +17392,21 @@
             <a:r>
               <a:rPr lang="en-US" altLang="zh-CN" sz="1800" kern="0">
                 <a:solidFill>
+                  <a:srgbClr val="8000FF"/>
+                </a:solidFill>
+                <a:effectLst/>
+                <a:highlight>
+                  <a:srgbClr val="FFFFFF"/>
+                </a:highlight>
+                <a:latin typeface="Consolas" panose="020B0609020204030204" pitchFamily="49" charset="0"/>
+                <a:ea typeface="等线" panose="02010600030101010101" pitchFamily="2" charset="-122"/>
+                <a:cs typeface="Courier New" panose="02070309020205020404" pitchFamily="49" charset="0"/>
+              </a:rPr>
+              <a:t>void</a:t>
+            </a:r>
+            <a:r>
+              <a:rPr lang="en-US" altLang="zh-CN" sz="1800" kern="0">
+                <a:solidFill>
                   <a:srgbClr val="000000"/>
                 </a:solidFill>
                 <a:effectLst/>
@@ -17462,22 +17417,22 @@
                 <a:ea typeface="等线" panose="02010600030101010101" pitchFamily="2" charset="-122"/>
                 <a:cs typeface="Courier New" panose="02070309020205020404" pitchFamily="49" charset="0"/>
               </a:rPr>
-              <a:t>    </a:t>
+              <a:t> reciprocal</a:t>
             </a:r>
             <a:r>
               <a:rPr lang="en-US" altLang="zh-CN" sz="1800" b="1" kern="0">
                 <a:solidFill>
-                  <a:srgbClr val="0000FF"/>
-                </a:solidFill>
-                <a:effectLst/>
-                <a:highlight>
-                  <a:srgbClr val="FFFFFF"/>
-                </a:highlight>
-                <a:latin typeface="Consolas" panose="020B0609020204030204" pitchFamily="49" charset="0"/>
-                <a:ea typeface="等线" panose="02010600030101010101" pitchFamily="2" charset="-122"/>
-                <a:cs typeface="Courier New" panose="02070309020205020404" pitchFamily="49" charset="0"/>
-              </a:rPr>
-              <a:t>if</a:t>
+                  <a:srgbClr val="000080"/>
+                </a:solidFill>
+                <a:effectLst/>
+                <a:highlight>
+                  <a:srgbClr val="FFFFFF"/>
+                </a:highlight>
+                <a:latin typeface="Consolas" panose="020B0609020204030204" pitchFamily="49" charset="0"/>
+                <a:ea typeface="等线" panose="02010600030101010101" pitchFamily="2" charset="-122"/>
+                <a:cs typeface="Courier New" panose="02070309020205020404" pitchFamily="49" charset="0"/>
+              </a:rPr>
+              <a:t>(</a:t>
             </a:r>
             <a:r>
               <a:rPr lang="en-US" altLang="zh-CN" sz="1800" kern="0">
@@ -17492,6 +17447,66 @@
                 <a:ea typeface="等线" panose="02010600030101010101" pitchFamily="2" charset="-122"/>
                 <a:cs typeface="Courier New" panose="02070309020205020404" pitchFamily="49" charset="0"/>
               </a:rPr>
+              <a:t>Fraction </a:t>
+            </a:r>
+            <a:r>
+              <a:rPr lang="en-US" altLang="zh-CN" sz="1800" b="1" kern="0">
+                <a:solidFill>
+                  <a:srgbClr val="000080"/>
+                </a:solidFill>
+                <a:effectLst/>
+                <a:highlight>
+                  <a:srgbClr val="FFFFFF"/>
+                </a:highlight>
+                <a:latin typeface="Consolas" panose="020B0609020204030204" pitchFamily="49" charset="0"/>
+                <a:ea typeface="等线" panose="02010600030101010101" pitchFamily="2" charset="-122"/>
+                <a:cs typeface="Courier New" panose="02070309020205020404" pitchFamily="49" charset="0"/>
+              </a:rPr>
+              <a:t>*</a:t>
+            </a:r>
+            <a:r>
+              <a:rPr lang="en-US" altLang="zh-CN" sz="1800" kern="0">
+                <a:solidFill>
+                  <a:srgbClr val="000000"/>
+                </a:solidFill>
+                <a:effectLst/>
+                <a:highlight>
+                  <a:srgbClr val="FFFFFF"/>
+                </a:highlight>
+                <a:latin typeface="Consolas" panose="020B0609020204030204" pitchFamily="49" charset="0"/>
+                <a:ea typeface="等线" panose="02010600030101010101" pitchFamily="2" charset="-122"/>
+                <a:cs typeface="Courier New" panose="02070309020205020404" pitchFamily="49" charset="0"/>
+              </a:rPr>
+              <a:t>f</a:t>
+            </a:r>
+            <a:r>
+              <a:rPr lang="en-US" altLang="zh-CN" sz="1800" b="1" kern="0">
+                <a:solidFill>
+                  <a:srgbClr val="000080"/>
+                </a:solidFill>
+                <a:effectLst/>
+                <a:highlight>
+                  <a:srgbClr val="FFFFFF"/>
+                </a:highlight>
+                <a:latin typeface="Consolas" panose="020B0609020204030204" pitchFamily="49" charset="0"/>
+                <a:ea typeface="等线" panose="02010600030101010101" pitchFamily="2" charset="-122"/>
+                <a:cs typeface="Courier New" panose="02070309020205020404" pitchFamily="49" charset="0"/>
+              </a:rPr>
+              <a:t>)</a:t>
+            </a:r>
+            <a:r>
+              <a:rPr lang="en-US" altLang="zh-CN" sz="1800" kern="0">
+                <a:solidFill>
+                  <a:srgbClr val="000000"/>
+                </a:solidFill>
+                <a:effectLst/>
+                <a:highlight>
+                  <a:srgbClr val="FFFFFF"/>
+                </a:highlight>
+                <a:latin typeface="Consolas" panose="020B0609020204030204" pitchFamily="49" charset="0"/>
+                <a:ea typeface="等线" panose="02010600030101010101" pitchFamily="2" charset="-122"/>
+                <a:cs typeface="Courier New" panose="02070309020205020404" pitchFamily="49" charset="0"/>
+              </a:rPr>
               <a:t> </a:t>
             </a:r>
             <a:r>
@@ -17507,144 +17522,9 @@
                 <a:ea typeface="等线" panose="02010600030101010101" pitchFamily="2" charset="-122"/>
                 <a:cs typeface="Courier New" panose="02070309020205020404" pitchFamily="49" charset="0"/>
               </a:rPr>
-              <a:t>(</a:t>
-            </a:r>
-            <a:r>
-              <a:rPr lang="en-US" altLang="zh-CN" sz="1800" kern="0">
-                <a:solidFill>
-                  <a:srgbClr val="000000"/>
-                </a:solidFill>
-                <a:effectLst/>
-                <a:highlight>
-                  <a:srgbClr val="FFFFFF"/>
-                </a:highlight>
-                <a:latin typeface="Consolas" panose="020B0609020204030204" pitchFamily="49" charset="0"/>
-                <a:ea typeface="等线" panose="02010600030101010101" pitchFamily="2" charset="-122"/>
-                <a:cs typeface="Courier New" panose="02070309020205020404" pitchFamily="49" charset="0"/>
-              </a:rPr>
-              <a:t>f</a:t>
-            </a:r>
-            <a:r>
-              <a:rPr lang="en-US" altLang="zh-CN" sz="1800" b="1" kern="0">
-                <a:solidFill>
-                  <a:srgbClr val="000080"/>
-                </a:solidFill>
-                <a:effectLst/>
-                <a:highlight>
-                  <a:srgbClr val="FFFFFF"/>
-                </a:highlight>
-                <a:latin typeface="Consolas" panose="020B0609020204030204" pitchFamily="49" charset="0"/>
-                <a:ea typeface="等线" panose="02010600030101010101" pitchFamily="2" charset="-122"/>
-                <a:cs typeface="Courier New" panose="02070309020205020404" pitchFamily="49" charset="0"/>
-              </a:rPr>
-              <a:t>-&gt;</a:t>
-            </a:r>
-            <a:r>
-              <a:rPr lang="en-US" altLang="zh-CN" sz="1800" kern="0">
-                <a:solidFill>
-                  <a:srgbClr val="000000"/>
-                </a:solidFill>
-                <a:effectLst/>
-                <a:highlight>
-                  <a:srgbClr val="FFFFFF"/>
-                </a:highlight>
-                <a:latin typeface="Consolas" panose="020B0609020204030204" pitchFamily="49" charset="0"/>
-                <a:ea typeface="等线" panose="02010600030101010101" pitchFamily="2" charset="-122"/>
-                <a:cs typeface="Courier New" panose="02070309020205020404" pitchFamily="49" charset="0"/>
-              </a:rPr>
-              <a:t>numerator </a:t>
-            </a:r>
-            <a:r>
-              <a:rPr lang="en-US" altLang="zh-CN" sz="1800" b="1" kern="0">
-                <a:solidFill>
-                  <a:srgbClr val="000080"/>
-                </a:solidFill>
-                <a:effectLst/>
-                <a:highlight>
-                  <a:srgbClr val="FFFFFF"/>
-                </a:highlight>
-                <a:latin typeface="Consolas" panose="020B0609020204030204" pitchFamily="49" charset="0"/>
-                <a:ea typeface="等线" panose="02010600030101010101" pitchFamily="2" charset="-122"/>
-                <a:cs typeface="Courier New" panose="02070309020205020404" pitchFamily="49" charset="0"/>
-              </a:rPr>
-              <a:t>==</a:t>
-            </a:r>
-            <a:r>
-              <a:rPr lang="en-US" altLang="zh-CN" sz="1800" kern="0">
-                <a:solidFill>
-                  <a:srgbClr val="000000"/>
-                </a:solidFill>
-                <a:effectLst/>
-                <a:highlight>
-                  <a:srgbClr val="FFFFFF"/>
-                </a:highlight>
-                <a:latin typeface="Consolas" panose="020B0609020204030204" pitchFamily="49" charset="0"/>
-                <a:ea typeface="等线" panose="02010600030101010101" pitchFamily="2" charset="-122"/>
-                <a:cs typeface="Courier New" panose="02070309020205020404" pitchFamily="49" charset="0"/>
-              </a:rPr>
-              <a:t> </a:t>
-            </a:r>
-            <a:r>
-              <a:rPr lang="en-US" altLang="zh-CN" sz="1800" kern="0">
-                <a:solidFill>
-                  <a:srgbClr val="FF8000"/>
-                </a:solidFill>
-                <a:effectLst/>
-                <a:highlight>
-                  <a:srgbClr val="FFFFFF"/>
-                </a:highlight>
-                <a:latin typeface="Consolas" panose="020B0609020204030204" pitchFamily="49" charset="0"/>
-                <a:ea typeface="等线" panose="02010600030101010101" pitchFamily="2" charset="-122"/>
-                <a:cs typeface="Courier New" panose="02070309020205020404" pitchFamily="49" charset="0"/>
-              </a:rPr>
-              <a:t>0</a:t>
-            </a:r>
-            <a:r>
-              <a:rPr lang="en-US" altLang="zh-CN" sz="1800" b="1" kern="0">
-                <a:solidFill>
-                  <a:srgbClr val="000080"/>
-                </a:solidFill>
-                <a:effectLst/>
-                <a:highlight>
-                  <a:srgbClr val="FFFFFF"/>
-                </a:highlight>
-                <a:latin typeface="Consolas" panose="020B0609020204030204" pitchFamily="49" charset="0"/>
-                <a:ea typeface="等线" panose="02010600030101010101" pitchFamily="2" charset="-122"/>
-                <a:cs typeface="Courier New" panose="02070309020205020404" pitchFamily="49" charset="0"/>
-              </a:rPr>
-              <a:t>)</a:t>
-            </a:r>
-            <a:r>
-              <a:rPr lang="en-US" altLang="zh-CN" sz="1800" kern="0">
-                <a:solidFill>
-                  <a:srgbClr val="000000"/>
-                </a:solidFill>
-                <a:effectLst/>
-                <a:highlight>
-                  <a:srgbClr val="FFFFFF"/>
-                </a:highlight>
-                <a:latin typeface="Consolas" panose="020B0609020204030204" pitchFamily="49" charset="0"/>
-                <a:ea typeface="等线" panose="02010600030101010101" pitchFamily="2" charset="-122"/>
-                <a:cs typeface="Courier New" panose="02070309020205020404" pitchFamily="49" charset="0"/>
-              </a:rPr>
-              <a:t> </a:t>
-            </a:r>
-            <a:r>
-              <a:rPr lang="en-US" altLang="zh-CN" sz="1800" b="1" kern="0">
-                <a:solidFill>
-                  <a:srgbClr val="000080"/>
-                </a:solidFill>
-                <a:effectLst/>
-                <a:highlight>
-                  <a:srgbClr val="FFFFFF"/>
-                </a:highlight>
-                <a:latin typeface="Consolas" panose="020B0609020204030204" pitchFamily="49" charset="0"/>
-                <a:ea typeface="等线" panose="02010600030101010101" pitchFamily="2" charset="-122"/>
-                <a:cs typeface="Courier New" panose="02070309020205020404" pitchFamily="49" charset="0"/>
-              </a:rPr>
               <a:t>{</a:t>
             </a:r>
-            <a:endParaRPr lang="zh-CN" altLang="zh-CN" sz="2000" kern="100">
+            <a:endParaRPr lang="zh-CN" altLang="zh-CN" sz="1800" kern="100">
               <a:effectLst/>
               <a:latin typeface="等线" panose="02010600030101010101" pitchFamily="2" charset="-122"/>
               <a:ea typeface="等线" panose="02010600030101010101" pitchFamily="2" charset="-122"/>
@@ -17666,11 +17546,41 @@
                 <a:ea typeface="等线" panose="02010600030101010101" pitchFamily="2" charset="-122"/>
                 <a:cs typeface="Courier New" panose="02070309020205020404" pitchFamily="49" charset="0"/>
               </a:rPr>
-              <a:t>        fprintf</a:t>
+              <a:t>    </a:t>
             </a:r>
             <a:r>
               <a:rPr lang="en-US" altLang="zh-CN" sz="1800" b="1" kern="0">
                 <a:solidFill>
+                  <a:srgbClr val="0000FF"/>
+                </a:solidFill>
+                <a:effectLst/>
+                <a:highlight>
+                  <a:srgbClr val="FFFFFF"/>
+                </a:highlight>
+                <a:latin typeface="Consolas" panose="020B0609020204030204" pitchFamily="49" charset="0"/>
+                <a:ea typeface="等线" panose="02010600030101010101" pitchFamily="2" charset="-122"/>
+                <a:cs typeface="Courier New" panose="02070309020205020404" pitchFamily="49" charset="0"/>
+              </a:rPr>
+              <a:t>if</a:t>
+            </a:r>
+            <a:r>
+              <a:rPr lang="en-US" altLang="zh-CN" sz="1800" kern="0">
+                <a:solidFill>
+                  <a:srgbClr val="000000"/>
+                </a:solidFill>
+                <a:effectLst/>
+                <a:highlight>
+                  <a:srgbClr val="FFFFFF"/>
+                </a:highlight>
+                <a:latin typeface="Consolas" panose="020B0609020204030204" pitchFamily="49" charset="0"/>
+                <a:ea typeface="等线" panose="02010600030101010101" pitchFamily="2" charset="-122"/>
+                <a:cs typeface="Courier New" panose="02070309020205020404" pitchFamily="49" charset="0"/>
+              </a:rPr>
+              <a:t> </a:t>
+            </a:r>
+            <a:r>
+              <a:rPr lang="en-US" altLang="zh-CN" sz="1800" b="1" kern="0">
+                <a:solidFill>
                   <a:srgbClr val="000080"/>
                 </a:solidFill>
                 <a:effectLst/>
@@ -17696,7 +17606,7 @@
                 <a:ea typeface="等线" panose="02010600030101010101" pitchFamily="2" charset="-122"/>
                 <a:cs typeface="Courier New" panose="02070309020205020404" pitchFamily="49" charset="0"/>
               </a:rPr>
-              <a:t>stderr</a:t>
+              <a:t>f</a:t>
             </a:r>
             <a:r>
               <a:rPr lang="en-US" altLang="zh-CN" sz="1800" b="1" kern="0">
@@ -17711,7 +17621,7 @@
                 <a:ea typeface="等线" panose="02010600030101010101" pitchFamily="2" charset="-122"/>
                 <a:cs typeface="Courier New" panose="02070309020205020404" pitchFamily="49" charset="0"/>
               </a:rPr>
-              <a:t>,</a:t>
+              <a:t>-&gt;</a:t>
             </a:r>
             <a:r>
               <a:rPr lang="en-US" altLang="zh-CN" sz="1800" kern="0">
@@ -17726,22 +17636,52 @@
                 <a:ea typeface="等线" panose="02010600030101010101" pitchFamily="2" charset="-122"/>
                 <a:cs typeface="Courier New" panose="02070309020205020404" pitchFamily="49" charset="0"/>
               </a:rPr>
+              <a:t>numerator </a:t>
+            </a:r>
+            <a:r>
+              <a:rPr lang="en-US" altLang="zh-CN" sz="1800" b="1" kern="0">
+                <a:solidFill>
+                  <a:srgbClr val="000080"/>
+                </a:solidFill>
+                <a:effectLst/>
+                <a:highlight>
+                  <a:srgbClr val="FFFFFF"/>
+                </a:highlight>
+                <a:latin typeface="Consolas" panose="020B0609020204030204" pitchFamily="49" charset="0"/>
+                <a:ea typeface="等线" panose="02010600030101010101" pitchFamily="2" charset="-122"/>
+                <a:cs typeface="Courier New" panose="02070309020205020404" pitchFamily="49" charset="0"/>
+              </a:rPr>
+              <a:t>==</a:t>
+            </a:r>
+            <a:r>
+              <a:rPr lang="en-US" altLang="zh-CN" sz="1800" kern="0">
+                <a:solidFill>
+                  <a:srgbClr val="000000"/>
+                </a:solidFill>
+                <a:effectLst/>
+                <a:highlight>
+                  <a:srgbClr val="FFFFFF"/>
+                </a:highlight>
+                <a:latin typeface="Consolas" panose="020B0609020204030204" pitchFamily="49" charset="0"/>
+                <a:ea typeface="等线" panose="02010600030101010101" pitchFamily="2" charset="-122"/>
+                <a:cs typeface="Courier New" panose="02070309020205020404" pitchFamily="49" charset="0"/>
+              </a:rPr>
               <a:t> </a:t>
             </a:r>
             <a:r>
               <a:rPr lang="en-US" altLang="zh-CN" sz="1800" kern="0">
                 <a:solidFill>
-                  <a:srgbClr val="808080"/>
-                </a:solidFill>
-                <a:effectLst/>
-                <a:highlight>
-                  <a:srgbClr val="FFFFFF"/>
-                </a:highlight>
-                <a:latin typeface="Consolas" panose="020B0609020204030204" pitchFamily="49" charset="0"/>
-                <a:ea typeface="等线" panose="02010600030101010101" pitchFamily="2" charset="-122"/>
-                <a:cs typeface="Courier New" panose="02070309020205020404" pitchFamily="49" charset="0"/>
-              </a:rPr>
-              <a:t>"Error: Denominator cannot be zero.\n"</a:t>
+                  <a:srgbClr val="FF8000"/>
+                </a:solidFill>
+                <a:effectLst/>
+                <a:highlight>
+                  <a:srgbClr val="FFFFFF"/>
+                </a:highlight>
+                <a:latin typeface="Consolas" panose="020B0609020204030204" pitchFamily="49" charset="0"/>
+                <a:ea typeface="等线" panose="02010600030101010101" pitchFamily="2" charset="-122"/>
+                <a:cs typeface="Courier New" panose="02070309020205020404" pitchFamily="49" charset="0"/>
+              </a:rPr>
+              <a:t>0</a:t>
             </a:r>
             <a:r>
               <a:rPr lang="en-US" altLang="zh-CN" sz="1800" b="1" kern="0">
@@ -17756,9 +17696,39 @@
                 <a:ea typeface="等线" panose="02010600030101010101" pitchFamily="2" charset="-122"/>
                 <a:cs typeface="Courier New" panose="02070309020205020404" pitchFamily="49" charset="0"/>
               </a:rPr>
-              <a:t>);</a:t>
-            </a:r>
-            <a:endParaRPr lang="zh-CN" altLang="zh-CN" sz="2000" kern="100">
+              <a:t>)</a:t>
+            </a:r>
+            <a:r>
+              <a:rPr lang="en-US" altLang="zh-CN" sz="1800" kern="0">
+                <a:solidFill>
+                  <a:srgbClr val="000000"/>
+                </a:solidFill>
+                <a:effectLst/>
+                <a:highlight>
+                  <a:srgbClr val="FFFFFF"/>
+                </a:highlight>
+                <a:latin typeface="Consolas" panose="020B0609020204030204" pitchFamily="49" charset="0"/>
+                <a:ea typeface="等线" panose="02010600030101010101" pitchFamily="2" charset="-122"/>
+                <a:cs typeface="Courier New" panose="02070309020205020404" pitchFamily="49" charset="0"/>
+              </a:rPr>
+              <a:t> </a:t>
+            </a:r>
+            <a:r>
+              <a:rPr lang="en-US" altLang="zh-CN" sz="1800" b="1" kern="0">
+                <a:solidFill>
+                  <a:srgbClr val="000080"/>
+                </a:solidFill>
+                <a:effectLst/>
+                <a:highlight>
+                  <a:srgbClr val="FFFFFF"/>
+                </a:highlight>
+                <a:latin typeface="Consolas" panose="020B0609020204030204" pitchFamily="49" charset="0"/>
+                <a:ea typeface="等线" panose="02010600030101010101" pitchFamily="2" charset="-122"/>
+                <a:cs typeface="Courier New" panose="02070309020205020404" pitchFamily="49" charset="0"/>
+              </a:rPr>
+              <a:t>{</a:t>
+            </a:r>
+            <a:endParaRPr lang="zh-CN" altLang="zh-CN" sz="1800" kern="100">
               <a:effectLst/>
               <a:latin typeface="等线" panose="02010600030101010101" pitchFamily="2" charset="-122"/>
               <a:ea typeface="等线" panose="02010600030101010101" pitchFamily="2" charset="-122"/>
@@ -17780,7 +17750,7 @@
                 <a:ea typeface="等线" panose="02010600030101010101" pitchFamily="2" charset="-122"/>
                 <a:cs typeface="Courier New" panose="02070309020205020404" pitchFamily="49" charset="0"/>
               </a:rPr>
-              <a:t>        exit</a:t>
+              <a:t>        cerr </a:t>
             </a:r>
             <a:r>
               <a:rPr lang="en-US" altLang="zh-CN" sz="1800" b="1" kern="0">
@@ -17795,22 +17765,52 @@
                 <a:ea typeface="等线" panose="02010600030101010101" pitchFamily="2" charset="-122"/>
                 <a:cs typeface="Courier New" panose="02070309020205020404" pitchFamily="49" charset="0"/>
               </a:rPr>
-              <a:t>(</a:t>
+              <a:t>&lt;&lt;</a:t>
             </a:r>
             <a:r>
               <a:rPr lang="en-US" altLang="zh-CN" sz="1800" kern="0">
                 <a:solidFill>
-                  <a:srgbClr val="FF8000"/>
-                </a:solidFill>
-                <a:effectLst/>
-                <a:highlight>
-                  <a:srgbClr val="FFFFFF"/>
-                </a:highlight>
-                <a:latin typeface="Consolas" panose="020B0609020204030204" pitchFamily="49" charset="0"/>
-                <a:ea typeface="等线" panose="02010600030101010101" pitchFamily="2" charset="-122"/>
-                <a:cs typeface="Courier New" panose="02070309020205020404" pitchFamily="49" charset="0"/>
-              </a:rPr>
-              <a:t>1</a:t>
+                  <a:srgbClr val="000000"/>
+                </a:solidFill>
+                <a:effectLst/>
+                <a:highlight>
+                  <a:srgbClr val="FFFFFF"/>
+                </a:highlight>
+                <a:latin typeface="Consolas" panose="020B0609020204030204" pitchFamily="49" charset="0"/>
+                <a:ea typeface="等线" panose="02010600030101010101" pitchFamily="2" charset="-122"/>
+                <a:cs typeface="Courier New" panose="02070309020205020404" pitchFamily="49" charset="0"/>
+              </a:rPr>
+              <a:t> </a:t>
+            </a:r>
+            <a:r>
+              <a:rPr lang="en-US" altLang="zh-CN" sz="1800" kern="0">
+                <a:solidFill>
+                  <a:srgbClr val="808080"/>
+                </a:solidFill>
+                <a:effectLst/>
+                <a:highlight>
+                  <a:srgbClr val="FFFFFF"/>
+                </a:highlight>
+                <a:latin typeface="Consolas" panose="020B0609020204030204" pitchFamily="49" charset="0"/>
+                <a:ea typeface="等线" panose="02010600030101010101" pitchFamily="2" charset="-122"/>
+                <a:cs typeface="Courier New" panose="02070309020205020404" pitchFamily="49" charset="0"/>
+              </a:rPr>
+              <a:t>"Error: Denominator cannot be zero."</a:t>
+            </a:r>
+            <a:r>
+              <a:rPr lang="en-US" altLang="zh-CN" sz="1800" kern="0">
+                <a:solidFill>
+                  <a:srgbClr val="000000"/>
+                </a:solidFill>
+                <a:effectLst/>
+                <a:highlight>
+                  <a:srgbClr val="FFFFFF"/>
+                </a:highlight>
+                <a:latin typeface="Consolas" panose="020B0609020204030204" pitchFamily="49" charset="0"/>
+                <a:ea typeface="等线" panose="02010600030101010101" pitchFamily="2" charset="-122"/>
+                <a:cs typeface="Courier New" panose="02070309020205020404" pitchFamily="49" charset="0"/>
+              </a:rPr>
+              <a:t> </a:t>
             </a:r>
             <a:r>
               <a:rPr lang="en-US" altLang="zh-CN" sz="1800" b="1" kern="0">
@@ -17825,9 +17825,39 @@
                 <a:ea typeface="等线" panose="02010600030101010101" pitchFamily="2" charset="-122"/>
                 <a:cs typeface="Courier New" panose="02070309020205020404" pitchFamily="49" charset="0"/>
               </a:rPr>
-              <a:t>);</a:t>
-            </a:r>
-            <a:endParaRPr lang="zh-CN" altLang="zh-CN" sz="2000" kern="100">
+              <a:t>&lt;&lt;</a:t>
+            </a:r>
+            <a:r>
+              <a:rPr lang="en-US" altLang="zh-CN" sz="1800" kern="0">
+                <a:solidFill>
+                  <a:srgbClr val="000000"/>
+                </a:solidFill>
+                <a:effectLst/>
+                <a:highlight>
+                  <a:srgbClr val="FFFFFF"/>
+                </a:highlight>
+                <a:latin typeface="Consolas" panose="020B0609020204030204" pitchFamily="49" charset="0"/>
+                <a:ea typeface="等线" panose="02010600030101010101" pitchFamily="2" charset="-122"/>
+                <a:cs typeface="Courier New" panose="02070309020205020404" pitchFamily="49" charset="0"/>
+              </a:rPr>
+              <a:t> endl</a:t>
+            </a:r>
+            <a:r>
+              <a:rPr lang="en-US" altLang="zh-CN" sz="1800" b="1" kern="0">
+                <a:solidFill>
+                  <a:srgbClr val="000080"/>
+                </a:solidFill>
+                <a:effectLst/>
+                <a:highlight>
+                  <a:srgbClr val="FFFFFF"/>
+                </a:highlight>
+                <a:latin typeface="Consolas" panose="020B0609020204030204" pitchFamily="49" charset="0"/>
+                <a:ea typeface="等线" panose="02010600030101010101" pitchFamily="2" charset="-122"/>
+                <a:cs typeface="Courier New" panose="02070309020205020404" pitchFamily="49" charset="0"/>
+              </a:rPr>
+              <a:t>;</a:t>
+            </a:r>
+            <a:endParaRPr lang="zh-CN" altLang="zh-CN" sz="1800" kern="100">
               <a:effectLst/>
               <a:latin typeface="等线" panose="02010600030101010101" pitchFamily="2" charset="-122"/>
               <a:ea typeface="等线" panose="02010600030101010101" pitchFamily="2" charset="-122"/>
@@ -17849,7 +17879,7 @@
                 <a:ea typeface="等线" panose="02010600030101010101" pitchFamily="2" charset="-122"/>
                 <a:cs typeface="Courier New" panose="02070309020205020404" pitchFamily="49" charset="0"/>
               </a:rPr>
-              <a:t>    </a:t>
+              <a:t>        exit</a:t>
             </a:r>
             <a:r>
               <a:rPr lang="en-US" altLang="zh-CN" sz="1800" b="1" kern="0">
@@ -17864,56 +17894,26 @@
                 <a:ea typeface="等线" panose="02010600030101010101" pitchFamily="2" charset="-122"/>
                 <a:cs typeface="Courier New" panose="02070309020205020404" pitchFamily="49" charset="0"/>
               </a:rPr>
-              <a:t>}</a:t>
+              <a:t>(</a:t>
             </a:r>
             <a:r>
               <a:rPr lang="en-US" altLang="zh-CN" sz="1800" kern="0">
                 <a:solidFill>
-                  <a:srgbClr val="000000"/>
-                </a:solidFill>
-                <a:effectLst/>
-                <a:highlight>
-                  <a:srgbClr val="FFFFFF"/>
-                </a:highlight>
-                <a:latin typeface="Consolas" panose="020B0609020204030204" pitchFamily="49" charset="0"/>
-                <a:ea typeface="等线" panose="02010600030101010101" pitchFamily="2" charset="-122"/>
-                <a:cs typeface="Courier New" panose="02070309020205020404" pitchFamily="49" charset="0"/>
-              </a:rPr>
-              <a:t> </a:t>
+                  <a:srgbClr val="FF8000"/>
+                </a:solidFill>
+                <a:effectLst/>
+                <a:highlight>
+                  <a:srgbClr val="FFFFFF"/>
+                </a:highlight>
+                <a:latin typeface="Consolas" panose="020B0609020204030204" pitchFamily="49" charset="0"/>
+                <a:ea typeface="等线" panose="02010600030101010101" pitchFamily="2" charset="-122"/>
+                <a:cs typeface="Courier New" panose="02070309020205020404" pitchFamily="49" charset="0"/>
+              </a:rPr>
+              <a:t>1</a:t>
             </a:r>
             <a:r>
               <a:rPr lang="en-US" altLang="zh-CN" sz="1800" b="1" kern="0">
                 <a:solidFill>
-                  <a:srgbClr val="0000FF"/>
-                </a:solidFill>
-                <a:effectLst/>
-                <a:highlight>
-                  <a:srgbClr val="FFFFFF"/>
-                </a:highlight>
-                <a:latin typeface="Consolas" panose="020B0609020204030204" pitchFamily="49" charset="0"/>
-                <a:ea typeface="等线" panose="02010600030101010101" pitchFamily="2" charset="-122"/>
-                <a:cs typeface="Courier New" panose="02070309020205020404" pitchFamily="49" charset="0"/>
-              </a:rPr>
-              <a:t>else</a:t>
-            </a:r>
-            <a:r>
-              <a:rPr lang="en-US" altLang="zh-CN" sz="1800" kern="0">
-                <a:solidFill>
-                  <a:srgbClr val="000000"/>
-                </a:solidFill>
-                <a:effectLst/>
-                <a:highlight>
-                  <a:srgbClr val="FFFFFF"/>
-                </a:highlight>
-                <a:latin typeface="Consolas" panose="020B0609020204030204" pitchFamily="49" charset="0"/>
-                <a:ea typeface="等线" panose="02010600030101010101" pitchFamily="2" charset="-122"/>
-                <a:cs typeface="Courier New" panose="02070309020205020404" pitchFamily="49" charset="0"/>
-              </a:rPr>
-              <a:t> </a:t>
-            </a:r>
-            <a:r>
-              <a:rPr lang="en-US" altLang="zh-CN" sz="1800" b="1" kern="0">
-                <a:solidFill>
                   <a:srgbClr val="000080"/>
                 </a:solidFill>
                 <a:effectLst/>
@@ -17924,9 +17924,9 @@
                 <a:ea typeface="等线" panose="02010600030101010101" pitchFamily="2" charset="-122"/>
                 <a:cs typeface="Courier New" panose="02070309020205020404" pitchFamily="49" charset="0"/>
               </a:rPr>
-              <a:t>{</a:t>
-            </a:r>
-            <a:endParaRPr lang="zh-CN" altLang="zh-CN" sz="2000" kern="100">
+              <a:t>);</a:t>
+            </a:r>
+            <a:endParaRPr lang="zh-CN" altLang="zh-CN" sz="1800" kern="100">
               <a:effectLst/>
               <a:latin typeface="等线" panose="02010600030101010101" pitchFamily="2" charset="-122"/>
               <a:ea typeface="等线" panose="02010600030101010101" pitchFamily="2" charset="-122"/>
@@ -17948,22 +17948,52 @@
                 <a:ea typeface="等线" panose="02010600030101010101" pitchFamily="2" charset="-122"/>
                 <a:cs typeface="Courier New" panose="02070309020205020404" pitchFamily="49" charset="0"/>
               </a:rPr>
-              <a:t>        </a:t>
+              <a:t>    </a:t>
+            </a:r>
+            <a:r>
+              <a:rPr lang="en-US" altLang="zh-CN" sz="1800" b="1" kern="0">
+                <a:solidFill>
+                  <a:srgbClr val="000080"/>
+                </a:solidFill>
+                <a:effectLst/>
+                <a:highlight>
+                  <a:srgbClr val="FFFFFF"/>
+                </a:highlight>
+                <a:latin typeface="Consolas" panose="020B0609020204030204" pitchFamily="49" charset="0"/>
+                <a:ea typeface="等线" panose="02010600030101010101" pitchFamily="2" charset="-122"/>
+                <a:cs typeface="Courier New" panose="02070309020205020404" pitchFamily="49" charset="0"/>
+              </a:rPr>
+              <a:t>}</a:t>
             </a:r>
             <a:r>
               <a:rPr lang="en-US" altLang="zh-CN" sz="1800" kern="0">
                 <a:solidFill>
-                  <a:srgbClr val="8000FF"/>
-                </a:solidFill>
-                <a:effectLst/>
-                <a:highlight>
-                  <a:srgbClr val="FFFFFF"/>
-                </a:highlight>
-                <a:latin typeface="Consolas" panose="020B0609020204030204" pitchFamily="49" charset="0"/>
-                <a:ea typeface="等线" panose="02010600030101010101" pitchFamily="2" charset="-122"/>
-                <a:cs typeface="Courier New" panose="02070309020205020404" pitchFamily="49" charset="0"/>
-              </a:rPr>
-              <a:t>int</a:t>
+                  <a:srgbClr val="000000"/>
+                </a:solidFill>
+                <a:effectLst/>
+                <a:highlight>
+                  <a:srgbClr val="FFFFFF"/>
+                </a:highlight>
+                <a:latin typeface="Consolas" panose="020B0609020204030204" pitchFamily="49" charset="0"/>
+                <a:ea typeface="等线" panose="02010600030101010101" pitchFamily="2" charset="-122"/>
+                <a:cs typeface="Courier New" panose="02070309020205020404" pitchFamily="49" charset="0"/>
+              </a:rPr>
+              <a:t> </a:t>
+            </a:r>
+            <a:r>
+              <a:rPr lang="en-US" altLang="zh-CN" sz="1800" b="1" kern="0">
+                <a:solidFill>
+                  <a:srgbClr val="0000FF"/>
+                </a:solidFill>
+                <a:effectLst/>
+                <a:highlight>
+                  <a:srgbClr val="FFFFFF"/>
+                </a:highlight>
+                <a:latin typeface="Consolas" panose="020B0609020204030204" pitchFamily="49" charset="0"/>
+                <a:ea typeface="等线" panose="02010600030101010101" pitchFamily="2" charset="-122"/>
+                <a:cs typeface="Courier New" panose="02070309020205020404" pitchFamily="49" charset="0"/>
+              </a:rPr>
+              <a:t>else</a:t>
             </a:r>
             <a:r>
               <a:rPr lang="en-US" altLang="zh-CN" sz="1800" kern="0">
@@ -17978,7 +18008,7 @@
                 <a:ea typeface="等线" panose="02010600030101010101" pitchFamily="2" charset="-122"/>
                 <a:cs typeface="Courier New" panose="02070309020205020404" pitchFamily="49" charset="0"/>
               </a:rPr>
-              <a:t> temp </a:t>
+              <a:t> </a:t>
             </a:r>
             <a:r>
               <a:rPr lang="en-US" altLang="zh-CN" sz="1800" b="1" kern="0">
@@ -17993,69 +18023,9 @@
                 <a:ea typeface="等线" panose="02010600030101010101" pitchFamily="2" charset="-122"/>
                 <a:cs typeface="Courier New" panose="02070309020205020404" pitchFamily="49" charset="0"/>
               </a:rPr>
-              <a:t>=</a:t>
-            </a:r>
-            <a:r>
-              <a:rPr lang="en-US" altLang="zh-CN" sz="1800" kern="0">
-                <a:solidFill>
-                  <a:srgbClr val="000000"/>
-                </a:solidFill>
-                <a:effectLst/>
-                <a:highlight>
-                  <a:srgbClr val="FFFFFF"/>
-                </a:highlight>
-                <a:latin typeface="Consolas" panose="020B0609020204030204" pitchFamily="49" charset="0"/>
-                <a:ea typeface="等线" panose="02010600030101010101" pitchFamily="2" charset="-122"/>
-                <a:cs typeface="Courier New" panose="02070309020205020404" pitchFamily="49" charset="0"/>
-              </a:rPr>
-              <a:t> f</a:t>
-            </a:r>
-            <a:r>
-              <a:rPr lang="en-US" altLang="zh-CN" sz="1800" b="1" kern="0">
-                <a:solidFill>
-                  <a:srgbClr val="000080"/>
-                </a:solidFill>
-                <a:effectLst/>
-                <a:highlight>
-                  <a:srgbClr val="FFFFFF"/>
-                </a:highlight>
-                <a:latin typeface="Consolas" panose="020B0609020204030204" pitchFamily="49" charset="0"/>
-                <a:ea typeface="等线" panose="02010600030101010101" pitchFamily="2" charset="-122"/>
-                <a:cs typeface="Courier New" panose="02070309020205020404" pitchFamily="49" charset="0"/>
-              </a:rPr>
-              <a:t>-&gt;</a:t>
-            </a:r>
-            <a:r>
-              <a:rPr lang="en-US" altLang="zh-CN" sz="1800" kern="0">
-                <a:solidFill>
-                  <a:srgbClr val="000000"/>
-                </a:solidFill>
-                <a:effectLst/>
-                <a:highlight>
-                  <a:srgbClr val="FFFFFF"/>
-                </a:highlight>
-                <a:latin typeface="Consolas" panose="020B0609020204030204" pitchFamily="49" charset="0"/>
-                <a:ea typeface="等线" panose="02010600030101010101" pitchFamily="2" charset="-122"/>
-                <a:cs typeface="Courier New" panose="02070309020205020404" pitchFamily="49" charset="0"/>
-              </a:rPr>
-              <a:t>numerator</a:t>
-            </a:r>
-            <a:r>
-              <a:rPr lang="en-US" altLang="zh-CN" sz="1800" b="1" kern="0">
-                <a:solidFill>
-                  <a:srgbClr val="000080"/>
-                </a:solidFill>
-                <a:effectLst/>
-                <a:highlight>
-                  <a:srgbClr val="FFFFFF"/>
-                </a:highlight>
-                <a:latin typeface="Consolas" panose="020B0609020204030204" pitchFamily="49" charset="0"/>
-                <a:ea typeface="等线" panose="02010600030101010101" pitchFamily="2" charset="-122"/>
-                <a:cs typeface="Courier New" panose="02070309020205020404" pitchFamily="49" charset="0"/>
-              </a:rPr>
-              <a:t>;</a:t>
-            </a:r>
-            <a:endParaRPr lang="zh-CN" altLang="zh-CN" sz="2000" kern="100">
+              <a:t>{</a:t>
+            </a:r>
+            <a:endParaRPr lang="zh-CN" altLang="zh-CN" sz="1800" kern="100">
               <a:effectLst/>
               <a:latin typeface="等线" panose="02010600030101010101" pitchFamily="2" charset="-122"/>
               <a:ea typeface="等线" panose="02010600030101010101" pitchFamily="2" charset="-122"/>
@@ -18077,7 +18047,37 @@
                 <a:ea typeface="等线" panose="02010600030101010101" pitchFamily="2" charset="-122"/>
                 <a:cs typeface="Courier New" panose="02070309020205020404" pitchFamily="49" charset="0"/>
               </a:rPr>
-              <a:t>        f</a:t>
+              <a:t>        </a:t>
+            </a:r>
+            <a:r>
+              <a:rPr lang="en-US" altLang="zh-CN" sz="1800" kern="0">
+                <a:solidFill>
+                  <a:srgbClr val="8000FF"/>
+                </a:solidFill>
+                <a:effectLst/>
+                <a:highlight>
+                  <a:srgbClr val="FFFFFF"/>
+                </a:highlight>
+                <a:latin typeface="Consolas" panose="020B0609020204030204" pitchFamily="49" charset="0"/>
+                <a:ea typeface="等线" panose="02010600030101010101" pitchFamily="2" charset="-122"/>
+                <a:cs typeface="Courier New" panose="02070309020205020404" pitchFamily="49" charset="0"/>
+              </a:rPr>
+              <a:t>int</a:t>
+            </a:r>
+            <a:r>
+              <a:rPr lang="en-US" altLang="zh-CN" sz="1800" kern="0">
+                <a:solidFill>
+                  <a:srgbClr val="000000"/>
+                </a:solidFill>
+                <a:effectLst/>
+                <a:highlight>
+                  <a:srgbClr val="FFFFFF"/>
+                </a:highlight>
+                <a:latin typeface="Consolas" panose="020B0609020204030204" pitchFamily="49" charset="0"/>
+                <a:ea typeface="等线" panose="02010600030101010101" pitchFamily="2" charset="-122"/>
+                <a:cs typeface="Courier New" panose="02070309020205020404" pitchFamily="49" charset="0"/>
+              </a:rPr>
+              <a:t> temp </a:t>
             </a:r>
             <a:r>
               <a:rPr lang="en-US" altLang="zh-CN" sz="1800" b="1" kern="0">
@@ -18092,6 +18092,36 @@
                 <a:ea typeface="等线" panose="02010600030101010101" pitchFamily="2" charset="-122"/>
                 <a:cs typeface="Courier New" panose="02070309020205020404" pitchFamily="49" charset="0"/>
               </a:rPr>
+              <a:t>=</a:t>
+            </a:r>
+            <a:r>
+              <a:rPr lang="en-US" altLang="zh-CN" sz="1800" kern="0">
+                <a:solidFill>
+                  <a:srgbClr val="000000"/>
+                </a:solidFill>
+                <a:effectLst/>
+                <a:highlight>
+                  <a:srgbClr val="FFFFFF"/>
+                </a:highlight>
+                <a:latin typeface="Consolas" panose="020B0609020204030204" pitchFamily="49" charset="0"/>
+                <a:ea typeface="等线" panose="02010600030101010101" pitchFamily="2" charset="-122"/>
+                <a:cs typeface="Courier New" panose="02070309020205020404" pitchFamily="49" charset="0"/>
+              </a:rPr>
+              <a:t> f</a:t>
+            </a:r>
+            <a:r>
+              <a:rPr lang="en-US" altLang="zh-CN" sz="1800" b="1" kern="0">
+                <a:solidFill>
+                  <a:srgbClr val="000080"/>
+                </a:solidFill>
+                <a:effectLst/>
+                <a:highlight>
+                  <a:srgbClr val="FFFFFF"/>
+                </a:highlight>
+                <a:latin typeface="Consolas" panose="020B0609020204030204" pitchFamily="49" charset="0"/>
+                <a:ea typeface="等线" panose="02010600030101010101" pitchFamily="2" charset="-122"/>
+                <a:cs typeface="Courier New" panose="02070309020205020404" pitchFamily="49" charset="0"/>
+              </a:rPr>
               <a:t>-&gt;</a:t>
             </a:r>
             <a:r>
@@ -18107,7 +18137,7 @@
                 <a:ea typeface="等线" panose="02010600030101010101" pitchFamily="2" charset="-122"/>
                 <a:cs typeface="Courier New" panose="02070309020205020404" pitchFamily="49" charset="0"/>
               </a:rPr>
-              <a:t>numerator </a:t>
+              <a:t>numerator</a:t>
             </a:r>
             <a:r>
               <a:rPr lang="en-US" altLang="zh-CN" sz="1800" b="1" kern="0">
@@ -18122,69 +18152,9 @@
                 <a:ea typeface="等线" panose="02010600030101010101" pitchFamily="2" charset="-122"/>
                 <a:cs typeface="Courier New" panose="02070309020205020404" pitchFamily="49" charset="0"/>
               </a:rPr>
-              <a:t>=</a:t>
-            </a:r>
-            <a:r>
-              <a:rPr lang="en-US" altLang="zh-CN" sz="1800" kern="0">
-                <a:solidFill>
-                  <a:srgbClr val="000000"/>
-                </a:solidFill>
-                <a:effectLst/>
-                <a:highlight>
-                  <a:srgbClr val="FFFFFF"/>
-                </a:highlight>
-                <a:latin typeface="Consolas" panose="020B0609020204030204" pitchFamily="49" charset="0"/>
-                <a:ea typeface="等线" panose="02010600030101010101" pitchFamily="2" charset="-122"/>
-                <a:cs typeface="Courier New" panose="02070309020205020404" pitchFamily="49" charset="0"/>
-              </a:rPr>
-              <a:t> f</a:t>
-            </a:r>
-            <a:r>
-              <a:rPr lang="en-US" altLang="zh-CN" sz="1800" b="1" kern="0">
-                <a:solidFill>
-                  <a:srgbClr val="000080"/>
-                </a:solidFill>
-                <a:effectLst/>
-                <a:highlight>
-                  <a:srgbClr val="FFFFFF"/>
-                </a:highlight>
-                <a:latin typeface="Consolas" panose="020B0609020204030204" pitchFamily="49" charset="0"/>
-                <a:ea typeface="等线" panose="02010600030101010101" pitchFamily="2" charset="-122"/>
-                <a:cs typeface="Courier New" panose="02070309020205020404" pitchFamily="49" charset="0"/>
-              </a:rPr>
-              <a:t>-&gt;</a:t>
-            </a:r>
-            <a:r>
-              <a:rPr lang="en-US" altLang="zh-CN" sz="1800" kern="0">
-                <a:solidFill>
-                  <a:srgbClr val="000000"/>
-                </a:solidFill>
-                <a:effectLst/>
-                <a:highlight>
-                  <a:srgbClr val="FFFFFF"/>
-                </a:highlight>
-                <a:latin typeface="Consolas" panose="020B0609020204030204" pitchFamily="49" charset="0"/>
-                <a:ea typeface="等线" panose="02010600030101010101" pitchFamily="2" charset="-122"/>
-                <a:cs typeface="Courier New" panose="02070309020205020404" pitchFamily="49" charset="0"/>
-              </a:rPr>
-              <a:t>denominator</a:t>
-            </a:r>
-            <a:r>
-              <a:rPr lang="en-US" altLang="zh-CN" sz="1800" b="1" kern="0">
-                <a:solidFill>
-                  <a:srgbClr val="000080"/>
-                </a:solidFill>
-                <a:effectLst/>
-                <a:highlight>
-                  <a:srgbClr val="FFFFFF"/>
-                </a:highlight>
-                <a:latin typeface="Consolas" panose="020B0609020204030204" pitchFamily="49" charset="0"/>
-                <a:ea typeface="等线" panose="02010600030101010101" pitchFamily="2" charset="-122"/>
-                <a:cs typeface="Courier New" panose="02070309020205020404" pitchFamily="49" charset="0"/>
-              </a:rPr>
               <a:t>;</a:t>
             </a:r>
-            <a:endParaRPr lang="zh-CN" altLang="zh-CN" sz="2000" kern="100">
+            <a:endParaRPr lang="zh-CN" altLang="zh-CN" sz="1800" kern="100">
               <a:effectLst/>
               <a:latin typeface="等线" panose="02010600030101010101" pitchFamily="2" charset="-122"/>
               <a:ea typeface="等线" panose="02010600030101010101" pitchFamily="2" charset="-122"/>
@@ -18236,7 +18206,7 @@
                 <a:ea typeface="等线" panose="02010600030101010101" pitchFamily="2" charset="-122"/>
                 <a:cs typeface="Courier New" panose="02070309020205020404" pitchFamily="49" charset="0"/>
               </a:rPr>
-              <a:t>denominator </a:t>
+              <a:t>numerator </a:t>
             </a:r>
             <a:r>
               <a:rPr lang="en-US" altLang="zh-CN" sz="1800" b="1" kern="0">
@@ -18266,7 +18236,7 @@
                 <a:ea typeface="等线" panose="02010600030101010101" pitchFamily="2" charset="-122"/>
                 <a:cs typeface="Courier New" panose="02070309020205020404" pitchFamily="49" charset="0"/>
               </a:rPr>
-              <a:t> temp</a:t>
+              <a:t> f</a:t>
             </a:r>
             <a:r>
               <a:rPr lang="en-US" altLang="zh-CN" sz="1800" b="1" kern="0">
@@ -18281,9 +18251,39 @@
                 <a:ea typeface="等线" panose="02010600030101010101" pitchFamily="2" charset="-122"/>
                 <a:cs typeface="Courier New" panose="02070309020205020404" pitchFamily="49" charset="0"/>
               </a:rPr>
+              <a:t>-&gt;</a:t>
+            </a:r>
+            <a:r>
+              <a:rPr lang="en-US" altLang="zh-CN" sz="1800" kern="0">
+                <a:solidFill>
+                  <a:srgbClr val="000000"/>
+                </a:solidFill>
+                <a:effectLst/>
+                <a:highlight>
+                  <a:srgbClr val="FFFFFF"/>
+                </a:highlight>
+                <a:latin typeface="Consolas" panose="020B0609020204030204" pitchFamily="49" charset="0"/>
+                <a:ea typeface="等线" panose="02010600030101010101" pitchFamily="2" charset="-122"/>
+                <a:cs typeface="Courier New" panose="02070309020205020404" pitchFamily="49" charset="0"/>
+              </a:rPr>
+              <a:t>denominator</a:t>
+            </a:r>
+            <a:r>
+              <a:rPr lang="en-US" altLang="zh-CN" sz="1800" b="1" kern="0">
+                <a:solidFill>
+                  <a:srgbClr val="000080"/>
+                </a:solidFill>
+                <a:effectLst/>
+                <a:highlight>
+                  <a:srgbClr val="FFFFFF"/>
+                </a:highlight>
+                <a:latin typeface="Consolas" panose="020B0609020204030204" pitchFamily="49" charset="0"/>
+                <a:ea typeface="等线" panose="02010600030101010101" pitchFamily="2" charset="-122"/>
+                <a:cs typeface="Courier New" panose="02070309020205020404" pitchFamily="49" charset="0"/>
+              </a:rPr>
               <a:t>;</a:t>
             </a:r>
-            <a:endParaRPr lang="zh-CN" altLang="zh-CN" sz="2000" kern="100">
+            <a:endParaRPr lang="zh-CN" altLang="zh-CN" sz="1800" kern="100">
               <a:effectLst/>
               <a:latin typeface="等线" panose="02010600030101010101" pitchFamily="2" charset="-122"/>
               <a:ea typeface="等线" panose="02010600030101010101" pitchFamily="2" charset="-122"/>
@@ -18305,7 +18305,7 @@
                 <a:ea typeface="等线" panose="02010600030101010101" pitchFamily="2" charset="-122"/>
                 <a:cs typeface="Courier New" panose="02070309020205020404" pitchFamily="49" charset="0"/>
               </a:rPr>
-              <a:t>    </a:t>
+              <a:t>        f</a:t>
             </a:r>
             <a:r>
               <a:rPr lang="en-US" altLang="zh-CN" sz="1800" b="1" kern="0">
@@ -18320,9 +18320,69 @@
                 <a:ea typeface="等线" panose="02010600030101010101" pitchFamily="2" charset="-122"/>
                 <a:cs typeface="Courier New" panose="02070309020205020404" pitchFamily="49" charset="0"/>
               </a:rPr>
-              <a:t>}</a:t>
-            </a:r>
-            <a:endParaRPr lang="zh-CN" altLang="zh-CN" sz="2000" kern="100">
+              <a:t>-&gt;</a:t>
+            </a:r>
+            <a:r>
+              <a:rPr lang="en-US" altLang="zh-CN" sz="1800" kern="0">
+                <a:solidFill>
+                  <a:srgbClr val="000000"/>
+                </a:solidFill>
+                <a:effectLst/>
+                <a:highlight>
+                  <a:srgbClr val="FFFFFF"/>
+                </a:highlight>
+                <a:latin typeface="Consolas" panose="020B0609020204030204" pitchFamily="49" charset="0"/>
+                <a:ea typeface="等线" panose="02010600030101010101" pitchFamily="2" charset="-122"/>
+                <a:cs typeface="Courier New" panose="02070309020205020404" pitchFamily="49" charset="0"/>
+              </a:rPr>
+              <a:t>denominator </a:t>
+            </a:r>
+            <a:r>
+              <a:rPr lang="en-US" altLang="zh-CN" sz="1800" b="1" kern="0">
+                <a:solidFill>
+                  <a:srgbClr val="000080"/>
+                </a:solidFill>
+                <a:effectLst/>
+                <a:highlight>
+                  <a:srgbClr val="FFFFFF"/>
+                </a:highlight>
+                <a:latin typeface="Consolas" panose="020B0609020204030204" pitchFamily="49" charset="0"/>
+                <a:ea typeface="等线" panose="02010600030101010101" pitchFamily="2" charset="-122"/>
+                <a:cs typeface="Courier New" panose="02070309020205020404" pitchFamily="49" charset="0"/>
+              </a:rPr>
+              <a:t>=</a:t>
+            </a:r>
+            <a:r>
+              <a:rPr lang="en-US" altLang="zh-CN" sz="1800" kern="0">
+                <a:solidFill>
+                  <a:srgbClr val="000000"/>
+                </a:solidFill>
+                <a:effectLst/>
+                <a:highlight>
+                  <a:srgbClr val="FFFFFF"/>
+                </a:highlight>
+                <a:latin typeface="Consolas" panose="020B0609020204030204" pitchFamily="49" charset="0"/>
+                <a:ea typeface="等线" panose="02010600030101010101" pitchFamily="2" charset="-122"/>
+                <a:cs typeface="Courier New" panose="02070309020205020404" pitchFamily="49" charset="0"/>
+              </a:rPr>
+              <a:t> temp</a:t>
+            </a:r>
+            <a:r>
+              <a:rPr lang="en-US" altLang="zh-CN" sz="1800" b="1" kern="0">
+                <a:solidFill>
+                  <a:srgbClr val="000080"/>
+                </a:solidFill>
+                <a:effectLst/>
+                <a:highlight>
+                  <a:srgbClr val="FFFFFF"/>
+                </a:highlight>
+                <a:latin typeface="Consolas" panose="020B0609020204030204" pitchFamily="49" charset="0"/>
+                <a:ea typeface="等线" panose="02010600030101010101" pitchFamily="2" charset="-122"/>
+                <a:cs typeface="Courier New" panose="02070309020205020404" pitchFamily="49" charset="0"/>
+              </a:rPr>
+              <a:t>;</a:t>
+            </a:r>
+            <a:endParaRPr lang="zh-CN" altLang="zh-CN" sz="1800" kern="100">
               <a:effectLst/>
               <a:latin typeface="等线" panose="02010600030101010101" pitchFamily="2" charset="-122"/>
               <a:ea typeface="等线" panose="02010600030101010101" pitchFamily="2" charset="-122"/>
@@ -18332,6 +18392,21 @@
           <a:p>
             <a:pPr algn="l"/>
             <a:r>
+              <a:rPr lang="en-US" altLang="zh-CN" sz="1800" kern="0">
+                <a:solidFill>
+                  <a:srgbClr val="000000"/>
+                </a:solidFill>
+                <a:effectLst/>
+                <a:highlight>
+                  <a:srgbClr val="FFFFFF"/>
+                </a:highlight>
+                <a:latin typeface="Consolas" panose="020B0609020204030204" pitchFamily="49" charset="0"/>
+                <a:ea typeface="等线" panose="02010600030101010101" pitchFamily="2" charset="-122"/>
+                <a:cs typeface="Courier New" panose="02070309020205020404" pitchFamily="49" charset="0"/>
+              </a:rPr>
+              <a:t>    </a:t>
+            </a:r>
+            <a:r>
               <a:rPr lang="en-US" altLang="zh-CN" sz="1800" b="1" kern="0">
                 <a:solidFill>
                   <a:srgbClr val="000080"/>
@@ -18346,7 +18421,31 @@
               </a:rPr>
               <a:t>}</a:t>
             </a:r>
-            <a:endParaRPr lang="zh-CN" altLang="zh-CN" sz="2000" kern="100">
+            <a:endParaRPr lang="zh-CN" altLang="zh-CN" sz="1800" kern="100">
+              <a:effectLst/>
+              <a:latin typeface="等线" panose="02010600030101010101" pitchFamily="2" charset="-122"/>
+              <a:ea typeface="等线" panose="02010600030101010101" pitchFamily="2" charset="-122"/>
+              <a:cs typeface="Times New Roman" panose="02020603050405020304" pitchFamily="18" charset="0"/>
+            </a:endParaRPr>
+          </a:p>
+          <a:p>
+            <a:pPr algn="l"/>
+            <a:r>
+              <a:rPr lang="en-US" altLang="zh-CN" sz="1800" b="1" kern="0">
+                <a:solidFill>
+                  <a:srgbClr val="000080"/>
+                </a:solidFill>
+                <a:effectLst/>
+                <a:highlight>
+                  <a:srgbClr val="FFFFFF"/>
+                </a:highlight>
+                <a:latin typeface="Consolas" panose="020B0609020204030204" pitchFamily="49" charset="0"/>
+                <a:ea typeface="等线" panose="02010600030101010101" pitchFamily="2" charset="-122"/>
+                <a:cs typeface="Courier New" panose="02070309020205020404" pitchFamily="49" charset="0"/>
+              </a:rPr>
+              <a:t>}</a:t>
+            </a:r>
+            <a:endParaRPr lang="zh-CN" altLang="zh-CN" sz="1800" kern="100">
               <a:effectLst/>
               <a:latin typeface="等线" panose="02010600030101010101" pitchFamily="2" charset="-122"/>
               <a:ea typeface="等线" panose="02010600030101010101" pitchFamily="2" charset="-122"/>
@@ -18435,7 +18534,7 @@
         <p:spPr>
           <a:xfrm>
             <a:off x="579600" y="1270708"/>
-            <a:ext cx="8455842" cy="2862322"/>
+            <a:ext cx="10016128" cy="2862322"/>
           </a:xfrm>
           <a:prstGeom prst="rect">
             <a:avLst/>
@@ -18524,7 +18623,7 @@
               </a:rPr>
               <a:t>{</a:t>
             </a:r>
-            <a:endParaRPr lang="zh-CN" altLang="zh-CN" sz="2000" kern="100">
+            <a:endParaRPr lang="zh-CN" altLang="zh-CN" sz="1800" kern="100">
               <a:effectLst/>
               <a:latin typeface="等线" panose="02010600030101010101" pitchFamily="2" charset="-122"/>
               <a:ea typeface="等线" panose="02010600030101010101" pitchFamily="2" charset="-122"/>
@@ -18698,7 +18797,7 @@
               </a:rPr>
               <a:t>// 2/5</a:t>
             </a:r>
-            <a:endParaRPr lang="zh-CN" altLang="zh-CN" sz="2000" kern="100">
+            <a:endParaRPr lang="zh-CN" altLang="zh-CN" sz="1800" kern="100">
               <a:effectLst/>
               <a:latin typeface="等线" panose="02010600030101010101" pitchFamily="2" charset="-122"/>
               <a:ea typeface="等线" panose="02010600030101010101" pitchFamily="2" charset="-122"/>
@@ -18722,7 +18821,7 @@
               </a:rPr>
               <a:t> </a:t>
             </a:r>
-            <a:endParaRPr lang="zh-CN" altLang="zh-CN" sz="2000" kern="100">
+            <a:endParaRPr lang="zh-CN" altLang="zh-CN" sz="1800" kern="100">
               <a:effectLst/>
               <a:latin typeface="等线" panose="02010600030101010101" pitchFamily="2" charset="-122"/>
               <a:ea typeface="等线" panose="02010600030101010101" pitchFamily="2" charset="-122"/>
@@ -18744,7 +18843,7 @@
                 <a:ea typeface="等线" panose="02010600030101010101" pitchFamily="2" charset="-122"/>
                 <a:cs typeface="Courier New" panose="02070309020205020404" pitchFamily="49" charset="0"/>
               </a:rPr>
-              <a:t>    printf</a:t>
+              <a:t>    cout </a:t>
             </a:r>
             <a:r>
               <a:rPr lang="en-US" altLang="zh-CN" sz="1800" b="1" kern="0">
@@ -18759,11 +18858,26 @@
                 <a:ea typeface="等线" panose="02010600030101010101" pitchFamily="2" charset="-122"/>
                 <a:cs typeface="Courier New" panose="02070309020205020404" pitchFamily="49" charset="0"/>
               </a:rPr>
-              <a:t>(</a:t>
+              <a:t>&lt;&lt;</a:t>
             </a:r>
             <a:r>
               <a:rPr lang="en-US" altLang="zh-CN" sz="1800" kern="0">
                 <a:solidFill>
+                  <a:srgbClr val="000000"/>
+                </a:solidFill>
+                <a:effectLst/>
+                <a:highlight>
+                  <a:srgbClr val="FFFFFF"/>
+                </a:highlight>
+                <a:latin typeface="Consolas" panose="020B0609020204030204" pitchFamily="49" charset="0"/>
+                <a:ea typeface="等线" panose="02010600030101010101" pitchFamily="2" charset="-122"/>
+                <a:cs typeface="Courier New" panose="02070309020205020404" pitchFamily="49" charset="0"/>
+              </a:rPr>
+              <a:t> </a:t>
+            </a:r>
+            <a:r>
+              <a:rPr lang="en-US" altLang="zh-CN" sz="1800" kern="0">
+                <a:solidFill>
                   <a:srgbClr val="808080"/>
                 </a:solidFill>
                 <a:effectLst/>
@@ -18789,9 +18903,9 @@
                 <a:ea typeface="等线" panose="02010600030101010101" pitchFamily="2" charset="-122"/>
                 <a:cs typeface="Courier New" panose="02070309020205020404" pitchFamily="49" charset="0"/>
               </a:rPr>
-              <a:t>);</a:t>
-            </a:r>
-            <a:endParaRPr lang="zh-CN" altLang="zh-CN" sz="2000" kern="100">
+              <a:t>;</a:t>
+            </a:r>
+            <a:endParaRPr lang="zh-CN" altLang="zh-CN" sz="1800" kern="100">
               <a:effectLst/>
               <a:latin typeface="等线" panose="02010600030101010101" pitchFamily="2" charset="-122"/>
               <a:ea typeface="等线" panose="02010600030101010101" pitchFamily="2" charset="-122"/>
@@ -18813,7 +18927,7 @@
                 <a:ea typeface="等线" panose="02010600030101010101" pitchFamily="2" charset="-122"/>
                 <a:cs typeface="Courier New" panose="02070309020205020404" pitchFamily="49" charset="0"/>
               </a:rPr>
-              <a:t>    printf</a:t>
+              <a:t>    cout </a:t>
             </a:r>
             <a:r>
               <a:rPr lang="en-US" altLang="zh-CN" sz="1800" b="1" kern="0">
@@ -18828,11 +18942,86 @@
                 <a:ea typeface="等线" panose="02010600030101010101" pitchFamily="2" charset="-122"/>
                 <a:cs typeface="Courier New" panose="02070309020205020404" pitchFamily="49" charset="0"/>
               </a:rPr>
-              <a:t>(</a:t>
+              <a:t>&lt;&lt;</a:t>
             </a:r>
             <a:r>
               <a:rPr lang="en-US" altLang="zh-CN" sz="1800" kern="0">
                 <a:solidFill>
+                  <a:srgbClr val="000000"/>
+                </a:solidFill>
+                <a:effectLst/>
+                <a:highlight>
+                  <a:srgbClr val="FFFFFF"/>
+                </a:highlight>
+                <a:latin typeface="Consolas" panose="020B0609020204030204" pitchFamily="49" charset="0"/>
+                <a:ea typeface="等线" panose="02010600030101010101" pitchFamily="2" charset="-122"/>
+                <a:cs typeface="Courier New" panose="02070309020205020404" pitchFamily="49" charset="0"/>
+              </a:rPr>
+              <a:t> fraction</a:t>
+            </a:r>
+            <a:r>
+              <a:rPr lang="en-US" altLang="zh-CN" sz="1800" b="1" kern="0">
+                <a:solidFill>
+                  <a:srgbClr val="000080"/>
+                </a:solidFill>
+                <a:effectLst/>
+                <a:highlight>
+                  <a:srgbClr val="FFFFFF"/>
+                </a:highlight>
+                <a:latin typeface="Consolas" panose="020B0609020204030204" pitchFamily="49" charset="0"/>
+                <a:ea typeface="等线" panose="02010600030101010101" pitchFamily="2" charset="-122"/>
+                <a:cs typeface="Courier New" panose="02070309020205020404" pitchFamily="49" charset="0"/>
+              </a:rPr>
+              <a:t>.</a:t>
+            </a:r>
+            <a:r>
+              <a:rPr lang="en-US" altLang="zh-CN" sz="1800" kern="0">
+                <a:solidFill>
+                  <a:srgbClr val="000000"/>
+                </a:solidFill>
+                <a:effectLst/>
+                <a:highlight>
+                  <a:srgbClr val="FFFFFF"/>
+                </a:highlight>
+                <a:latin typeface="Consolas" panose="020B0609020204030204" pitchFamily="49" charset="0"/>
+                <a:ea typeface="等线" panose="02010600030101010101" pitchFamily="2" charset="-122"/>
+                <a:cs typeface="Courier New" panose="02070309020205020404" pitchFamily="49" charset="0"/>
+              </a:rPr>
+              <a:t>numerator </a:t>
+            </a:r>
+            <a:r>
+              <a:rPr lang="en-US" altLang="zh-CN" sz="1800" b="1" kern="0">
+                <a:solidFill>
+                  <a:srgbClr val="000080"/>
+                </a:solidFill>
+                <a:effectLst/>
+                <a:highlight>
+                  <a:srgbClr val="FFFFFF"/>
+                </a:highlight>
+                <a:latin typeface="Consolas" panose="020B0609020204030204" pitchFamily="49" charset="0"/>
+                <a:ea typeface="等线" panose="02010600030101010101" pitchFamily="2" charset="-122"/>
+                <a:cs typeface="Courier New" panose="02070309020205020404" pitchFamily="49" charset="0"/>
+              </a:rPr>
+              <a:t>&lt;&lt;</a:t>
+            </a:r>
+            <a:r>
+              <a:rPr lang="en-US" altLang="zh-CN" sz="1800" kern="0">
+                <a:solidFill>
+                  <a:srgbClr val="000000"/>
+                </a:solidFill>
+                <a:effectLst/>
+                <a:highlight>
+                  <a:srgbClr val="FFFFFF"/>
+                </a:highlight>
+                <a:latin typeface="Consolas" panose="020B0609020204030204" pitchFamily="49" charset="0"/>
+                <a:ea typeface="等线" panose="02010600030101010101" pitchFamily="2" charset="-122"/>
+                <a:cs typeface="Courier New" panose="02070309020205020404" pitchFamily="49" charset="0"/>
+              </a:rPr>
+              <a:t> </a:t>
+            </a:r>
+            <a:r>
+              <a:rPr lang="en-US" altLang="zh-CN" sz="1800" kern="0">
+                <a:solidFill>
                   <a:srgbClr val="808080"/>
                 </a:solidFill>
                 <a:effectLst/>
@@ -18843,7 +19032,22 @@
                 <a:ea typeface="等线" panose="02010600030101010101" pitchFamily="2" charset="-122"/>
                 <a:cs typeface="Courier New" panose="02070309020205020404" pitchFamily="49" charset="0"/>
               </a:rPr>
-              <a:t>"%d/%d is "</a:t>
+              <a:t>"/"</a:t>
+            </a:r>
+            <a:r>
+              <a:rPr lang="en-US" altLang="zh-CN" sz="1800" kern="0">
+                <a:solidFill>
+                  <a:srgbClr val="000000"/>
+                </a:solidFill>
+                <a:effectLst/>
+                <a:highlight>
+                  <a:srgbClr val="FFFFFF"/>
+                </a:highlight>
+                <a:latin typeface="Consolas" panose="020B0609020204030204" pitchFamily="49" charset="0"/>
+                <a:ea typeface="等线" panose="02010600030101010101" pitchFamily="2" charset="-122"/>
+                <a:cs typeface="Courier New" panose="02070309020205020404" pitchFamily="49" charset="0"/>
+              </a:rPr>
+              <a:t> </a:t>
             </a:r>
             <a:r>
               <a:rPr lang="en-US" altLang="zh-CN" sz="1800" b="1" kern="0">
@@ -18858,7 +19062,7 @@
                 <a:ea typeface="等线" panose="02010600030101010101" pitchFamily="2" charset="-122"/>
                 <a:cs typeface="Courier New" panose="02070309020205020404" pitchFamily="49" charset="0"/>
               </a:rPr>
-              <a:t>,</a:t>
+              <a:t>&lt;&lt;</a:t>
             </a:r>
             <a:r>
               <a:rPr lang="en-US" altLang="zh-CN" sz="1800" kern="0">
@@ -18903,7 +19107,7 @@
                 <a:ea typeface="等线" panose="02010600030101010101" pitchFamily="2" charset="-122"/>
                 <a:cs typeface="Courier New" panose="02070309020205020404" pitchFamily="49" charset="0"/>
               </a:rPr>
-              <a:t>numerator</a:t>
+              <a:t>denominator </a:t>
             </a:r>
             <a:r>
               <a:rPr lang="en-US" altLang="zh-CN" sz="1800" b="1" kern="0">
@@ -18918,7 +19122,7 @@
                 <a:ea typeface="等线" panose="02010600030101010101" pitchFamily="2" charset="-122"/>
                 <a:cs typeface="Courier New" panose="02070309020205020404" pitchFamily="49" charset="0"/>
               </a:rPr>
-              <a:t>,</a:t>
+              <a:t>&lt;&lt;</a:t>
             </a:r>
             <a:r>
               <a:rPr lang="en-US" altLang="zh-CN" sz="1800" kern="0">
@@ -18933,7 +19137,22 @@
                 <a:ea typeface="等线" panose="02010600030101010101" pitchFamily="2" charset="-122"/>
                 <a:cs typeface="Courier New" panose="02070309020205020404" pitchFamily="49" charset="0"/>
               </a:rPr>
-              <a:t> fraction</a:t>
+              <a:t> </a:t>
+            </a:r>
+            <a:r>
+              <a:rPr lang="en-US" altLang="zh-CN" sz="1800" kern="0">
+                <a:solidFill>
+                  <a:srgbClr val="808080"/>
+                </a:solidFill>
+                <a:effectLst/>
+                <a:highlight>
+                  <a:srgbClr val="FFFFFF"/>
+                </a:highlight>
+                <a:latin typeface="Consolas" panose="020B0609020204030204" pitchFamily="49" charset="0"/>
+                <a:ea typeface="等线" panose="02010600030101010101" pitchFamily="2" charset="-122"/>
+                <a:cs typeface="Courier New" panose="02070309020205020404" pitchFamily="49" charset="0"/>
+              </a:rPr>
+              <a:t>" is "</a:t>
             </a:r>
             <a:r>
               <a:rPr lang="en-US" altLang="zh-CN" sz="1800" b="1" kern="0">
@@ -18948,39 +19167,9 @@
                 <a:ea typeface="等线" panose="02010600030101010101" pitchFamily="2" charset="-122"/>
                 <a:cs typeface="Courier New" panose="02070309020205020404" pitchFamily="49" charset="0"/>
               </a:rPr>
-              <a:t>.</a:t>
-            </a:r>
-            <a:r>
-              <a:rPr lang="en-US" altLang="zh-CN" sz="1800" kern="0">
-                <a:solidFill>
-                  <a:srgbClr val="000000"/>
-                </a:solidFill>
-                <a:effectLst/>
-                <a:highlight>
-                  <a:srgbClr val="FFFFFF"/>
-                </a:highlight>
-                <a:latin typeface="Consolas" panose="020B0609020204030204" pitchFamily="49" charset="0"/>
-                <a:ea typeface="等线" panose="02010600030101010101" pitchFamily="2" charset="-122"/>
-                <a:cs typeface="Courier New" panose="02070309020205020404" pitchFamily="49" charset="0"/>
-              </a:rPr>
-              <a:t>denominator</a:t>
-            </a:r>
-            <a:r>
-              <a:rPr lang="en-US" altLang="zh-CN" sz="1800" b="1" kern="0">
-                <a:solidFill>
-                  <a:srgbClr val="000080"/>
-                </a:solidFill>
-                <a:effectLst/>
-                <a:highlight>
-                  <a:srgbClr val="FFFFFF"/>
-                </a:highlight>
-                <a:latin typeface="Consolas" panose="020B0609020204030204" pitchFamily="49" charset="0"/>
-                <a:ea typeface="等线" panose="02010600030101010101" pitchFamily="2" charset="-122"/>
-                <a:cs typeface="Courier New" panose="02070309020205020404" pitchFamily="49" charset="0"/>
-              </a:rPr>
-              <a:t>);</a:t>
-            </a:r>
-            <a:endParaRPr lang="zh-CN" altLang="zh-CN" sz="2000" kern="100">
+              <a:t>;</a:t>
+            </a:r>
+            <a:endParaRPr lang="zh-CN" altLang="zh-CN" sz="1800" kern="100">
               <a:effectLst/>
               <a:latin typeface="等线" panose="02010600030101010101" pitchFamily="2" charset="-122"/>
               <a:ea typeface="等线" panose="02010600030101010101" pitchFamily="2" charset="-122"/>
@@ -19049,7 +19238,7 @@
               </a:rPr>
               <a:t>);</a:t>
             </a:r>
-            <a:endParaRPr lang="zh-CN" altLang="zh-CN" sz="2000" kern="100">
+            <a:endParaRPr lang="zh-CN" altLang="zh-CN" sz="1800" kern="100">
               <a:effectLst/>
               <a:latin typeface="等线" panose="02010600030101010101" pitchFamily="2" charset="-122"/>
               <a:ea typeface="等线" panose="02010600030101010101" pitchFamily="2" charset="-122"/>
@@ -19071,7 +19260,7 @@
                 <a:ea typeface="等线" panose="02010600030101010101" pitchFamily="2" charset="-122"/>
                 <a:cs typeface="Courier New" panose="02070309020205020404" pitchFamily="49" charset="0"/>
               </a:rPr>
-              <a:t>    printf</a:t>
+              <a:t>    cout </a:t>
             </a:r>
             <a:r>
               <a:rPr lang="en-US" altLang="zh-CN" sz="1800" b="1" kern="0">
@@ -19086,11 +19275,86 @@
                 <a:ea typeface="等线" panose="02010600030101010101" pitchFamily="2" charset="-122"/>
                 <a:cs typeface="Courier New" panose="02070309020205020404" pitchFamily="49" charset="0"/>
               </a:rPr>
-              <a:t>(</a:t>
+              <a:t>&lt;&lt;</a:t>
             </a:r>
             <a:r>
               <a:rPr lang="en-US" altLang="zh-CN" sz="1800" kern="0">
                 <a:solidFill>
+                  <a:srgbClr val="000000"/>
+                </a:solidFill>
+                <a:effectLst/>
+                <a:highlight>
+                  <a:srgbClr val="FFFFFF"/>
+                </a:highlight>
+                <a:latin typeface="Consolas" panose="020B0609020204030204" pitchFamily="49" charset="0"/>
+                <a:ea typeface="等线" panose="02010600030101010101" pitchFamily="2" charset="-122"/>
+                <a:cs typeface="Courier New" panose="02070309020205020404" pitchFamily="49" charset="0"/>
+              </a:rPr>
+              <a:t> fraction</a:t>
+            </a:r>
+            <a:r>
+              <a:rPr lang="en-US" altLang="zh-CN" sz="1800" b="1" kern="0">
+                <a:solidFill>
+                  <a:srgbClr val="000080"/>
+                </a:solidFill>
+                <a:effectLst/>
+                <a:highlight>
+                  <a:srgbClr val="FFFFFF"/>
+                </a:highlight>
+                <a:latin typeface="Consolas" panose="020B0609020204030204" pitchFamily="49" charset="0"/>
+                <a:ea typeface="等线" panose="02010600030101010101" pitchFamily="2" charset="-122"/>
+                <a:cs typeface="Courier New" panose="02070309020205020404" pitchFamily="49" charset="0"/>
+              </a:rPr>
+              <a:t>.</a:t>
+            </a:r>
+            <a:r>
+              <a:rPr lang="en-US" altLang="zh-CN" sz="1800" kern="0">
+                <a:solidFill>
+                  <a:srgbClr val="000000"/>
+                </a:solidFill>
+                <a:effectLst/>
+                <a:highlight>
+                  <a:srgbClr val="FFFFFF"/>
+                </a:highlight>
+                <a:latin typeface="Consolas" panose="020B0609020204030204" pitchFamily="49" charset="0"/>
+                <a:ea typeface="等线" panose="02010600030101010101" pitchFamily="2" charset="-122"/>
+                <a:cs typeface="Courier New" panose="02070309020205020404" pitchFamily="49" charset="0"/>
+              </a:rPr>
+              <a:t>numerator </a:t>
+            </a:r>
+            <a:r>
+              <a:rPr lang="en-US" altLang="zh-CN" sz="1800" b="1" kern="0">
+                <a:solidFill>
+                  <a:srgbClr val="000080"/>
+                </a:solidFill>
+                <a:effectLst/>
+                <a:highlight>
+                  <a:srgbClr val="FFFFFF"/>
+                </a:highlight>
+                <a:latin typeface="Consolas" panose="020B0609020204030204" pitchFamily="49" charset="0"/>
+                <a:ea typeface="等线" panose="02010600030101010101" pitchFamily="2" charset="-122"/>
+                <a:cs typeface="Courier New" panose="02070309020205020404" pitchFamily="49" charset="0"/>
+              </a:rPr>
+              <a:t>&lt;&lt;</a:t>
+            </a:r>
+            <a:r>
+              <a:rPr lang="en-US" altLang="zh-CN" sz="1800" kern="0">
+                <a:solidFill>
+                  <a:srgbClr val="000000"/>
+                </a:solidFill>
+                <a:effectLst/>
+                <a:highlight>
+                  <a:srgbClr val="FFFFFF"/>
+                </a:highlight>
+                <a:latin typeface="Consolas" panose="020B0609020204030204" pitchFamily="49" charset="0"/>
+                <a:ea typeface="等线" panose="02010600030101010101" pitchFamily="2" charset="-122"/>
+                <a:cs typeface="Courier New" panose="02070309020205020404" pitchFamily="49" charset="0"/>
+              </a:rPr>
+              <a:t> </a:t>
+            </a:r>
+            <a:r>
+              <a:rPr lang="en-US" altLang="zh-CN" sz="1800" kern="0">
+                <a:solidFill>
                   <a:srgbClr val="808080"/>
                 </a:solidFill>
                 <a:effectLst/>
@@ -19101,7 +19365,22 @@
                 <a:ea typeface="等线" panose="02010600030101010101" pitchFamily="2" charset="-122"/>
                 <a:cs typeface="Courier New" panose="02070309020205020404" pitchFamily="49" charset="0"/>
               </a:rPr>
-              <a:t>"%d/%d\n"</a:t>
+              <a:t>"/"</a:t>
+            </a:r>
+            <a:r>
+              <a:rPr lang="en-US" altLang="zh-CN" sz="1800" kern="0">
+                <a:solidFill>
+                  <a:srgbClr val="000000"/>
+                </a:solidFill>
+                <a:effectLst/>
+                <a:highlight>
+                  <a:srgbClr val="FFFFFF"/>
+                </a:highlight>
+                <a:latin typeface="Consolas" panose="020B0609020204030204" pitchFamily="49" charset="0"/>
+                <a:ea typeface="等线" panose="02010600030101010101" pitchFamily="2" charset="-122"/>
+                <a:cs typeface="Courier New" panose="02070309020205020404" pitchFamily="49" charset="0"/>
+              </a:rPr>
+              <a:t> </a:t>
             </a:r>
             <a:r>
               <a:rPr lang="en-US" altLang="zh-CN" sz="1800" b="1" kern="0">
@@ -19116,7 +19395,7 @@
                 <a:ea typeface="等线" panose="02010600030101010101" pitchFamily="2" charset="-122"/>
                 <a:cs typeface="Courier New" panose="02070309020205020404" pitchFamily="49" charset="0"/>
               </a:rPr>
-              <a:t>,</a:t>
+              <a:t>&lt;&lt;</a:t>
             </a:r>
             <a:r>
               <a:rPr lang="en-US" altLang="zh-CN" sz="1800" kern="0">
@@ -19161,7 +19440,7 @@
                 <a:ea typeface="等线" panose="02010600030101010101" pitchFamily="2" charset="-122"/>
                 <a:cs typeface="Courier New" panose="02070309020205020404" pitchFamily="49" charset="0"/>
               </a:rPr>
-              <a:t>numerator</a:t>
+              <a:t>denominator </a:t>
             </a:r>
             <a:r>
               <a:rPr lang="en-US" altLang="zh-CN" sz="1800" b="1" kern="0">
@@ -19176,7 +19455,7 @@
                 <a:ea typeface="等线" panose="02010600030101010101" pitchFamily="2" charset="-122"/>
                 <a:cs typeface="Courier New" panose="02070309020205020404" pitchFamily="49" charset="0"/>
               </a:rPr>
-              <a:t>,</a:t>
+              <a:t>&lt;&lt;</a:t>
             </a:r>
             <a:r>
               <a:rPr lang="en-US" altLang="zh-CN" sz="1800" kern="0">
@@ -19191,7 +19470,7 @@
                 <a:ea typeface="等线" panose="02010600030101010101" pitchFamily="2" charset="-122"/>
                 <a:cs typeface="Courier New" panose="02070309020205020404" pitchFamily="49" charset="0"/>
               </a:rPr>
-              <a:t> fraction</a:t>
+              <a:t> endl</a:t>
             </a:r>
             <a:r>
               <a:rPr lang="en-US" altLang="zh-CN" sz="1800" b="1" kern="0">
@@ -19206,39 +19485,9 @@
                 <a:ea typeface="等线" panose="02010600030101010101" pitchFamily="2" charset="-122"/>
                 <a:cs typeface="Courier New" panose="02070309020205020404" pitchFamily="49" charset="0"/>
               </a:rPr>
-              <a:t>.</a:t>
-            </a:r>
-            <a:r>
-              <a:rPr lang="en-US" altLang="zh-CN" sz="1800" kern="0">
-                <a:solidFill>
-                  <a:srgbClr val="000000"/>
-                </a:solidFill>
-                <a:effectLst/>
-                <a:highlight>
-                  <a:srgbClr val="FFFFFF"/>
-                </a:highlight>
-                <a:latin typeface="Consolas" panose="020B0609020204030204" pitchFamily="49" charset="0"/>
-                <a:ea typeface="等线" panose="02010600030101010101" pitchFamily="2" charset="-122"/>
-                <a:cs typeface="Courier New" panose="02070309020205020404" pitchFamily="49" charset="0"/>
-              </a:rPr>
-              <a:t>denominator</a:t>
-            </a:r>
-            <a:r>
-              <a:rPr lang="en-US" altLang="zh-CN" sz="1800" b="1" kern="0">
-                <a:solidFill>
-                  <a:srgbClr val="000080"/>
-                </a:solidFill>
-                <a:effectLst/>
-                <a:highlight>
-                  <a:srgbClr val="FFFFFF"/>
-                </a:highlight>
-                <a:latin typeface="Consolas" panose="020B0609020204030204" pitchFamily="49" charset="0"/>
-                <a:ea typeface="等线" panose="02010600030101010101" pitchFamily="2" charset="-122"/>
-                <a:cs typeface="Courier New" panose="02070309020205020404" pitchFamily="49" charset="0"/>
-              </a:rPr>
-              <a:t>);</a:t>
-            </a:r>
-            <a:endParaRPr lang="zh-CN" altLang="zh-CN" sz="2000" kern="100">
+              <a:t>;</a:t>
+            </a:r>
+            <a:endParaRPr lang="zh-CN" altLang="zh-CN" sz="1800" kern="100">
               <a:effectLst/>
               <a:latin typeface="等线" panose="02010600030101010101" pitchFamily="2" charset="-122"/>
               <a:ea typeface="等线" panose="02010600030101010101" pitchFamily="2" charset="-122"/>
@@ -19262,7 +19511,7 @@
               </a:rPr>
               <a:t> </a:t>
             </a:r>
-            <a:endParaRPr lang="zh-CN" altLang="zh-CN" sz="2000" kern="100">
+            <a:endParaRPr lang="zh-CN" altLang="zh-CN" sz="1800" kern="100">
               <a:effectLst/>
               <a:latin typeface="等线" panose="02010600030101010101" pitchFamily="2" charset="-122"/>
               <a:ea typeface="等线" panose="02010600030101010101" pitchFamily="2" charset="-122"/>
@@ -19346,7 +19595,7 @@
               </a:rPr>
               <a:t>;</a:t>
             </a:r>
-            <a:endParaRPr lang="zh-CN" altLang="zh-CN" sz="2000" kern="100">
+            <a:endParaRPr lang="zh-CN" altLang="zh-CN" sz="1800" kern="100">
               <a:effectLst/>
               <a:latin typeface="等线" panose="02010600030101010101" pitchFamily="2" charset="-122"/>
               <a:ea typeface="等线" panose="02010600030101010101" pitchFamily="2" charset="-122"/>
@@ -19370,7 +19619,7 @@
               </a:rPr>
               <a:t>}</a:t>
             </a:r>
-            <a:endParaRPr lang="zh-CN" altLang="zh-CN" sz="2000" kern="100">
+            <a:endParaRPr lang="zh-CN" altLang="zh-CN" sz="1800" kern="100">
               <a:effectLst/>
               <a:latin typeface="等线" panose="02010600030101010101" pitchFamily="2" charset="-122"/>
               <a:ea typeface="等线" panose="02010600030101010101" pitchFamily="2" charset="-122"/>
@@ -21560,8 +21809,8 @@
         </p:nvSpPr>
         <p:spPr>
           <a:xfrm>
-            <a:off x="5044275" y="1218638"/>
-            <a:ext cx="6568125" cy="5078313"/>
+            <a:off x="5012986" y="1014326"/>
+            <a:ext cx="7147725" cy="5632311"/>
           </a:xfrm>
           <a:prstGeom prst="rect">
             <a:avLst/>
@@ -21588,9 +21837,9 @@
                 <a:ea typeface="等线" panose="02010600030101010101" pitchFamily="2" charset="-122"/>
                 <a:cs typeface="Courier New" panose="02070309020205020404" pitchFamily="49" charset="0"/>
               </a:rPr>
-              <a:t>#include &lt;stdio.h&gt;</a:t>
-            </a:r>
-            <a:endParaRPr lang="zh-CN" altLang="zh-CN" sz="2000" kern="100">
+              <a:t>#include &lt;iostream&gt;</a:t>
+            </a:r>
+            <a:endParaRPr lang="zh-CN" altLang="zh-CN" sz="1800" kern="100">
               <a:effectLst/>
               <a:latin typeface="等线" panose="02010600030101010101" pitchFamily="2" charset="-122"/>
               <a:ea typeface="等线" panose="02010600030101010101" pitchFamily="2" charset="-122"/>
@@ -21614,7 +21863,7 @@
               </a:rPr>
               <a:t> </a:t>
             </a:r>
-            <a:endParaRPr lang="zh-CN" altLang="zh-CN" sz="2000" kern="100">
+            <a:endParaRPr lang="zh-CN" altLang="zh-CN" sz="1800" kern="100">
               <a:effectLst/>
               <a:latin typeface="等线" panose="02010600030101010101" pitchFamily="2" charset="-122"/>
               <a:ea typeface="等线" panose="02010600030101010101" pitchFamily="2" charset="-122"/>
@@ -21624,19 +21873,49 @@
           <a:p>
             <a:pPr algn="l"/>
             <a:r>
+              <a:rPr lang="en-US" altLang="zh-CN" sz="1800" b="1" kern="0">
+                <a:solidFill>
+                  <a:srgbClr val="0000FF"/>
+                </a:solidFill>
+                <a:effectLst/>
+                <a:highlight>
+                  <a:srgbClr val="FFFFFF"/>
+                </a:highlight>
+                <a:latin typeface="Consolas" panose="020B0609020204030204" pitchFamily="49" charset="0"/>
+                <a:ea typeface="等线" panose="02010600030101010101" pitchFamily="2" charset="-122"/>
+                <a:cs typeface="Courier New" panose="02070309020205020404" pitchFamily="49" charset="0"/>
+              </a:rPr>
+              <a:t>using</a:t>
+            </a:r>
+            <a:r>
               <a:rPr lang="en-US" altLang="zh-CN" sz="1800" kern="0">
                 <a:solidFill>
-                  <a:srgbClr val="8000FF"/>
-                </a:solidFill>
-                <a:effectLst/>
-                <a:highlight>
-                  <a:srgbClr val="FFFFFF"/>
-                </a:highlight>
-                <a:latin typeface="Consolas" panose="020B0609020204030204" pitchFamily="49" charset="0"/>
-                <a:ea typeface="等线" panose="02010600030101010101" pitchFamily="2" charset="-122"/>
-                <a:cs typeface="Courier New" panose="02070309020205020404" pitchFamily="49" charset="0"/>
-              </a:rPr>
-              <a:t>union</a:t>
+                  <a:srgbClr val="000000"/>
+                </a:solidFill>
+                <a:effectLst/>
+                <a:highlight>
+                  <a:srgbClr val="FFFFFF"/>
+                </a:highlight>
+                <a:latin typeface="Consolas" panose="020B0609020204030204" pitchFamily="49" charset="0"/>
+                <a:ea typeface="等线" panose="02010600030101010101" pitchFamily="2" charset="-122"/>
+                <a:cs typeface="Courier New" panose="02070309020205020404" pitchFamily="49" charset="0"/>
+              </a:rPr>
+              <a:t> </a:t>
+            </a:r>
+            <a:r>
+              <a:rPr lang="en-US" altLang="zh-CN" sz="1800" b="1" kern="0">
+                <a:solidFill>
+                  <a:srgbClr val="0000FF"/>
+                </a:solidFill>
+                <a:effectLst/>
+                <a:highlight>
+                  <a:srgbClr val="FFFFFF"/>
+                </a:highlight>
+                <a:latin typeface="Consolas" panose="020B0609020204030204" pitchFamily="49" charset="0"/>
+                <a:ea typeface="等线" panose="02010600030101010101" pitchFamily="2" charset="-122"/>
+                <a:cs typeface="Courier New" panose="02070309020205020404" pitchFamily="49" charset="0"/>
+              </a:rPr>
+              <a:t>namespace</a:t>
             </a:r>
             <a:r>
               <a:rPr lang="en-US" altLang="zh-CN" sz="1800" kern="0">
@@ -21651,7 +21930,7 @@
                 <a:ea typeface="等线" panose="02010600030101010101" pitchFamily="2" charset="-122"/>
                 <a:cs typeface="Courier New" panose="02070309020205020404" pitchFamily="49" charset="0"/>
               </a:rPr>
-              <a:t> Value </a:t>
+              <a:t> std</a:t>
             </a:r>
             <a:r>
               <a:rPr lang="en-US" altLang="zh-CN" sz="1800" b="1" kern="0">
@@ -21666,9 +21945,9 @@
                 <a:ea typeface="等线" panose="02010600030101010101" pitchFamily="2" charset="-122"/>
                 <a:cs typeface="Courier New" panose="02070309020205020404" pitchFamily="49" charset="0"/>
               </a:rPr>
-              <a:t>{</a:t>
-            </a:r>
-            <a:endParaRPr lang="zh-CN" altLang="zh-CN" sz="2000" kern="100">
+              <a:t>;</a:t>
+            </a:r>
+            <a:endParaRPr lang="zh-CN" altLang="zh-CN" sz="1800" kern="100">
               <a:effectLst/>
               <a:latin typeface="等线" panose="02010600030101010101" pitchFamily="2" charset="-122"/>
               <a:ea typeface="等线" panose="02010600030101010101" pitchFamily="2" charset="-122"/>
@@ -21690,54 +21969,9 @@
                 <a:ea typeface="等线" panose="02010600030101010101" pitchFamily="2" charset="-122"/>
                 <a:cs typeface="Courier New" panose="02070309020205020404" pitchFamily="49" charset="0"/>
               </a:rPr>
-              <a:t>    </a:t>
-            </a:r>
-            <a:r>
-              <a:rPr lang="en-US" altLang="zh-CN" sz="1800" kern="0">
-                <a:solidFill>
-                  <a:srgbClr val="8000FF"/>
-                </a:solidFill>
-                <a:effectLst/>
-                <a:highlight>
-                  <a:srgbClr val="FFFFFF"/>
-                </a:highlight>
-                <a:latin typeface="Consolas" panose="020B0609020204030204" pitchFamily="49" charset="0"/>
-                <a:ea typeface="等线" panose="02010600030101010101" pitchFamily="2" charset="-122"/>
-                <a:cs typeface="Courier New" panose="02070309020205020404" pitchFamily="49" charset="0"/>
-              </a:rPr>
-              <a:t>int</a:t>
-            </a:r>
-            <a:r>
-              <a:rPr lang="en-US" altLang="zh-CN" sz="1800" kern="0">
-                <a:solidFill>
-                  <a:srgbClr val="000000"/>
-                </a:solidFill>
-                <a:effectLst/>
-                <a:highlight>
-                  <a:srgbClr val="FFFFFF"/>
-                </a:highlight>
-                <a:latin typeface="Consolas" panose="020B0609020204030204" pitchFamily="49" charset="0"/>
-                <a:ea typeface="等线" panose="02010600030101010101" pitchFamily="2" charset="-122"/>
-                <a:cs typeface="Courier New" panose="02070309020205020404" pitchFamily="49" charset="0"/>
-              </a:rPr>
-              <a:t> int_data</a:t>
-            </a:r>
-            <a:r>
-              <a:rPr lang="en-US" altLang="zh-CN" sz="1800" b="1" kern="0">
-                <a:solidFill>
-                  <a:srgbClr val="000080"/>
-                </a:solidFill>
-                <a:effectLst/>
-                <a:highlight>
-                  <a:srgbClr val="FFFFFF"/>
-                </a:highlight>
-                <a:latin typeface="Consolas" panose="020B0609020204030204" pitchFamily="49" charset="0"/>
-                <a:ea typeface="等线" panose="02010600030101010101" pitchFamily="2" charset="-122"/>
-                <a:cs typeface="Courier New" panose="02070309020205020404" pitchFamily="49" charset="0"/>
-              </a:rPr>
-              <a:t>;</a:t>
-            </a:r>
-            <a:endParaRPr lang="zh-CN" altLang="zh-CN" sz="2000" kern="100">
+              <a:t> </a:t>
+            </a:r>
+            <a:endParaRPr lang="zh-CN" altLang="zh-CN" sz="1800" kern="100">
               <a:effectLst/>
               <a:latin typeface="等线" panose="02010600030101010101" pitchFamily="2" charset="-122"/>
               <a:ea typeface="等线" panose="02010600030101010101" pitchFamily="2" charset="-122"/>
@@ -21749,6 +21983,21 @@
             <a:r>
               <a:rPr lang="en-US" altLang="zh-CN" sz="1800" kern="0">
                 <a:solidFill>
+                  <a:srgbClr val="8000FF"/>
+                </a:solidFill>
+                <a:effectLst/>
+                <a:highlight>
+                  <a:srgbClr val="FFFFFF"/>
+                </a:highlight>
+                <a:latin typeface="Consolas" panose="020B0609020204030204" pitchFamily="49" charset="0"/>
+                <a:ea typeface="等线" panose="02010600030101010101" pitchFamily="2" charset="-122"/>
+                <a:cs typeface="Courier New" panose="02070309020205020404" pitchFamily="49" charset="0"/>
+              </a:rPr>
+              <a:t>union</a:t>
+            </a:r>
+            <a:r>
+              <a:rPr lang="en-US" altLang="zh-CN" sz="1800" kern="0">
+                <a:solidFill>
                   <a:srgbClr val="000000"/>
                 </a:solidFill>
                 <a:effectLst/>
@@ -21759,37 +22008,7 @@
                 <a:ea typeface="等线" panose="02010600030101010101" pitchFamily="2" charset="-122"/>
                 <a:cs typeface="Courier New" panose="02070309020205020404" pitchFamily="49" charset="0"/>
               </a:rPr>
-              <a:t>    </a:t>
-            </a:r>
-            <a:r>
-              <a:rPr lang="en-US" altLang="zh-CN" sz="1800" kern="0">
-                <a:solidFill>
-                  <a:srgbClr val="8000FF"/>
-                </a:solidFill>
-                <a:effectLst/>
-                <a:highlight>
-                  <a:srgbClr val="FFFFFF"/>
-                </a:highlight>
-                <a:latin typeface="Consolas" panose="020B0609020204030204" pitchFamily="49" charset="0"/>
-                <a:ea typeface="等线" panose="02010600030101010101" pitchFamily="2" charset="-122"/>
-                <a:cs typeface="Courier New" panose="02070309020205020404" pitchFamily="49" charset="0"/>
-              </a:rPr>
-              <a:t>char</a:t>
-            </a:r>
-            <a:r>
-              <a:rPr lang="en-US" altLang="zh-CN" sz="1800" kern="0">
-                <a:solidFill>
-                  <a:srgbClr val="000000"/>
-                </a:solidFill>
-                <a:effectLst/>
-                <a:highlight>
-                  <a:srgbClr val="FFFFFF"/>
-                </a:highlight>
-                <a:latin typeface="Consolas" panose="020B0609020204030204" pitchFamily="49" charset="0"/>
-                <a:ea typeface="等线" panose="02010600030101010101" pitchFamily="2" charset="-122"/>
-                <a:cs typeface="Courier New" panose="02070309020205020404" pitchFamily="49" charset="0"/>
-              </a:rPr>
-              <a:t> char_data</a:t>
+              <a:t> Value </a:t>
             </a:r>
             <a:r>
               <a:rPr lang="en-US" altLang="zh-CN" sz="1800" b="1" kern="0">
@@ -21804,9 +22023,9 @@
                 <a:ea typeface="等线" panose="02010600030101010101" pitchFamily="2" charset="-122"/>
                 <a:cs typeface="Courier New" panose="02070309020205020404" pitchFamily="49" charset="0"/>
               </a:rPr>
-              <a:t>;</a:t>
-            </a:r>
-            <a:endParaRPr lang="zh-CN" altLang="zh-CN" sz="2000" kern="100">
+              <a:t>{</a:t>
+            </a:r>
+            <a:endParaRPr lang="zh-CN" altLang="zh-CN" sz="1800" kern="100">
               <a:effectLst/>
               <a:latin typeface="等线" panose="02010600030101010101" pitchFamily="2" charset="-122"/>
               <a:ea typeface="等线" panose="02010600030101010101" pitchFamily="2" charset="-122"/>
@@ -21816,6 +22035,51 @@
           <a:p>
             <a:pPr algn="l"/>
             <a:r>
+              <a:rPr lang="en-US" altLang="zh-CN" sz="1800" kern="0">
+                <a:solidFill>
+                  <a:srgbClr val="000000"/>
+                </a:solidFill>
+                <a:effectLst/>
+                <a:highlight>
+                  <a:srgbClr val="FFFFFF"/>
+                </a:highlight>
+                <a:latin typeface="Consolas" panose="020B0609020204030204" pitchFamily="49" charset="0"/>
+                <a:ea typeface="等线" panose="02010600030101010101" pitchFamily="2" charset="-122"/>
+                <a:cs typeface="Courier New" panose="02070309020205020404" pitchFamily="49" charset="0"/>
+              </a:rPr>
+              <a:t>    </a:t>
+            </a:r>
+            <a:r>
+              <a:rPr lang="en-US" altLang="zh-CN" sz="1800" kern="0">
+                <a:solidFill>
+                  <a:srgbClr val="8000FF"/>
+                </a:solidFill>
+                <a:effectLst/>
+                <a:highlight>
+                  <a:srgbClr val="FFFFFF"/>
+                </a:highlight>
+                <a:latin typeface="Consolas" panose="020B0609020204030204" pitchFamily="49" charset="0"/>
+                <a:ea typeface="等线" panose="02010600030101010101" pitchFamily="2" charset="-122"/>
+                <a:cs typeface="Courier New" panose="02070309020205020404" pitchFamily="49" charset="0"/>
+              </a:rPr>
+              <a:t>int</a:t>
+            </a:r>
+            <a:r>
+              <a:rPr lang="en-US" altLang="zh-CN" sz="1800" kern="0">
+                <a:solidFill>
+                  <a:srgbClr val="000000"/>
+                </a:solidFill>
+                <a:effectLst/>
+                <a:highlight>
+                  <a:srgbClr val="FFFFFF"/>
+                </a:highlight>
+                <a:latin typeface="Consolas" panose="020B0609020204030204" pitchFamily="49" charset="0"/>
+                <a:ea typeface="等线" panose="02010600030101010101" pitchFamily="2" charset="-122"/>
+                <a:cs typeface="Courier New" panose="02070309020205020404" pitchFamily="49" charset="0"/>
+              </a:rPr>
+              <a:t> int_data</a:t>
+            </a:r>
+            <a:r>
               <a:rPr lang="en-US" altLang="zh-CN" sz="1800" b="1" kern="0">
                 <a:solidFill>
                   <a:srgbClr val="000080"/>
@@ -21828,9 +22092,9 @@
                 <a:ea typeface="等线" panose="02010600030101010101" pitchFamily="2" charset="-122"/>
                 <a:cs typeface="Courier New" panose="02070309020205020404" pitchFamily="49" charset="0"/>
               </a:rPr>
-              <a:t>};</a:t>
-            </a:r>
-            <a:endParaRPr lang="zh-CN" altLang="zh-CN" sz="2000" kern="100">
+              <a:t>;</a:t>
+            </a:r>
+            <a:endParaRPr lang="zh-CN" altLang="zh-CN" sz="1800" kern="100">
               <a:effectLst/>
               <a:latin typeface="等线" panose="02010600030101010101" pitchFamily="2" charset="-122"/>
               <a:ea typeface="等线" panose="02010600030101010101" pitchFamily="2" charset="-122"/>
@@ -21852,9 +22116,54 @@
                 <a:ea typeface="等线" panose="02010600030101010101" pitchFamily="2" charset="-122"/>
                 <a:cs typeface="Courier New" panose="02070309020205020404" pitchFamily="49" charset="0"/>
               </a:rPr>
-              <a:t> </a:t>
-            </a:r>
-            <a:endParaRPr lang="zh-CN" altLang="zh-CN" sz="2000" kern="100">
+              <a:t>    </a:t>
+            </a:r>
+            <a:r>
+              <a:rPr lang="en-US" altLang="zh-CN" sz="1800" kern="0">
+                <a:solidFill>
+                  <a:srgbClr val="8000FF"/>
+                </a:solidFill>
+                <a:effectLst/>
+                <a:highlight>
+                  <a:srgbClr val="FFFFFF"/>
+                </a:highlight>
+                <a:latin typeface="Consolas" panose="020B0609020204030204" pitchFamily="49" charset="0"/>
+                <a:ea typeface="等线" panose="02010600030101010101" pitchFamily="2" charset="-122"/>
+                <a:cs typeface="Courier New" panose="02070309020205020404" pitchFamily="49" charset="0"/>
+              </a:rPr>
+              <a:t>char</a:t>
+            </a:r>
+            <a:r>
+              <a:rPr lang="en-US" altLang="zh-CN" sz="1800" kern="0">
+                <a:solidFill>
+                  <a:srgbClr val="000000"/>
+                </a:solidFill>
+                <a:effectLst/>
+                <a:highlight>
+                  <a:srgbClr val="FFFFFF"/>
+                </a:highlight>
+                <a:latin typeface="Consolas" panose="020B0609020204030204" pitchFamily="49" charset="0"/>
+                <a:ea typeface="等线" panose="02010600030101010101" pitchFamily="2" charset="-122"/>
+                <a:cs typeface="Courier New" panose="02070309020205020404" pitchFamily="49" charset="0"/>
+              </a:rPr>
+              <a:t> char_data</a:t>
+            </a:r>
+            <a:r>
+              <a:rPr lang="en-US" altLang="zh-CN" sz="1800" b="1" kern="0">
+                <a:solidFill>
+                  <a:srgbClr val="000080"/>
+                </a:solidFill>
+                <a:effectLst/>
+                <a:highlight>
+                  <a:srgbClr val="FFFFFF"/>
+                </a:highlight>
+                <a:latin typeface="Consolas" panose="020B0609020204030204" pitchFamily="49" charset="0"/>
+                <a:ea typeface="等线" panose="02010600030101010101" pitchFamily="2" charset="-122"/>
+                <a:cs typeface="Courier New" panose="02070309020205020404" pitchFamily="49" charset="0"/>
+              </a:rPr>
+              <a:t>;</a:t>
+            </a:r>
+            <a:endParaRPr lang="zh-CN" altLang="zh-CN" sz="1800" kern="100">
               <a:effectLst/>
               <a:latin typeface="等线" panose="02010600030101010101" pitchFamily="2" charset="-122"/>
               <a:ea typeface="等线" panose="02010600030101010101" pitchFamily="2" charset="-122"/>
@@ -21864,36 +22173,6 @@
           <a:p>
             <a:pPr algn="l"/>
             <a:r>
-              <a:rPr lang="en-US" altLang="zh-CN" sz="1800" kern="0">
-                <a:solidFill>
-                  <a:srgbClr val="8000FF"/>
-                </a:solidFill>
-                <a:effectLst/>
-                <a:highlight>
-                  <a:srgbClr val="FFFFFF"/>
-                </a:highlight>
-                <a:latin typeface="Consolas" panose="020B0609020204030204" pitchFamily="49" charset="0"/>
-                <a:ea typeface="等线" panose="02010600030101010101" pitchFamily="2" charset="-122"/>
-                <a:cs typeface="Courier New" panose="02070309020205020404" pitchFamily="49" charset="0"/>
-              </a:rPr>
-              <a:t>int</a:t>
-            </a:r>
-            <a:r>
-              <a:rPr lang="en-US" altLang="zh-CN" sz="1800" kern="0">
-                <a:solidFill>
-                  <a:srgbClr val="000000"/>
-                </a:solidFill>
-                <a:effectLst/>
-                <a:highlight>
-                  <a:srgbClr val="FFFFFF"/>
-                </a:highlight>
-                <a:latin typeface="Consolas" panose="020B0609020204030204" pitchFamily="49" charset="0"/>
-                <a:ea typeface="等线" panose="02010600030101010101" pitchFamily="2" charset="-122"/>
-                <a:cs typeface="Courier New" panose="02070309020205020404" pitchFamily="49" charset="0"/>
-              </a:rPr>
-              <a:t> main</a:t>
-            </a:r>
-            <a:r>
               <a:rPr lang="en-US" altLang="zh-CN" sz="1800" b="1" kern="0">
                 <a:solidFill>
                   <a:srgbClr val="000080"/>
@@ -21906,39 +22185,9 @@
                 <a:ea typeface="等线" panose="02010600030101010101" pitchFamily="2" charset="-122"/>
                 <a:cs typeface="Courier New" panose="02070309020205020404" pitchFamily="49" charset="0"/>
               </a:rPr>
-              <a:t>()</a:t>
-            </a:r>
-            <a:r>
-              <a:rPr lang="en-US" altLang="zh-CN" sz="1800" kern="0">
-                <a:solidFill>
-                  <a:srgbClr val="000000"/>
-                </a:solidFill>
-                <a:effectLst/>
-                <a:highlight>
-                  <a:srgbClr val="FFFFFF"/>
-                </a:highlight>
-                <a:latin typeface="Consolas" panose="020B0609020204030204" pitchFamily="49" charset="0"/>
-                <a:ea typeface="等线" panose="02010600030101010101" pitchFamily="2" charset="-122"/>
-                <a:cs typeface="Courier New" panose="02070309020205020404" pitchFamily="49" charset="0"/>
-              </a:rPr>
-              <a:t> </a:t>
-            </a:r>
-            <a:r>
-              <a:rPr lang="en-US" altLang="zh-CN" sz="1800" b="1" kern="0">
-                <a:solidFill>
-                  <a:srgbClr val="000080"/>
-                </a:solidFill>
-                <a:effectLst/>
-                <a:highlight>
-                  <a:srgbClr val="FFFFFF"/>
-                </a:highlight>
-                <a:latin typeface="Consolas" panose="020B0609020204030204" pitchFamily="49" charset="0"/>
-                <a:ea typeface="等线" panose="02010600030101010101" pitchFamily="2" charset="-122"/>
-                <a:cs typeface="Courier New" panose="02070309020205020404" pitchFamily="49" charset="0"/>
-              </a:rPr>
-              <a:t>{</a:t>
-            </a:r>
-            <a:endParaRPr lang="zh-CN" altLang="zh-CN" sz="2000" kern="100">
+              <a:t>};</a:t>
+            </a:r>
+            <a:endParaRPr lang="zh-CN" altLang="zh-CN" sz="1800" kern="100">
               <a:effectLst/>
               <a:latin typeface="等线" panose="02010600030101010101" pitchFamily="2" charset="-122"/>
               <a:ea typeface="等线" panose="02010600030101010101" pitchFamily="2" charset="-122"/>
@@ -21960,54 +22209,9 @@
                 <a:ea typeface="等线" panose="02010600030101010101" pitchFamily="2" charset="-122"/>
                 <a:cs typeface="Courier New" panose="02070309020205020404" pitchFamily="49" charset="0"/>
               </a:rPr>
-              <a:t>    </a:t>
-            </a:r>
-            <a:r>
-              <a:rPr lang="en-US" altLang="zh-CN" sz="1800" kern="0">
-                <a:solidFill>
-                  <a:srgbClr val="8000FF"/>
-                </a:solidFill>
-                <a:effectLst/>
-                <a:highlight>
-                  <a:srgbClr val="FFFFFF"/>
-                </a:highlight>
-                <a:latin typeface="Consolas" panose="020B0609020204030204" pitchFamily="49" charset="0"/>
-                <a:ea typeface="等线" panose="02010600030101010101" pitchFamily="2" charset="-122"/>
-                <a:cs typeface="Courier New" panose="02070309020205020404" pitchFamily="49" charset="0"/>
-              </a:rPr>
-              <a:t>union</a:t>
-            </a:r>
-            <a:r>
-              <a:rPr lang="en-US" altLang="zh-CN" sz="1800" kern="0">
-                <a:solidFill>
-                  <a:srgbClr val="000000"/>
-                </a:solidFill>
-                <a:effectLst/>
-                <a:highlight>
-                  <a:srgbClr val="FFFFFF"/>
-                </a:highlight>
-                <a:latin typeface="Consolas" panose="020B0609020204030204" pitchFamily="49" charset="0"/>
-                <a:ea typeface="等线" panose="02010600030101010101" pitchFamily="2" charset="-122"/>
-                <a:cs typeface="Courier New" panose="02070309020205020404" pitchFamily="49" charset="0"/>
-              </a:rPr>
-              <a:t> Value val</a:t>
-            </a:r>
-            <a:r>
-              <a:rPr lang="en-US" altLang="zh-CN" sz="1800" b="1" kern="0">
-                <a:solidFill>
-                  <a:srgbClr val="000080"/>
-                </a:solidFill>
-                <a:effectLst/>
-                <a:highlight>
-                  <a:srgbClr val="FFFFFF"/>
-                </a:highlight>
-                <a:latin typeface="Consolas" panose="020B0609020204030204" pitchFamily="49" charset="0"/>
-                <a:ea typeface="等线" panose="02010600030101010101" pitchFamily="2" charset="-122"/>
-                <a:cs typeface="Courier New" panose="02070309020205020404" pitchFamily="49" charset="0"/>
-              </a:rPr>
-              <a:t>;</a:t>
-            </a:r>
-            <a:endParaRPr lang="zh-CN" altLang="zh-CN" sz="2000" kern="100">
+              <a:t> </a:t>
+            </a:r>
+            <a:endParaRPr lang="zh-CN" altLang="zh-CN" sz="1800" kern="100">
               <a:effectLst/>
               <a:latin typeface="等线" panose="02010600030101010101" pitchFamily="2" charset="-122"/>
               <a:ea typeface="等线" panose="02010600030101010101" pitchFamily="2" charset="-122"/>
@@ -22019,6 +22223,21 @@
             <a:r>
               <a:rPr lang="en-US" altLang="zh-CN" sz="1800" kern="0">
                 <a:solidFill>
+                  <a:srgbClr val="8000FF"/>
+                </a:solidFill>
+                <a:effectLst/>
+                <a:highlight>
+                  <a:srgbClr val="FFFFFF"/>
+                </a:highlight>
+                <a:latin typeface="Consolas" panose="020B0609020204030204" pitchFamily="49" charset="0"/>
+                <a:ea typeface="等线" panose="02010600030101010101" pitchFamily="2" charset="-122"/>
+                <a:cs typeface="Courier New" panose="02070309020205020404" pitchFamily="49" charset="0"/>
+              </a:rPr>
+              <a:t>int</a:t>
+            </a:r>
+            <a:r>
+              <a:rPr lang="en-US" altLang="zh-CN" sz="1800" kern="0">
+                <a:solidFill>
                   <a:srgbClr val="000000"/>
                 </a:solidFill>
                 <a:effectLst/>
@@ -22029,9 +22248,54 @@
                 <a:ea typeface="等线" panose="02010600030101010101" pitchFamily="2" charset="-122"/>
                 <a:cs typeface="Courier New" panose="02070309020205020404" pitchFamily="49" charset="0"/>
               </a:rPr>
-              <a:t> </a:t>
-            </a:r>
-            <a:endParaRPr lang="zh-CN" altLang="zh-CN" sz="2000" kern="100">
+              <a:t> main</a:t>
+            </a:r>
+            <a:r>
+              <a:rPr lang="en-US" altLang="zh-CN" sz="1800" b="1" kern="0">
+                <a:solidFill>
+                  <a:srgbClr val="000080"/>
+                </a:solidFill>
+                <a:effectLst/>
+                <a:highlight>
+                  <a:srgbClr val="FFFFFF"/>
+                </a:highlight>
+                <a:latin typeface="Consolas" panose="020B0609020204030204" pitchFamily="49" charset="0"/>
+                <a:ea typeface="等线" panose="02010600030101010101" pitchFamily="2" charset="-122"/>
+                <a:cs typeface="Courier New" panose="02070309020205020404" pitchFamily="49" charset="0"/>
+              </a:rPr>
+              <a:t>()</a:t>
+            </a:r>
+            <a:r>
+              <a:rPr lang="en-US" altLang="zh-CN" sz="1800" kern="0">
+                <a:solidFill>
+                  <a:srgbClr val="000000"/>
+                </a:solidFill>
+                <a:effectLst/>
+                <a:highlight>
+                  <a:srgbClr val="FFFFFF"/>
+                </a:highlight>
+                <a:latin typeface="Consolas" panose="020B0609020204030204" pitchFamily="49" charset="0"/>
+                <a:ea typeface="等线" panose="02010600030101010101" pitchFamily="2" charset="-122"/>
+                <a:cs typeface="Courier New" panose="02070309020205020404" pitchFamily="49" charset="0"/>
+              </a:rPr>
+              <a:t> </a:t>
+            </a:r>
+            <a:r>
+              <a:rPr lang="en-US" altLang="zh-CN" sz="1800" b="1" kern="0">
+                <a:solidFill>
+                  <a:srgbClr val="000080"/>
+                </a:solidFill>
+                <a:effectLst/>
+                <a:highlight>
+                  <a:srgbClr val="FFFFFF"/>
+                </a:highlight>
+                <a:latin typeface="Consolas" panose="020B0609020204030204" pitchFamily="49" charset="0"/>
+                <a:ea typeface="等线" panose="02010600030101010101" pitchFamily="2" charset="-122"/>
+                <a:cs typeface="Courier New" panose="02070309020205020404" pitchFamily="49" charset="0"/>
+              </a:rPr>
+              <a:t>{</a:t>
+            </a:r>
+            <a:endParaRPr lang="zh-CN" altLang="zh-CN" sz="1800" kern="100">
               <a:effectLst/>
               <a:latin typeface="等线" panose="02010600030101010101" pitchFamily="2" charset="-122"/>
               <a:ea typeface="等线" panose="02010600030101010101" pitchFamily="2" charset="-122"/>
@@ -22053,7 +22317,37 @@
                 <a:ea typeface="等线" panose="02010600030101010101" pitchFamily="2" charset="-122"/>
                 <a:cs typeface="Courier New" panose="02070309020205020404" pitchFamily="49" charset="0"/>
               </a:rPr>
-              <a:t>    val</a:t>
+              <a:t>    </a:t>
+            </a:r>
+            <a:r>
+              <a:rPr lang="en-US" altLang="zh-CN" sz="1800" kern="0">
+                <a:solidFill>
+                  <a:srgbClr val="8000FF"/>
+                </a:solidFill>
+                <a:effectLst/>
+                <a:highlight>
+                  <a:srgbClr val="FFFFFF"/>
+                </a:highlight>
+                <a:latin typeface="Consolas" panose="020B0609020204030204" pitchFamily="49" charset="0"/>
+                <a:ea typeface="等线" panose="02010600030101010101" pitchFamily="2" charset="-122"/>
+                <a:cs typeface="Courier New" panose="02070309020205020404" pitchFamily="49" charset="0"/>
+              </a:rPr>
+              <a:t>union</a:t>
+            </a:r>
+            <a:r>
+              <a:rPr lang="en-US" altLang="zh-CN" sz="1800" kern="0">
+                <a:solidFill>
+                  <a:srgbClr val="000000"/>
+                </a:solidFill>
+                <a:effectLst/>
+                <a:highlight>
+                  <a:srgbClr val="FFFFFF"/>
+                </a:highlight>
+                <a:latin typeface="Consolas" panose="020B0609020204030204" pitchFamily="49" charset="0"/>
+                <a:ea typeface="等线" panose="02010600030101010101" pitchFamily="2" charset="-122"/>
+                <a:cs typeface="Courier New" panose="02070309020205020404" pitchFamily="49" charset="0"/>
+              </a:rPr>
+              <a:t> Value val</a:t>
             </a:r>
             <a:r>
               <a:rPr lang="en-US" altLang="zh-CN" sz="1800" b="1" kern="0">
@@ -22068,84 +22362,9 @@
                 <a:ea typeface="等线" panose="02010600030101010101" pitchFamily="2" charset="-122"/>
                 <a:cs typeface="Courier New" panose="02070309020205020404" pitchFamily="49" charset="0"/>
               </a:rPr>
-              <a:t>.</a:t>
-            </a:r>
-            <a:r>
-              <a:rPr lang="en-US" altLang="zh-CN" sz="1800" kern="0">
-                <a:solidFill>
-                  <a:srgbClr val="000000"/>
-                </a:solidFill>
-                <a:effectLst/>
-                <a:highlight>
-                  <a:srgbClr val="FFFFFF"/>
-                </a:highlight>
-                <a:latin typeface="Consolas" panose="020B0609020204030204" pitchFamily="49" charset="0"/>
-                <a:ea typeface="等线" panose="02010600030101010101" pitchFamily="2" charset="-122"/>
-                <a:cs typeface="Courier New" panose="02070309020205020404" pitchFamily="49" charset="0"/>
-              </a:rPr>
-              <a:t>char_data </a:t>
-            </a:r>
-            <a:r>
-              <a:rPr lang="en-US" altLang="zh-CN" sz="1800" b="1" kern="0">
-                <a:solidFill>
-                  <a:srgbClr val="000080"/>
-                </a:solidFill>
-                <a:effectLst/>
-                <a:highlight>
-                  <a:srgbClr val="FFFFFF"/>
-                </a:highlight>
-                <a:latin typeface="Consolas" panose="020B0609020204030204" pitchFamily="49" charset="0"/>
-                <a:ea typeface="等线" panose="02010600030101010101" pitchFamily="2" charset="-122"/>
-                <a:cs typeface="Courier New" panose="02070309020205020404" pitchFamily="49" charset="0"/>
-              </a:rPr>
-              <a:t>=</a:t>
-            </a:r>
-            <a:r>
-              <a:rPr lang="en-US" altLang="zh-CN" sz="1800" kern="0">
-                <a:solidFill>
-                  <a:srgbClr val="000000"/>
-                </a:solidFill>
-                <a:effectLst/>
-                <a:highlight>
-                  <a:srgbClr val="FFFFFF"/>
-                </a:highlight>
-                <a:latin typeface="Consolas" panose="020B0609020204030204" pitchFamily="49" charset="0"/>
-                <a:ea typeface="等线" panose="02010600030101010101" pitchFamily="2" charset="-122"/>
-                <a:cs typeface="Courier New" panose="02070309020205020404" pitchFamily="49" charset="0"/>
-              </a:rPr>
-              <a:t> </a:t>
-            </a:r>
-            <a:r>
-              <a:rPr lang="en-US" altLang="zh-CN" sz="1800" kern="0">
-                <a:solidFill>
-                  <a:srgbClr val="808080"/>
-                </a:solidFill>
-                <a:effectLst/>
-                <a:highlight>
-                  <a:srgbClr val="FFFFFF"/>
-                </a:highlight>
-                <a:latin typeface="Consolas" panose="020B0609020204030204" pitchFamily="49" charset="0"/>
-                <a:ea typeface="等线" panose="02010600030101010101" pitchFamily="2" charset="-122"/>
-                <a:cs typeface="Courier New" panose="02070309020205020404" pitchFamily="49" charset="0"/>
-              </a:rPr>
-              <a:t>'A'</a:t>
-            </a:r>
-            <a:r>
-              <a:rPr lang="en-US" altLang="zh-CN" sz="1800" b="1" kern="0">
-                <a:solidFill>
-                  <a:srgbClr val="000080"/>
-                </a:solidFill>
-                <a:effectLst/>
-                <a:highlight>
-                  <a:srgbClr val="FFFFFF"/>
-                </a:highlight>
-                <a:latin typeface="Consolas" panose="020B0609020204030204" pitchFamily="49" charset="0"/>
-                <a:ea typeface="等线" panose="02010600030101010101" pitchFamily="2" charset="-122"/>
-                <a:cs typeface="Courier New" panose="02070309020205020404" pitchFamily="49" charset="0"/>
-              </a:rPr>
               <a:t>;</a:t>
             </a:r>
-            <a:endParaRPr lang="zh-CN" altLang="zh-CN" sz="2000" kern="100">
+            <a:endParaRPr lang="zh-CN" altLang="zh-CN" sz="1800" kern="100">
               <a:effectLst/>
               <a:latin typeface="等线" panose="02010600030101010101" pitchFamily="2" charset="-122"/>
               <a:ea typeface="等线" panose="02010600030101010101" pitchFamily="2" charset="-122"/>
@@ -22167,114 +22386,9 @@
                 <a:ea typeface="等线" panose="02010600030101010101" pitchFamily="2" charset="-122"/>
                 <a:cs typeface="Courier New" panose="02070309020205020404" pitchFamily="49" charset="0"/>
               </a:rPr>
-              <a:t>    printf</a:t>
-            </a:r>
-            <a:r>
-              <a:rPr lang="en-US" altLang="zh-CN" sz="1800" b="1" kern="0">
-                <a:solidFill>
-                  <a:srgbClr val="000080"/>
-                </a:solidFill>
-                <a:effectLst/>
-                <a:highlight>
-                  <a:srgbClr val="FFFFFF"/>
-                </a:highlight>
-                <a:latin typeface="Consolas" panose="020B0609020204030204" pitchFamily="49" charset="0"/>
-                <a:ea typeface="等线" panose="02010600030101010101" pitchFamily="2" charset="-122"/>
-                <a:cs typeface="Courier New" panose="02070309020205020404" pitchFamily="49" charset="0"/>
-              </a:rPr>
-              <a:t>(</a:t>
-            </a:r>
-            <a:r>
-              <a:rPr lang="en-US" altLang="zh-CN" sz="1800" kern="0">
-                <a:solidFill>
-                  <a:srgbClr val="808080"/>
-                </a:solidFill>
-                <a:effectLst/>
-                <a:highlight>
-                  <a:srgbClr val="FFFFFF"/>
-                </a:highlight>
-                <a:latin typeface="Consolas" panose="020B0609020204030204" pitchFamily="49" charset="0"/>
-                <a:ea typeface="等线" panose="02010600030101010101" pitchFamily="2" charset="-122"/>
-                <a:cs typeface="Courier New" panose="02070309020205020404" pitchFamily="49" charset="0"/>
-              </a:rPr>
-              <a:t>"val.int_data = %d\n"</a:t>
-            </a:r>
-            <a:r>
-              <a:rPr lang="en-US" altLang="zh-CN" sz="1800" b="1" kern="0">
-                <a:solidFill>
-                  <a:srgbClr val="000080"/>
-                </a:solidFill>
-                <a:effectLst/>
-                <a:highlight>
-                  <a:srgbClr val="FFFFFF"/>
-                </a:highlight>
-                <a:latin typeface="Consolas" panose="020B0609020204030204" pitchFamily="49" charset="0"/>
-                <a:ea typeface="等线" panose="02010600030101010101" pitchFamily="2" charset="-122"/>
-                <a:cs typeface="Courier New" panose="02070309020205020404" pitchFamily="49" charset="0"/>
-              </a:rPr>
-              <a:t>,</a:t>
-            </a:r>
-            <a:r>
-              <a:rPr lang="en-US" altLang="zh-CN" sz="1800" kern="0">
-                <a:solidFill>
-                  <a:srgbClr val="000000"/>
-                </a:solidFill>
-                <a:effectLst/>
-                <a:highlight>
-                  <a:srgbClr val="FFFFFF"/>
-                </a:highlight>
-                <a:latin typeface="Consolas" panose="020B0609020204030204" pitchFamily="49" charset="0"/>
-                <a:ea typeface="等线" panose="02010600030101010101" pitchFamily="2" charset="-122"/>
-                <a:cs typeface="Courier New" panose="02070309020205020404" pitchFamily="49" charset="0"/>
-              </a:rPr>
-              <a:t> val</a:t>
-            </a:r>
-            <a:r>
-              <a:rPr lang="en-US" altLang="zh-CN" sz="1800" b="1" kern="0">
-                <a:solidFill>
-                  <a:srgbClr val="000080"/>
-                </a:solidFill>
-                <a:effectLst/>
-                <a:highlight>
-                  <a:srgbClr val="FFFFFF"/>
-                </a:highlight>
-                <a:latin typeface="Consolas" panose="020B0609020204030204" pitchFamily="49" charset="0"/>
-                <a:ea typeface="等线" panose="02010600030101010101" pitchFamily="2" charset="-122"/>
-                <a:cs typeface="Courier New" panose="02070309020205020404" pitchFamily="49" charset="0"/>
-              </a:rPr>
-              <a:t>.</a:t>
-            </a:r>
-            <a:r>
-              <a:rPr lang="en-US" altLang="zh-CN" sz="1800" kern="0">
-                <a:solidFill>
-                  <a:srgbClr val="000000"/>
-                </a:solidFill>
-                <a:effectLst/>
-                <a:highlight>
-                  <a:srgbClr val="FFFFFF"/>
-                </a:highlight>
-                <a:latin typeface="Consolas" panose="020B0609020204030204" pitchFamily="49" charset="0"/>
-                <a:ea typeface="等线" panose="02010600030101010101" pitchFamily="2" charset="-122"/>
-                <a:cs typeface="Courier New" panose="02070309020205020404" pitchFamily="49" charset="0"/>
-              </a:rPr>
-              <a:t>int_data</a:t>
-            </a:r>
-            <a:r>
-              <a:rPr lang="en-US" altLang="zh-CN" sz="1800" b="1" kern="0">
-                <a:solidFill>
-                  <a:srgbClr val="000080"/>
-                </a:solidFill>
-                <a:effectLst/>
-                <a:highlight>
-                  <a:srgbClr val="FFFFFF"/>
-                </a:highlight>
-                <a:latin typeface="Consolas" panose="020B0609020204030204" pitchFamily="49" charset="0"/>
-                <a:ea typeface="等线" panose="02010600030101010101" pitchFamily="2" charset="-122"/>
-                <a:cs typeface="Courier New" panose="02070309020205020404" pitchFamily="49" charset="0"/>
-              </a:rPr>
-              <a:t>);</a:t>
-            </a:r>
-            <a:endParaRPr lang="zh-CN" altLang="zh-CN" sz="2000" kern="100">
+              <a:t> </a:t>
+            </a:r>
+            <a:endParaRPr lang="zh-CN" altLang="zh-CN" sz="1800" kern="100">
               <a:effectLst/>
               <a:latin typeface="等线" panose="02010600030101010101" pitchFamily="2" charset="-122"/>
               <a:ea typeface="等线" panose="02010600030101010101" pitchFamily="2" charset="-122"/>
@@ -22296,9 +22410,99 @@
                 <a:ea typeface="等线" panose="02010600030101010101" pitchFamily="2" charset="-122"/>
                 <a:cs typeface="Courier New" panose="02070309020205020404" pitchFamily="49" charset="0"/>
               </a:rPr>
-              <a:t> </a:t>
-            </a:r>
-            <a:endParaRPr lang="zh-CN" altLang="zh-CN" sz="2000" kern="100">
+              <a:t>    val</a:t>
+            </a:r>
+            <a:r>
+              <a:rPr lang="en-US" altLang="zh-CN" sz="1800" b="1" kern="0">
+                <a:solidFill>
+                  <a:srgbClr val="000080"/>
+                </a:solidFill>
+                <a:effectLst/>
+                <a:highlight>
+                  <a:srgbClr val="FFFFFF"/>
+                </a:highlight>
+                <a:latin typeface="Consolas" panose="020B0609020204030204" pitchFamily="49" charset="0"/>
+                <a:ea typeface="等线" panose="02010600030101010101" pitchFamily="2" charset="-122"/>
+                <a:cs typeface="Courier New" panose="02070309020205020404" pitchFamily="49" charset="0"/>
+              </a:rPr>
+              <a:t>.</a:t>
+            </a:r>
+            <a:r>
+              <a:rPr lang="en-US" altLang="zh-CN" sz="1800" kern="0">
+                <a:solidFill>
+                  <a:srgbClr val="000000"/>
+                </a:solidFill>
+                <a:effectLst/>
+                <a:highlight>
+                  <a:srgbClr val="FFFFFF"/>
+                </a:highlight>
+                <a:latin typeface="Consolas" panose="020B0609020204030204" pitchFamily="49" charset="0"/>
+                <a:ea typeface="等线" panose="02010600030101010101" pitchFamily="2" charset="-122"/>
+                <a:cs typeface="Courier New" panose="02070309020205020404" pitchFamily="49" charset="0"/>
+              </a:rPr>
+              <a:t>char_data </a:t>
+            </a:r>
+            <a:r>
+              <a:rPr lang="en-US" altLang="zh-CN" sz="1800" b="1" kern="0">
+                <a:solidFill>
+                  <a:srgbClr val="000080"/>
+                </a:solidFill>
+                <a:effectLst/>
+                <a:highlight>
+                  <a:srgbClr val="FFFFFF"/>
+                </a:highlight>
+                <a:latin typeface="Consolas" panose="020B0609020204030204" pitchFamily="49" charset="0"/>
+                <a:ea typeface="等线" panose="02010600030101010101" pitchFamily="2" charset="-122"/>
+                <a:cs typeface="Courier New" panose="02070309020205020404" pitchFamily="49" charset="0"/>
+              </a:rPr>
+              <a:t>=</a:t>
+            </a:r>
+            <a:r>
+              <a:rPr lang="en-US" altLang="zh-CN" sz="1800" kern="0">
+                <a:solidFill>
+                  <a:srgbClr val="000000"/>
+                </a:solidFill>
+                <a:effectLst/>
+                <a:highlight>
+                  <a:srgbClr val="FFFFFF"/>
+                </a:highlight>
+                <a:latin typeface="Consolas" panose="020B0609020204030204" pitchFamily="49" charset="0"/>
+                <a:ea typeface="等线" panose="02010600030101010101" pitchFamily="2" charset="-122"/>
+                <a:cs typeface="Courier New" panose="02070309020205020404" pitchFamily="49" charset="0"/>
+              </a:rPr>
+              <a:t> </a:t>
+            </a:r>
+            <a:r>
+              <a:rPr lang="en-US" altLang="zh-CN" sz="1800" kern="0">
+                <a:solidFill>
+                  <a:srgbClr val="808080"/>
+                </a:solidFill>
+                <a:effectLst/>
+                <a:highlight>
+                  <a:srgbClr val="FFFFFF"/>
+                </a:highlight>
+                <a:latin typeface="Consolas" panose="020B0609020204030204" pitchFamily="49" charset="0"/>
+                <a:ea typeface="等线" panose="02010600030101010101" pitchFamily="2" charset="-122"/>
+                <a:cs typeface="Courier New" panose="02070309020205020404" pitchFamily="49" charset="0"/>
+              </a:rPr>
+              <a:t>'A'</a:t>
+            </a:r>
+            <a:r>
+              <a:rPr lang="en-US" altLang="zh-CN" sz="1800" b="1" kern="0">
+                <a:solidFill>
+                  <a:srgbClr val="000080"/>
+                </a:solidFill>
+                <a:effectLst/>
+                <a:highlight>
+                  <a:srgbClr val="FFFFFF"/>
+                </a:highlight>
+                <a:latin typeface="Consolas" panose="020B0609020204030204" pitchFamily="49" charset="0"/>
+                <a:ea typeface="等线" panose="02010600030101010101" pitchFamily="2" charset="-122"/>
+                <a:cs typeface="Courier New" panose="02070309020205020404" pitchFamily="49" charset="0"/>
+              </a:rPr>
+              <a:t>;</a:t>
+            </a:r>
+            <a:endParaRPr lang="zh-CN" altLang="zh-CN" sz="1800" kern="100">
               <a:effectLst/>
               <a:latin typeface="等线" panose="02010600030101010101" pitchFamily="2" charset="-122"/>
               <a:ea typeface="等线" panose="02010600030101010101" pitchFamily="2" charset="-122"/>
@@ -22320,7 +22524,7 @@
                 <a:ea typeface="等线" panose="02010600030101010101" pitchFamily="2" charset="-122"/>
                 <a:cs typeface="Courier New" panose="02070309020205020404" pitchFamily="49" charset="0"/>
               </a:rPr>
-              <a:t>    val</a:t>
+              <a:t>    cout </a:t>
             </a:r>
             <a:r>
               <a:rPr lang="en-US" altLang="zh-CN" sz="1800" b="1" kern="0">
@@ -22335,6 +22539,96 @@
                 <a:ea typeface="等线" panose="02010600030101010101" pitchFamily="2" charset="-122"/>
                 <a:cs typeface="Courier New" panose="02070309020205020404" pitchFamily="49" charset="0"/>
               </a:rPr>
+              <a:t>&lt;&lt;</a:t>
+            </a:r>
+            <a:r>
+              <a:rPr lang="en-US" altLang="zh-CN" sz="1800" kern="0">
+                <a:solidFill>
+                  <a:srgbClr val="000000"/>
+                </a:solidFill>
+                <a:effectLst/>
+                <a:highlight>
+                  <a:srgbClr val="FFFFFF"/>
+                </a:highlight>
+                <a:latin typeface="Consolas" panose="020B0609020204030204" pitchFamily="49" charset="0"/>
+                <a:ea typeface="等线" panose="02010600030101010101" pitchFamily="2" charset="-122"/>
+                <a:cs typeface="Courier New" panose="02070309020205020404" pitchFamily="49" charset="0"/>
+              </a:rPr>
+              <a:t> </a:t>
+            </a:r>
+            <a:r>
+              <a:rPr lang="en-US" altLang="zh-CN" sz="1800" kern="0">
+                <a:solidFill>
+                  <a:srgbClr val="808080"/>
+                </a:solidFill>
+                <a:effectLst/>
+                <a:highlight>
+                  <a:srgbClr val="FFFFFF"/>
+                </a:highlight>
+                <a:latin typeface="Consolas" panose="020B0609020204030204" pitchFamily="49" charset="0"/>
+                <a:ea typeface="等线" panose="02010600030101010101" pitchFamily="2" charset="-122"/>
+                <a:cs typeface="Courier New" panose="02070309020205020404" pitchFamily="49" charset="0"/>
+              </a:rPr>
+              <a:t>"val.int_data = "</a:t>
+            </a:r>
+            <a:r>
+              <a:rPr lang="en-US" altLang="zh-CN" sz="1800" kern="0">
+                <a:solidFill>
+                  <a:srgbClr val="000000"/>
+                </a:solidFill>
+                <a:effectLst/>
+                <a:highlight>
+                  <a:srgbClr val="FFFFFF"/>
+                </a:highlight>
+                <a:latin typeface="Consolas" panose="020B0609020204030204" pitchFamily="49" charset="0"/>
+                <a:ea typeface="等线" panose="02010600030101010101" pitchFamily="2" charset="-122"/>
+                <a:cs typeface="Courier New" panose="02070309020205020404" pitchFamily="49" charset="0"/>
+              </a:rPr>
+              <a:t> </a:t>
+            </a:r>
+            <a:r>
+              <a:rPr lang="en-US" altLang="zh-CN" sz="1800" b="1" kern="0">
+                <a:solidFill>
+                  <a:srgbClr val="000080"/>
+                </a:solidFill>
+                <a:effectLst/>
+                <a:highlight>
+                  <a:srgbClr val="FFFFFF"/>
+                </a:highlight>
+                <a:latin typeface="Consolas" panose="020B0609020204030204" pitchFamily="49" charset="0"/>
+                <a:ea typeface="等线" panose="02010600030101010101" pitchFamily="2" charset="-122"/>
+                <a:cs typeface="Courier New" panose="02070309020205020404" pitchFamily="49" charset="0"/>
+              </a:rPr>
+              <a:t>&lt;&lt;</a:t>
+            </a:r>
+            <a:r>
+              <a:rPr lang="en-US" altLang="zh-CN" sz="1800" kern="0">
+                <a:solidFill>
+                  <a:srgbClr val="000000"/>
+                </a:solidFill>
+                <a:effectLst/>
+                <a:highlight>
+                  <a:srgbClr val="FFFFFF"/>
+                </a:highlight>
+                <a:latin typeface="Consolas" panose="020B0609020204030204" pitchFamily="49" charset="0"/>
+                <a:ea typeface="等线" panose="02010600030101010101" pitchFamily="2" charset="-122"/>
+                <a:cs typeface="Courier New" panose="02070309020205020404" pitchFamily="49" charset="0"/>
+              </a:rPr>
+              <a:t> val</a:t>
+            </a:r>
+            <a:r>
+              <a:rPr lang="en-US" altLang="zh-CN" sz="1800" b="1" kern="0">
+                <a:solidFill>
+                  <a:srgbClr val="000080"/>
+                </a:solidFill>
+                <a:effectLst/>
+                <a:highlight>
+                  <a:srgbClr val="FFFFFF"/>
+                </a:highlight>
+                <a:latin typeface="Consolas" panose="020B0609020204030204" pitchFamily="49" charset="0"/>
+                <a:ea typeface="等线" panose="02010600030101010101" pitchFamily="2" charset="-122"/>
+                <a:cs typeface="Courier New" panose="02070309020205020404" pitchFamily="49" charset="0"/>
+              </a:rPr>
               <a:t>.</a:t>
             </a:r>
             <a:r>
@@ -22365,7 +22659,7 @@
                 <a:ea typeface="等线" panose="02010600030101010101" pitchFamily="2" charset="-122"/>
                 <a:cs typeface="Courier New" panose="02070309020205020404" pitchFamily="49" charset="0"/>
               </a:rPr>
-              <a:t>=</a:t>
+              <a:t>&lt;&lt;</a:t>
             </a:r>
             <a:r>
               <a:rPr lang="en-US" altLang="zh-CN" sz="1800" kern="0">
@@ -22380,22 +22674,7 @@
                 <a:ea typeface="等线" panose="02010600030101010101" pitchFamily="2" charset="-122"/>
                 <a:cs typeface="Courier New" panose="02070309020205020404" pitchFamily="49" charset="0"/>
               </a:rPr>
-              <a:t> </a:t>
-            </a:r>
-            <a:r>
-              <a:rPr lang="en-US" altLang="zh-CN" sz="1800" kern="0">
-                <a:solidFill>
-                  <a:srgbClr val="FF8000"/>
-                </a:solidFill>
-                <a:effectLst/>
-                <a:highlight>
-                  <a:srgbClr val="FFFFFF"/>
-                </a:highlight>
-                <a:latin typeface="Consolas" panose="020B0609020204030204" pitchFamily="49" charset="0"/>
-                <a:ea typeface="等线" panose="02010600030101010101" pitchFamily="2" charset="-122"/>
-                <a:cs typeface="Courier New" panose="02070309020205020404" pitchFamily="49" charset="0"/>
-              </a:rPr>
-              <a:t>97</a:t>
+              <a:t> endl</a:t>
             </a:r>
             <a:r>
               <a:rPr lang="en-US" altLang="zh-CN" sz="1800" b="1" kern="0">
@@ -22412,7 +22691,7 @@
               </a:rPr>
               <a:t>;</a:t>
             </a:r>
-            <a:endParaRPr lang="zh-CN" altLang="zh-CN" sz="2000" kern="100">
+            <a:endParaRPr lang="zh-CN" altLang="zh-CN" sz="1800" kern="100">
               <a:effectLst/>
               <a:latin typeface="等线" panose="02010600030101010101" pitchFamily="2" charset="-122"/>
               <a:ea typeface="等线" panose="02010600030101010101" pitchFamily="2" charset="-122"/>
@@ -22434,114 +22713,9 @@
                 <a:ea typeface="等线" panose="02010600030101010101" pitchFamily="2" charset="-122"/>
                 <a:cs typeface="Courier New" panose="02070309020205020404" pitchFamily="49" charset="0"/>
               </a:rPr>
-              <a:t>    printf</a:t>
-            </a:r>
-            <a:r>
-              <a:rPr lang="en-US" altLang="zh-CN" sz="1800" b="1" kern="0">
-                <a:solidFill>
-                  <a:srgbClr val="000080"/>
-                </a:solidFill>
-                <a:effectLst/>
-                <a:highlight>
-                  <a:srgbClr val="FFFFFF"/>
-                </a:highlight>
-                <a:latin typeface="Consolas" panose="020B0609020204030204" pitchFamily="49" charset="0"/>
-                <a:ea typeface="等线" panose="02010600030101010101" pitchFamily="2" charset="-122"/>
-                <a:cs typeface="Courier New" panose="02070309020205020404" pitchFamily="49" charset="0"/>
-              </a:rPr>
-              <a:t>(</a:t>
-            </a:r>
-            <a:r>
-              <a:rPr lang="en-US" altLang="zh-CN" sz="1800" kern="0">
-                <a:solidFill>
-                  <a:srgbClr val="808080"/>
-                </a:solidFill>
-                <a:effectLst/>
-                <a:highlight>
-                  <a:srgbClr val="FFFFFF"/>
-                </a:highlight>
-                <a:latin typeface="Consolas" panose="020B0609020204030204" pitchFamily="49" charset="0"/>
-                <a:ea typeface="等线" panose="02010600030101010101" pitchFamily="2" charset="-122"/>
-                <a:cs typeface="Courier New" panose="02070309020205020404" pitchFamily="49" charset="0"/>
-              </a:rPr>
-              <a:t>"val.char_data = %c\n"</a:t>
-            </a:r>
-            <a:r>
-              <a:rPr lang="en-US" altLang="zh-CN" sz="1800" b="1" kern="0">
-                <a:solidFill>
-                  <a:srgbClr val="000080"/>
-                </a:solidFill>
-                <a:effectLst/>
-                <a:highlight>
-                  <a:srgbClr val="FFFFFF"/>
-                </a:highlight>
-                <a:latin typeface="Consolas" panose="020B0609020204030204" pitchFamily="49" charset="0"/>
-                <a:ea typeface="等线" panose="02010600030101010101" pitchFamily="2" charset="-122"/>
-                <a:cs typeface="Courier New" panose="02070309020205020404" pitchFamily="49" charset="0"/>
-              </a:rPr>
-              <a:t>,</a:t>
-            </a:r>
-            <a:r>
-              <a:rPr lang="en-US" altLang="zh-CN" sz="1800" kern="0">
-                <a:solidFill>
-                  <a:srgbClr val="000000"/>
-                </a:solidFill>
-                <a:effectLst/>
-                <a:highlight>
-                  <a:srgbClr val="FFFFFF"/>
-                </a:highlight>
-                <a:latin typeface="Consolas" panose="020B0609020204030204" pitchFamily="49" charset="0"/>
-                <a:ea typeface="等线" panose="02010600030101010101" pitchFamily="2" charset="-122"/>
-                <a:cs typeface="Courier New" panose="02070309020205020404" pitchFamily="49" charset="0"/>
-              </a:rPr>
-              <a:t> val</a:t>
-            </a:r>
-            <a:r>
-              <a:rPr lang="en-US" altLang="zh-CN" sz="1800" b="1" kern="0">
-                <a:solidFill>
-                  <a:srgbClr val="000080"/>
-                </a:solidFill>
-                <a:effectLst/>
-                <a:highlight>
-                  <a:srgbClr val="FFFFFF"/>
-                </a:highlight>
-                <a:latin typeface="Consolas" panose="020B0609020204030204" pitchFamily="49" charset="0"/>
-                <a:ea typeface="等线" panose="02010600030101010101" pitchFamily="2" charset="-122"/>
-                <a:cs typeface="Courier New" panose="02070309020205020404" pitchFamily="49" charset="0"/>
-              </a:rPr>
-              <a:t>.</a:t>
-            </a:r>
-            <a:r>
-              <a:rPr lang="en-US" altLang="zh-CN" sz="1800" kern="0">
-                <a:solidFill>
-                  <a:srgbClr val="000000"/>
-                </a:solidFill>
-                <a:effectLst/>
-                <a:highlight>
-                  <a:srgbClr val="FFFFFF"/>
-                </a:highlight>
-                <a:latin typeface="Consolas" panose="020B0609020204030204" pitchFamily="49" charset="0"/>
-                <a:ea typeface="等线" panose="02010600030101010101" pitchFamily="2" charset="-122"/>
-                <a:cs typeface="Courier New" panose="02070309020205020404" pitchFamily="49" charset="0"/>
-              </a:rPr>
-              <a:t>char_data</a:t>
-            </a:r>
-            <a:r>
-              <a:rPr lang="en-US" altLang="zh-CN" sz="1800" b="1" kern="0">
-                <a:solidFill>
-                  <a:srgbClr val="000080"/>
-                </a:solidFill>
-                <a:effectLst/>
-                <a:highlight>
-                  <a:srgbClr val="FFFFFF"/>
-                </a:highlight>
-                <a:latin typeface="Consolas" panose="020B0609020204030204" pitchFamily="49" charset="0"/>
-                <a:ea typeface="等线" panose="02010600030101010101" pitchFamily="2" charset="-122"/>
-                <a:cs typeface="Courier New" panose="02070309020205020404" pitchFamily="49" charset="0"/>
-              </a:rPr>
-              <a:t>);</a:t>
-            </a:r>
-            <a:endParaRPr lang="zh-CN" altLang="zh-CN" sz="2000" kern="100">
+              <a:t> </a:t>
+            </a:r>
+            <a:endParaRPr lang="zh-CN" altLang="zh-CN" sz="1800" kern="100">
               <a:effectLst/>
               <a:latin typeface="等线" panose="02010600030101010101" pitchFamily="2" charset="-122"/>
               <a:ea typeface="等线" panose="02010600030101010101" pitchFamily="2" charset="-122"/>
@@ -22563,9 +22737,99 @@
                 <a:ea typeface="等线" panose="02010600030101010101" pitchFamily="2" charset="-122"/>
                 <a:cs typeface="Courier New" panose="02070309020205020404" pitchFamily="49" charset="0"/>
               </a:rPr>
-              <a:t> </a:t>
-            </a:r>
-            <a:endParaRPr lang="zh-CN" altLang="zh-CN" sz="2000" kern="100">
+              <a:t>    val</a:t>
+            </a:r>
+            <a:r>
+              <a:rPr lang="en-US" altLang="zh-CN" sz="1800" b="1" kern="0">
+                <a:solidFill>
+                  <a:srgbClr val="000080"/>
+                </a:solidFill>
+                <a:effectLst/>
+                <a:highlight>
+                  <a:srgbClr val="FFFFFF"/>
+                </a:highlight>
+                <a:latin typeface="Consolas" panose="020B0609020204030204" pitchFamily="49" charset="0"/>
+                <a:ea typeface="等线" panose="02010600030101010101" pitchFamily="2" charset="-122"/>
+                <a:cs typeface="Courier New" panose="02070309020205020404" pitchFamily="49" charset="0"/>
+              </a:rPr>
+              <a:t>.</a:t>
+            </a:r>
+            <a:r>
+              <a:rPr lang="en-US" altLang="zh-CN" sz="1800" kern="0">
+                <a:solidFill>
+                  <a:srgbClr val="000000"/>
+                </a:solidFill>
+                <a:effectLst/>
+                <a:highlight>
+                  <a:srgbClr val="FFFFFF"/>
+                </a:highlight>
+                <a:latin typeface="Consolas" panose="020B0609020204030204" pitchFamily="49" charset="0"/>
+                <a:ea typeface="等线" panose="02010600030101010101" pitchFamily="2" charset="-122"/>
+                <a:cs typeface="Courier New" panose="02070309020205020404" pitchFamily="49" charset="0"/>
+              </a:rPr>
+              <a:t>int_data </a:t>
+            </a:r>
+            <a:r>
+              <a:rPr lang="en-US" altLang="zh-CN" sz="1800" b="1" kern="0">
+                <a:solidFill>
+                  <a:srgbClr val="000080"/>
+                </a:solidFill>
+                <a:effectLst/>
+                <a:highlight>
+                  <a:srgbClr val="FFFFFF"/>
+                </a:highlight>
+                <a:latin typeface="Consolas" panose="020B0609020204030204" pitchFamily="49" charset="0"/>
+                <a:ea typeface="等线" panose="02010600030101010101" pitchFamily="2" charset="-122"/>
+                <a:cs typeface="Courier New" panose="02070309020205020404" pitchFamily="49" charset="0"/>
+              </a:rPr>
+              <a:t>=</a:t>
+            </a:r>
+            <a:r>
+              <a:rPr lang="en-US" altLang="zh-CN" sz="1800" kern="0">
+                <a:solidFill>
+                  <a:srgbClr val="000000"/>
+                </a:solidFill>
+                <a:effectLst/>
+                <a:highlight>
+                  <a:srgbClr val="FFFFFF"/>
+                </a:highlight>
+                <a:latin typeface="Consolas" panose="020B0609020204030204" pitchFamily="49" charset="0"/>
+                <a:ea typeface="等线" panose="02010600030101010101" pitchFamily="2" charset="-122"/>
+                <a:cs typeface="Courier New" panose="02070309020205020404" pitchFamily="49" charset="0"/>
+              </a:rPr>
+              <a:t> </a:t>
+            </a:r>
+            <a:r>
+              <a:rPr lang="en-US" altLang="zh-CN" sz="1800" kern="0">
+                <a:solidFill>
+                  <a:srgbClr val="FF8000"/>
+                </a:solidFill>
+                <a:effectLst/>
+                <a:highlight>
+                  <a:srgbClr val="FFFFFF"/>
+                </a:highlight>
+                <a:latin typeface="Consolas" panose="020B0609020204030204" pitchFamily="49" charset="0"/>
+                <a:ea typeface="等线" panose="02010600030101010101" pitchFamily="2" charset="-122"/>
+                <a:cs typeface="Courier New" panose="02070309020205020404" pitchFamily="49" charset="0"/>
+              </a:rPr>
+              <a:t>97</a:t>
+            </a:r>
+            <a:r>
+              <a:rPr lang="en-US" altLang="zh-CN" sz="1800" b="1" kern="0">
+                <a:solidFill>
+                  <a:srgbClr val="000080"/>
+                </a:solidFill>
+                <a:effectLst/>
+                <a:highlight>
+                  <a:srgbClr val="FFFFFF"/>
+                </a:highlight>
+                <a:latin typeface="Consolas" panose="020B0609020204030204" pitchFamily="49" charset="0"/>
+                <a:ea typeface="等线" panose="02010600030101010101" pitchFamily="2" charset="-122"/>
+                <a:cs typeface="Courier New" panose="02070309020205020404" pitchFamily="49" charset="0"/>
+              </a:rPr>
+              <a:t>;</a:t>
+            </a:r>
+            <a:endParaRPr lang="zh-CN" altLang="zh-CN" sz="1800" kern="100">
               <a:effectLst/>
               <a:latin typeface="等线" panose="02010600030101010101" pitchFamily="2" charset="-122"/>
               <a:ea typeface="等线" panose="02010600030101010101" pitchFamily="2" charset="-122"/>
@@ -22587,22 +22851,22 @@
                 <a:ea typeface="等线" panose="02010600030101010101" pitchFamily="2" charset="-122"/>
                 <a:cs typeface="Courier New" panose="02070309020205020404" pitchFamily="49" charset="0"/>
               </a:rPr>
-              <a:t>    </a:t>
+              <a:t>    cout </a:t>
             </a:r>
             <a:r>
               <a:rPr lang="en-US" altLang="zh-CN" sz="1800" b="1" kern="0">
                 <a:solidFill>
-                  <a:srgbClr val="0000FF"/>
-                </a:solidFill>
-                <a:effectLst/>
-                <a:highlight>
-                  <a:srgbClr val="FFFFFF"/>
-                </a:highlight>
-                <a:latin typeface="Consolas" panose="020B0609020204030204" pitchFamily="49" charset="0"/>
-                <a:ea typeface="等线" panose="02010600030101010101" pitchFamily="2" charset="-122"/>
-                <a:cs typeface="Courier New" panose="02070309020205020404" pitchFamily="49" charset="0"/>
-              </a:rPr>
-              <a:t>return</a:t>
+                  <a:srgbClr val="000080"/>
+                </a:solidFill>
+                <a:effectLst/>
+                <a:highlight>
+                  <a:srgbClr val="FFFFFF"/>
+                </a:highlight>
+                <a:latin typeface="Consolas" panose="020B0609020204030204" pitchFamily="49" charset="0"/>
+                <a:ea typeface="等线" panose="02010600030101010101" pitchFamily="2" charset="-122"/>
+                <a:cs typeface="Courier New" panose="02070309020205020404" pitchFamily="49" charset="0"/>
+              </a:rPr>
+              <a:t>&lt;&lt;</a:t>
             </a:r>
             <a:r>
               <a:rPr lang="en-US" altLang="zh-CN" sz="1800" kern="0">
@@ -22622,17 +22886,32 @@
             <a:r>
               <a:rPr lang="en-US" altLang="zh-CN" sz="1800" kern="0">
                 <a:solidFill>
-                  <a:srgbClr val="FF8000"/>
-                </a:solidFill>
-                <a:effectLst/>
-                <a:highlight>
-                  <a:srgbClr val="FFFFFF"/>
-                </a:highlight>
-                <a:latin typeface="Consolas" panose="020B0609020204030204" pitchFamily="49" charset="0"/>
-                <a:ea typeface="等线" panose="02010600030101010101" pitchFamily="2" charset="-122"/>
-                <a:cs typeface="Courier New" panose="02070309020205020404" pitchFamily="49" charset="0"/>
-              </a:rPr>
-              <a:t>0</a:t>
+                  <a:srgbClr val="808080"/>
+                </a:solidFill>
+                <a:effectLst/>
+                <a:highlight>
+                  <a:srgbClr val="FFFFFF"/>
+                </a:highlight>
+                <a:latin typeface="Consolas" panose="020B0609020204030204" pitchFamily="49" charset="0"/>
+                <a:ea typeface="等线" panose="02010600030101010101" pitchFamily="2" charset="-122"/>
+                <a:cs typeface="Courier New" panose="02070309020205020404" pitchFamily="49" charset="0"/>
+              </a:rPr>
+              <a:t>"val.char_data = "</a:t>
+            </a:r>
+            <a:r>
+              <a:rPr lang="en-US" altLang="zh-CN" sz="1800" kern="0">
+                <a:solidFill>
+                  <a:srgbClr val="000000"/>
+                </a:solidFill>
+                <a:effectLst/>
+                <a:highlight>
+                  <a:srgbClr val="FFFFFF"/>
+                </a:highlight>
+                <a:latin typeface="Consolas" panose="020B0609020204030204" pitchFamily="49" charset="0"/>
+                <a:ea typeface="等线" panose="02010600030101010101" pitchFamily="2" charset="-122"/>
+                <a:cs typeface="Courier New" panose="02070309020205020404" pitchFamily="49" charset="0"/>
+              </a:rPr>
+              <a:t> </a:t>
             </a:r>
             <a:r>
               <a:rPr lang="en-US" altLang="zh-CN" sz="1800" b="1" kern="0">
@@ -22647,9 +22926,99 @@
                 <a:ea typeface="等线" panose="02010600030101010101" pitchFamily="2" charset="-122"/>
                 <a:cs typeface="Courier New" panose="02070309020205020404" pitchFamily="49" charset="0"/>
               </a:rPr>
+              <a:t>&lt;&lt;</a:t>
+            </a:r>
+            <a:r>
+              <a:rPr lang="en-US" altLang="zh-CN" sz="1800" kern="0">
+                <a:solidFill>
+                  <a:srgbClr val="000000"/>
+                </a:solidFill>
+                <a:effectLst/>
+                <a:highlight>
+                  <a:srgbClr val="FFFFFF"/>
+                </a:highlight>
+                <a:latin typeface="Consolas" panose="020B0609020204030204" pitchFamily="49" charset="0"/>
+                <a:ea typeface="等线" panose="02010600030101010101" pitchFamily="2" charset="-122"/>
+                <a:cs typeface="Courier New" panose="02070309020205020404" pitchFamily="49" charset="0"/>
+              </a:rPr>
+              <a:t> val</a:t>
+            </a:r>
+            <a:r>
+              <a:rPr lang="en-US" altLang="zh-CN" sz="1800" b="1" kern="0">
+                <a:solidFill>
+                  <a:srgbClr val="000080"/>
+                </a:solidFill>
+                <a:effectLst/>
+                <a:highlight>
+                  <a:srgbClr val="FFFFFF"/>
+                </a:highlight>
+                <a:latin typeface="Consolas" panose="020B0609020204030204" pitchFamily="49" charset="0"/>
+                <a:ea typeface="等线" panose="02010600030101010101" pitchFamily="2" charset="-122"/>
+                <a:cs typeface="Courier New" panose="02070309020205020404" pitchFamily="49" charset="0"/>
+              </a:rPr>
+              <a:t>.</a:t>
+            </a:r>
+            <a:r>
+              <a:rPr lang="en-US" altLang="zh-CN" sz="1800" kern="0">
+                <a:solidFill>
+                  <a:srgbClr val="000000"/>
+                </a:solidFill>
+                <a:effectLst/>
+                <a:highlight>
+                  <a:srgbClr val="FFFFFF"/>
+                </a:highlight>
+                <a:latin typeface="Consolas" panose="020B0609020204030204" pitchFamily="49" charset="0"/>
+                <a:ea typeface="等线" panose="02010600030101010101" pitchFamily="2" charset="-122"/>
+                <a:cs typeface="Courier New" panose="02070309020205020404" pitchFamily="49" charset="0"/>
+              </a:rPr>
+              <a:t>char_data </a:t>
+            </a:r>
+            <a:r>
+              <a:rPr lang="en-US" altLang="zh-CN" sz="1800" b="1" kern="0">
+                <a:solidFill>
+                  <a:srgbClr val="000080"/>
+                </a:solidFill>
+                <a:effectLst/>
+                <a:highlight>
+                  <a:srgbClr val="FFFFFF"/>
+                </a:highlight>
+                <a:latin typeface="Consolas" panose="020B0609020204030204" pitchFamily="49" charset="0"/>
+                <a:ea typeface="等线" panose="02010600030101010101" pitchFamily="2" charset="-122"/>
+                <a:cs typeface="Courier New" panose="02070309020205020404" pitchFamily="49" charset="0"/>
+              </a:rPr>
+              <a:t>&lt;&lt;</a:t>
+            </a:r>
+            <a:r>
+              <a:rPr lang="en-US" altLang="zh-CN" sz="1800" kern="0">
+                <a:solidFill>
+                  <a:srgbClr val="000000"/>
+                </a:solidFill>
+                <a:effectLst/>
+                <a:highlight>
+                  <a:srgbClr val="FFFFFF"/>
+                </a:highlight>
+                <a:latin typeface="Consolas" panose="020B0609020204030204" pitchFamily="49" charset="0"/>
+                <a:ea typeface="等线" panose="02010600030101010101" pitchFamily="2" charset="-122"/>
+                <a:cs typeface="Courier New" panose="02070309020205020404" pitchFamily="49" charset="0"/>
+              </a:rPr>
+              <a:t> endl</a:t>
+            </a:r>
+            <a:r>
+              <a:rPr lang="en-US" altLang="zh-CN" sz="1800" b="1" kern="0">
+                <a:solidFill>
+                  <a:srgbClr val="000080"/>
+                </a:solidFill>
+                <a:effectLst/>
+                <a:highlight>
+                  <a:srgbClr val="FFFFFF"/>
+                </a:highlight>
+                <a:latin typeface="Consolas" panose="020B0609020204030204" pitchFamily="49" charset="0"/>
+                <a:ea typeface="等线" panose="02010600030101010101" pitchFamily="2" charset="-122"/>
+                <a:cs typeface="Courier New" panose="02070309020205020404" pitchFamily="49" charset="0"/>
+              </a:rPr>
               <a:t>;</a:t>
             </a:r>
-            <a:endParaRPr lang="zh-CN" altLang="zh-CN" sz="2000" kern="100">
+            <a:endParaRPr lang="zh-CN" altLang="zh-CN" sz="1800" kern="100">
               <a:effectLst/>
               <a:latin typeface="等线" panose="02010600030101010101" pitchFamily="2" charset="-122"/>
               <a:ea typeface="等线" panose="02010600030101010101" pitchFamily="2" charset="-122"/>
@@ -22657,6 +23026,114 @@
             </a:endParaRPr>
           </a:p>
           <a:p>
+            <a:pPr algn="l"/>
+            <a:r>
+              <a:rPr lang="en-US" altLang="zh-CN" sz="1800" kern="0">
+                <a:solidFill>
+                  <a:srgbClr val="000000"/>
+                </a:solidFill>
+                <a:effectLst/>
+                <a:highlight>
+                  <a:srgbClr val="FFFFFF"/>
+                </a:highlight>
+                <a:latin typeface="Consolas" panose="020B0609020204030204" pitchFamily="49" charset="0"/>
+                <a:ea typeface="等线" panose="02010600030101010101" pitchFamily="2" charset="-122"/>
+                <a:cs typeface="Courier New" panose="02070309020205020404" pitchFamily="49" charset="0"/>
+              </a:rPr>
+              <a:t> </a:t>
+            </a:r>
+            <a:endParaRPr lang="zh-CN" altLang="zh-CN" sz="1800" kern="100">
+              <a:effectLst/>
+              <a:latin typeface="等线" panose="02010600030101010101" pitchFamily="2" charset="-122"/>
+              <a:ea typeface="等线" panose="02010600030101010101" pitchFamily="2" charset="-122"/>
+              <a:cs typeface="Times New Roman" panose="02020603050405020304" pitchFamily="18" charset="0"/>
+            </a:endParaRPr>
+          </a:p>
+          <a:p>
+            <a:pPr algn="l"/>
+            <a:r>
+              <a:rPr lang="en-US" altLang="zh-CN" sz="1800" kern="0">
+                <a:solidFill>
+                  <a:srgbClr val="000000"/>
+                </a:solidFill>
+                <a:effectLst/>
+                <a:highlight>
+                  <a:srgbClr val="FFFFFF"/>
+                </a:highlight>
+                <a:latin typeface="Consolas" panose="020B0609020204030204" pitchFamily="49" charset="0"/>
+                <a:ea typeface="等线" panose="02010600030101010101" pitchFamily="2" charset="-122"/>
+                <a:cs typeface="Courier New" panose="02070309020205020404" pitchFamily="49" charset="0"/>
+              </a:rPr>
+              <a:t>    </a:t>
+            </a:r>
+            <a:r>
+              <a:rPr lang="en-US" altLang="zh-CN" sz="1800" b="1" kern="0">
+                <a:solidFill>
+                  <a:srgbClr val="0000FF"/>
+                </a:solidFill>
+                <a:effectLst/>
+                <a:highlight>
+                  <a:srgbClr val="FFFFFF"/>
+                </a:highlight>
+                <a:latin typeface="Consolas" panose="020B0609020204030204" pitchFamily="49" charset="0"/>
+                <a:ea typeface="等线" panose="02010600030101010101" pitchFamily="2" charset="-122"/>
+                <a:cs typeface="Courier New" panose="02070309020205020404" pitchFamily="49" charset="0"/>
+              </a:rPr>
+              <a:t>return</a:t>
+            </a:r>
+            <a:r>
+              <a:rPr lang="en-US" altLang="zh-CN" sz="1800" kern="0">
+                <a:solidFill>
+                  <a:srgbClr val="000000"/>
+                </a:solidFill>
+                <a:effectLst/>
+                <a:highlight>
+                  <a:srgbClr val="FFFFFF"/>
+                </a:highlight>
+                <a:latin typeface="Consolas" panose="020B0609020204030204" pitchFamily="49" charset="0"/>
+                <a:ea typeface="等线" panose="02010600030101010101" pitchFamily="2" charset="-122"/>
+                <a:cs typeface="Courier New" panose="02070309020205020404" pitchFamily="49" charset="0"/>
+              </a:rPr>
+              <a:t> </a:t>
+            </a:r>
+            <a:r>
+              <a:rPr lang="en-US" altLang="zh-CN" sz="1800" kern="0">
+                <a:solidFill>
+                  <a:srgbClr val="FF8000"/>
+                </a:solidFill>
+                <a:effectLst/>
+                <a:highlight>
+                  <a:srgbClr val="FFFFFF"/>
+                </a:highlight>
+                <a:latin typeface="Consolas" panose="020B0609020204030204" pitchFamily="49" charset="0"/>
+                <a:ea typeface="等线" panose="02010600030101010101" pitchFamily="2" charset="-122"/>
+                <a:cs typeface="Courier New" panose="02070309020205020404" pitchFamily="49" charset="0"/>
+              </a:rPr>
+              <a:t>0</a:t>
+            </a:r>
+            <a:r>
+              <a:rPr lang="en-US" altLang="zh-CN" sz="1800" b="1" kern="0">
+                <a:solidFill>
+                  <a:srgbClr val="000080"/>
+                </a:solidFill>
+                <a:effectLst/>
+                <a:highlight>
+                  <a:srgbClr val="FFFFFF"/>
+                </a:highlight>
+                <a:latin typeface="Consolas" panose="020B0609020204030204" pitchFamily="49" charset="0"/>
+                <a:ea typeface="等线" panose="02010600030101010101" pitchFamily="2" charset="-122"/>
+                <a:cs typeface="Courier New" panose="02070309020205020404" pitchFamily="49" charset="0"/>
+              </a:rPr>
+              <a:t>;</a:t>
+            </a:r>
+            <a:endParaRPr lang="zh-CN" altLang="zh-CN" sz="1800" kern="100">
+              <a:effectLst/>
+              <a:latin typeface="等线" panose="02010600030101010101" pitchFamily="2" charset="-122"/>
+              <a:ea typeface="等线" panose="02010600030101010101" pitchFamily="2" charset="-122"/>
+              <a:cs typeface="Times New Roman" panose="02020603050405020304" pitchFamily="18" charset="0"/>
+            </a:endParaRPr>
+          </a:p>
+          <a:p>
             <a:pPr algn="just"/>
             <a:r>
               <a:rPr lang="en-US" altLang="zh-CN" sz="1800" b="1" kern="0">
@@ -22673,7 +23150,7 @@
               </a:rPr>
               <a:t>}</a:t>
             </a:r>
-            <a:endParaRPr lang="zh-CN" altLang="zh-CN" sz="2000" kern="100">
+            <a:endParaRPr lang="zh-CN" altLang="zh-CN" sz="1800" kern="100">
               <a:effectLst/>
               <a:latin typeface="等线" panose="02010600030101010101" pitchFamily="2" charset="-122"/>
               <a:ea typeface="等线" panose="02010600030101010101" pitchFamily="2" charset="-122"/>
@@ -24089,7 +24566,7 @@
               </a:rPr>
               <a:t>{</a:t>
             </a:r>
-            <a:endParaRPr lang="zh-CN" altLang="zh-CN" sz="2000" kern="100">
+            <a:endParaRPr lang="zh-CN" altLang="zh-CN" sz="1800" kern="100">
               <a:effectLst/>
               <a:latin typeface="等线" panose="02010600030101010101" pitchFamily="2" charset="-122"/>
               <a:ea typeface="等线" panose="02010600030101010101" pitchFamily="2" charset="-122"/>
@@ -24111,37 +24588,7 @@
                 <a:ea typeface="等线" panose="02010600030101010101" pitchFamily="2" charset="-122"/>
                 <a:cs typeface="Courier New" panose="02070309020205020404" pitchFamily="49" charset="0"/>
               </a:rPr>
-              <a:t>    </a:t>
-            </a:r>
-            <a:r>
-              <a:rPr lang="en-US" altLang="zh-CN" sz="1800" kern="0">
-                <a:solidFill>
-                  <a:srgbClr val="8000FF"/>
-                </a:solidFill>
-                <a:effectLst/>
-                <a:highlight>
-                  <a:srgbClr val="FFFFFF"/>
-                </a:highlight>
-                <a:latin typeface="Consolas" panose="020B0609020204030204" pitchFamily="49" charset="0"/>
-                <a:ea typeface="等线" panose="02010600030101010101" pitchFamily="2" charset="-122"/>
-                <a:cs typeface="Courier New" panose="02070309020205020404" pitchFamily="49" charset="0"/>
-              </a:rPr>
-              <a:t>char</a:t>
-            </a:r>
-            <a:r>
-              <a:rPr lang="en-US" altLang="zh-CN" sz="1800" kern="0">
-                <a:solidFill>
-                  <a:srgbClr val="000000"/>
-                </a:solidFill>
-                <a:effectLst/>
-                <a:highlight>
-                  <a:srgbClr val="FFFFFF"/>
-                </a:highlight>
-                <a:latin typeface="Consolas" panose="020B0609020204030204" pitchFamily="49" charset="0"/>
-                <a:ea typeface="等线" panose="02010600030101010101" pitchFamily="2" charset="-122"/>
-                <a:cs typeface="Courier New" panose="02070309020205020404" pitchFamily="49" charset="0"/>
-              </a:rPr>
-              <a:t> name</a:t>
+              <a:t>    string name</a:t>
             </a:r>
             <a:r>
               <a:rPr lang="en-US" altLang="zh-CN" sz="1800" b="1" kern="0">
@@ -24156,39 +24603,9 @@
                 <a:ea typeface="等线" panose="02010600030101010101" pitchFamily="2" charset="-122"/>
                 <a:cs typeface="Courier New" panose="02070309020205020404" pitchFamily="49" charset="0"/>
               </a:rPr>
-              <a:t>[</a:t>
-            </a:r>
-            <a:r>
-              <a:rPr lang="en-US" altLang="zh-CN" sz="1800" kern="0">
-                <a:solidFill>
-                  <a:srgbClr val="FF8000"/>
-                </a:solidFill>
-                <a:effectLst/>
-                <a:highlight>
-                  <a:srgbClr val="FFFFFF"/>
-                </a:highlight>
-                <a:latin typeface="Consolas" panose="020B0609020204030204" pitchFamily="49" charset="0"/>
-                <a:ea typeface="等线" panose="02010600030101010101" pitchFamily="2" charset="-122"/>
-                <a:cs typeface="Courier New" panose="02070309020205020404" pitchFamily="49" charset="0"/>
-              </a:rPr>
-              <a:t>32</a:t>
-            </a:r>
-            <a:r>
-              <a:rPr lang="en-US" altLang="zh-CN" sz="1800" b="1" kern="0">
-                <a:solidFill>
-                  <a:srgbClr val="000080"/>
-                </a:solidFill>
-                <a:effectLst/>
-                <a:highlight>
-                  <a:srgbClr val="FFFFFF"/>
-                </a:highlight>
-                <a:latin typeface="Consolas" panose="020B0609020204030204" pitchFamily="49" charset="0"/>
-                <a:ea typeface="等线" panose="02010600030101010101" pitchFamily="2" charset="-122"/>
-                <a:cs typeface="Courier New" panose="02070309020205020404" pitchFamily="49" charset="0"/>
-              </a:rPr>
-              <a:t>];</a:t>
-            </a:r>
-            <a:endParaRPr lang="zh-CN" altLang="zh-CN" sz="2000" kern="100">
+              <a:t>;</a:t>
+            </a:r>
+            <a:endParaRPr lang="zh-CN" altLang="zh-CN" sz="1800" kern="100">
               <a:effectLst/>
               <a:latin typeface="等线" panose="02010600030101010101" pitchFamily="2" charset="-122"/>
               <a:ea typeface="等线" panose="02010600030101010101" pitchFamily="2" charset="-122"/>
@@ -24257,7 +24674,7 @@
               </a:rPr>
               <a:t>;</a:t>
             </a:r>
-            <a:endParaRPr lang="zh-CN" altLang="zh-CN" sz="2000" kern="100">
+            <a:endParaRPr lang="zh-CN" altLang="zh-CN" sz="1800" kern="100">
               <a:effectLst/>
               <a:latin typeface="等线" panose="02010600030101010101" pitchFamily="2" charset="-122"/>
               <a:ea typeface="等线" panose="02010600030101010101" pitchFamily="2" charset="-122"/>
@@ -24326,7 +24743,7 @@
               </a:rPr>
               <a:t>;</a:t>
             </a:r>
-            <a:endParaRPr lang="zh-CN" altLang="zh-CN" sz="2000" kern="100">
+            <a:endParaRPr lang="zh-CN" altLang="zh-CN" sz="1800" kern="100">
               <a:effectLst/>
               <a:latin typeface="等线" panose="02010600030101010101" pitchFamily="2" charset="-122"/>
               <a:ea typeface="等线" panose="02010600030101010101" pitchFamily="2" charset="-122"/>
@@ -24350,7 +24767,7 @@
               </a:rPr>
               <a:t>};</a:t>
             </a:r>
-            <a:endParaRPr lang="zh-CN" altLang="zh-CN" sz="2000" kern="100">
+            <a:endParaRPr lang="zh-CN" altLang="zh-CN" sz="1800" kern="100">
               <a:effectLst/>
               <a:latin typeface="等线" panose="02010600030101010101" pitchFamily="2" charset="-122"/>
               <a:ea typeface="等线" panose="02010600030101010101" pitchFamily="2" charset="-122"/>
@@ -25009,7 +25426,6 @@
             </a:endParaRPr>
           </a:p>
           <a:p>
-            <a:pPr algn="l"/>
             <a:r>
               <a:rPr lang="en-US" altLang="zh-CN" sz="1800" kern="0">
                 <a:solidFill>
@@ -25023,37 +25439,7 @@
                 <a:ea typeface="等线" panose="02010600030101010101" pitchFamily="2" charset="-122"/>
                 <a:cs typeface="Courier New" panose="02070309020205020404" pitchFamily="49" charset="0"/>
               </a:rPr>
-              <a:t>    </a:t>
-            </a:r>
-            <a:r>
-              <a:rPr lang="en-US" altLang="zh-CN" sz="1800" kern="0">
-                <a:solidFill>
-                  <a:srgbClr val="8000FF"/>
-                </a:solidFill>
-                <a:effectLst/>
-                <a:highlight>
-                  <a:srgbClr val="FFFFFF"/>
-                </a:highlight>
-                <a:latin typeface="Consolas" panose="020B0609020204030204" pitchFamily="49" charset="0"/>
-                <a:ea typeface="等线" panose="02010600030101010101" pitchFamily="2" charset="-122"/>
-                <a:cs typeface="Courier New" panose="02070309020205020404" pitchFamily="49" charset="0"/>
-              </a:rPr>
-              <a:t>char</a:t>
-            </a:r>
-            <a:r>
-              <a:rPr lang="en-US" altLang="zh-CN" sz="1800" kern="0">
-                <a:solidFill>
-                  <a:srgbClr val="000000"/>
-                </a:solidFill>
-                <a:effectLst/>
-                <a:highlight>
-                  <a:srgbClr val="FFFFFF"/>
-                </a:highlight>
-                <a:latin typeface="Consolas" panose="020B0609020204030204" pitchFamily="49" charset="0"/>
-                <a:ea typeface="等线" panose="02010600030101010101" pitchFamily="2" charset="-122"/>
-                <a:cs typeface="Courier New" panose="02070309020205020404" pitchFamily="49" charset="0"/>
-              </a:rPr>
-              <a:t> name</a:t>
+              <a:t>    string name</a:t>
             </a:r>
             <a:r>
               <a:rPr lang="en-US" altLang="zh-CN" sz="1800" b="1" kern="0">
@@ -25068,37 +25454,7 @@
                 <a:ea typeface="等线" panose="02010600030101010101" pitchFamily="2" charset="-122"/>
                 <a:cs typeface="Courier New" panose="02070309020205020404" pitchFamily="49" charset="0"/>
               </a:rPr>
-              <a:t>[</a:t>
-            </a:r>
-            <a:r>
-              <a:rPr lang="en-US" altLang="zh-CN" sz="1800" kern="0">
-                <a:solidFill>
-                  <a:srgbClr val="FF8000"/>
-                </a:solidFill>
-                <a:effectLst/>
-                <a:highlight>
-                  <a:srgbClr val="FFFFFF"/>
-                </a:highlight>
-                <a:latin typeface="Consolas" panose="020B0609020204030204" pitchFamily="49" charset="0"/>
-                <a:ea typeface="等线" panose="02010600030101010101" pitchFamily="2" charset="-122"/>
-                <a:cs typeface="Courier New" panose="02070309020205020404" pitchFamily="49" charset="0"/>
-              </a:rPr>
-              <a:t>32</a:t>
-            </a:r>
-            <a:r>
-              <a:rPr lang="en-US" altLang="zh-CN" sz="1800" b="1" kern="0">
-                <a:solidFill>
-                  <a:srgbClr val="000080"/>
-                </a:solidFill>
-                <a:effectLst/>
-                <a:highlight>
-                  <a:srgbClr val="FFFFFF"/>
-                </a:highlight>
-                <a:latin typeface="Consolas" panose="020B0609020204030204" pitchFamily="49" charset="0"/>
-                <a:ea typeface="等线" panose="02010600030101010101" pitchFamily="2" charset="-122"/>
-                <a:cs typeface="Courier New" panose="02070309020205020404" pitchFamily="49" charset="0"/>
-              </a:rPr>
-              <a:t>];</a:t>
+              <a:t>;</a:t>
             </a:r>
             <a:endParaRPr lang="zh-CN" altLang="zh-CN" sz="2000" kern="100">
               <a:effectLst/>

</xml_diff>